<commit_message>
finished the last slide on what we used during our project
</commit_message>
<xml_diff>
--- a/Predicting the Presence of Cancer in Breast Cancer Cells.pptx
+++ b/Predicting the Presence of Cancer in Breast Cancer Cells.pptx
@@ -10732,8 +10732,8 @@
         </p:nvSpPr>
         <p:spPr>
           <a:xfrm>
-            <a:off x="1297500" y="1567550"/>
-            <a:ext cx="7038900" cy="2911200"/>
+            <a:off x="1158525" y="1307850"/>
+            <a:ext cx="7720200" cy="3645900"/>
           </a:xfrm>
           <a:prstGeom prst="rect">
             <a:avLst/>
@@ -10834,13 +10834,29 @@
                 <a:spcPts val="1200"/>
               </a:spcBef>
               <a:spcAft>
-                <a:spcPts val="1200"/>
+                <a:spcPts val="0"/>
               </a:spcAft>
               <a:buNone/>
             </a:pPr>
             <a:r>
               <a:rPr lang="en"/>
               <a:t>Interactive Visualization: Tableau</a:t>
+            </a:r>
+            <a:endParaRPr/>
+          </a:p>
+          <a:p>
+            <a:pPr indent="0" lvl="0" marL="0" rtl="0" algn="l">
+              <a:spcBef>
+                <a:spcPts val="1200"/>
+              </a:spcBef>
+              <a:spcAft>
+                <a:spcPts val="1200"/>
+              </a:spcAft>
+              <a:buNone/>
+            </a:pPr>
+            <a:r>
+              <a:rPr lang="en"/>
+              <a:t>	For the dashboard we created, we used Tableau to create a drop down menu of the different graphs we created in order to allow the user to have a better grasp of how different features affect the diagnosis of the patient’s sample.</a:t>
             </a:r>
             <a:endParaRPr/>
           </a:p>
@@ -13752,6 +13768,285 @@
 </file>
 
 <file path=ppt/theme/theme1.xml><?xml version="1.0" encoding="utf-8"?>
+<a:theme xmlns:a="http://schemas.openxmlformats.org/drawingml/2006/main" xmlns:r="http://schemas.openxmlformats.org/officeDocument/2006/relationships" name="Focus">
+  <a:themeElements>
+    <a:clrScheme name="Focus">
+      <a:dk1>
+        <a:srgbClr val="1B212C"/>
+      </a:dk1>
+      <a:lt1>
+        <a:srgbClr val="FFFFFF"/>
+      </a:lt1>
+      <a:dk2>
+        <a:srgbClr val="D9D9D9"/>
+      </a:dk2>
+      <a:lt2>
+        <a:srgbClr val="82C7A5"/>
+      </a:lt2>
+      <a:accent1>
+        <a:srgbClr val="0145AC"/>
+      </a:accent1>
+      <a:accent2>
+        <a:srgbClr val="EECE1A"/>
+      </a:accent2>
+      <a:accent3>
+        <a:srgbClr val="4E5567"/>
+      </a:accent3>
+      <a:accent4>
+        <a:srgbClr val="F4D6AD"/>
+      </a:accent4>
+      <a:accent5>
+        <a:srgbClr val="7890CD"/>
+      </a:accent5>
+      <a:accent6>
+        <a:srgbClr val="F15E22"/>
+      </a:accent6>
+      <a:hlink>
+        <a:srgbClr val="7890CD"/>
+      </a:hlink>
+      <a:folHlink>
+        <a:srgbClr val="7890CD"/>
+      </a:folHlink>
+    </a:clrScheme>
+    <a:fontScheme name="Office">
+      <a:majorFont>
+        <a:latin typeface="Arial"/>
+        <a:ea typeface=""/>
+        <a:cs typeface=""/>
+        <a:font script="Jpan" typeface="ＭＳ Ｐゴシック"/>
+        <a:font script="Hang" typeface="맑은 고딕"/>
+        <a:font script="Hans" typeface="宋体"/>
+        <a:font script="Hant" typeface="新細明體"/>
+        <a:font script="Arab" typeface="Times New Roman"/>
+        <a:font script="Hebr" typeface="Times New Roman"/>
+        <a:font script="Thai" typeface="Angsana New"/>
+        <a:font script="Ethi" typeface="Nyala"/>
+        <a:font script="Beng" typeface="Vrinda"/>
+        <a:font script="Gujr" typeface="Shruti"/>
+        <a:font script="Khmr" typeface="MoolBoran"/>
+        <a:font script="Knda" typeface="Tunga"/>
+        <a:font script="Guru" typeface="Raavi"/>
+        <a:font script="Cans" typeface="Euphemia"/>
+        <a:font script="Cher" typeface="Plantagenet Cherokee"/>
+        <a:font script="Yiii" typeface="Microsoft Yi Baiti"/>
+        <a:font script="Tibt" typeface="Microsoft Himalaya"/>
+        <a:font script="Thaa" typeface="MV Boli"/>
+        <a:font script="Deva" typeface="Mangal"/>
+        <a:font script="Telu" typeface="Gautami"/>
+        <a:font script="Taml" typeface="Latha"/>
+        <a:font script="Syrc" typeface="Estrangelo Edessa"/>
+        <a:font script="Orya" typeface="Kalinga"/>
+        <a:font script="Mlym" typeface="Kartika"/>
+        <a:font script="Laoo" typeface="DokChampa"/>
+        <a:font script="Sinh" typeface="Iskoola Pota"/>
+        <a:font script="Mong" typeface="Mongolian Baiti"/>
+        <a:font script="Viet" typeface="Times New Roman"/>
+        <a:font script="Uigh" typeface="Microsoft Uighur"/>
+        <a:font script="Geor" typeface="Sylfaen"/>
+      </a:majorFont>
+      <a:minorFont>
+        <a:latin typeface="Arial"/>
+        <a:ea typeface=""/>
+        <a:cs typeface=""/>
+        <a:font script="Jpan" typeface="ＭＳ Ｐゴシック"/>
+        <a:font script="Hang" typeface="맑은 고딕"/>
+        <a:font script="Hans" typeface="宋体"/>
+        <a:font script="Hant" typeface="新細明體"/>
+        <a:font script="Arab" typeface="Arial"/>
+        <a:font script="Hebr" typeface="Arial"/>
+        <a:font script="Thai" typeface="Cordia New"/>
+        <a:font script="Ethi" typeface="Nyala"/>
+        <a:font script="Beng" typeface="Vrinda"/>
+        <a:font script="Gujr" typeface="Shruti"/>
+        <a:font script="Khmr" typeface="DaunPenh"/>
+        <a:font script="Knda" typeface="Tunga"/>
+        <a:font script="Guru" typeface="Raavi"/>
+        <a:font script="Cans" typeface="Euphemia"/>
+        <a:font script="Cher" typeface="Plantagenet Cherokee"/>
+        <a:font script="Yiii" typeface="Microsoft Yi Baiti"/>
+        <a:font script="Tibt" typeface="Microsoft Himalaya"/>
+        <a:font script="Thaa" typeface="MV Boli"/>
+        <a:font script="Deva" typeface="Mangal"/>
+        <a:font script="Telu" typeface="Gautami"/>
+        <a:font script="Taml" typeface="Latha"/>
+        <a:font script="Syrc" typeface="Estrangelo Edessa"/>
+        <a:font script="Orya" typeface="Kalinga"/>
+        <a:font script="Mlym" typeface="Kartika"/>
+        <a:font script="Laoo" typeface="DokChampa"/>
+        <a:font script="Sinh" typeface="Iskoola Pota"/>
+        <a:font script="Mong" typeface="Mongolian Baiti"/>
+        <a:font script="Viet" typeface="Arial"/>
+        <a:font script="Uigh" typeface="Microsoft Uighur"/>
+        <a:font script="Geor" typeface="Sylfaen"/>
+      </a:minorFont>
+    </a:fontScheme>
+    <a:fmtScheme name="Office">
+      <a:fillStyleLst>
+        <a:solidFill>
+          <a:schemeClr val="phClr"/>
+        </a:solidFill>
+        <a:gradFill rotWithShape="1">
+          <a:gsLst>
+            <a:gs pos="0">
+              <a:schemeClr val="phClr">
+                <a:tint val="50000"/>
+                <a:satMod val="300000"/>
+              </a:schemeClr>
+            </a:gs>
+            <a:gs pos="35000">
+              <a:schemeClr val="phClr">
+                <a:tint val="37000"/>
+                <a:satMod val="300000"/>
+              </a:schemeClr>
+            </a:gs>
+            <a:gs pos="100000">
+              <a:schemeClr val="phClr">
+                <a:tint val="15000"/>
+                <a:satMod val="350000"/>
+              </a:schemeClr>
+            </a:gs>
+          </a:gsLst>
+          <a:lin ang="16200000" scaled="1"/>
+        </a:gradFill>
+        <a:gradFill rotWithShape="1">
+          <a:gsLst>
+            <a:gs pos="0">
+              <a:schemeClr val="phClr">
+                <a:tint val="100000"/>
+                <a:shade val="100000"/>
+                <a:satMod val="130000"/>
+              </a:schemeClr>
+            </a:gs>
+            <a:gs pos="100000">
+              <a:schemeClr val="phClr">
+                <a:tint val="50000"/>
+                <a:shade val="100000"/>
+                <a:satMod val="350000"/>
+              </a:schemeClr>
+            </a:gs>
+          </a:gsLst>
+          <a:lin ang="16200000" scaled="0"/>
+        </a:gradFill>
+      </a:fillStyleLst>
+      <a:lnStyleLst>
+        <a:ln w="9525" cap="flat" cmpd="sng" algn="ctr">
+          <a:solidFill>
+            <a:schemeClr val="phClr">
+              <a:shade val="95000"/>
+              <a:satMod val="105000"/>
+            </a:schemeClr>
+          </a:solidFill>
+          <a:prstDash val="solid"/>
+        </a:ln>
+        <a:ln w="25400" cap="flat" cmpd="sng" algn="ctr">
+          <a:solidFill>
+            <a:schemeClr val="phClr"/>
+          </a:solidFill>
+          <a:prstDash val="solid"/>
+        </a:ln>
+        <a:ln w="38100" cap="flat" cmpd="sng" algn="ctr">
+          <a:solidFill>
+            <a:schemeClr val="phClr"/>
+          </a:solidFill>
+          <a:prstDash val="solid"/>
+        </a:ln>
+      </a:lnStyleLst>
+      <a:effectStyleLst>
+        <a:effectStyle>
+          <a:effectLst>
+            <a:outerShdw blurRad="40000" dist="20000" dir="5400000" rotWithShape="0">
+              <a:srgbClr val="000000">
+                <a:alpha val="38000"/>
+              </a:srgbClr>
+            </a:outerShdw>
+          </a:effectLst>
+        </a:effectStyle>
+        <a:effectStyle>
+          <a:effectLst>
+            <a:outerShdw blurRad="40000" dist="23000" dir="5400000" rotWithShape="0">
+              <a:srgbClr val="000000">
+                <a:alpha val="35000"/>
+              </a:srgbClr>
+            </a:outerShdw>
+          </a:effectLst>
+        </a:effectStyle>
+        <a:effectStyle>
+          <a:effectLst>
+            <a:outerShdw blurRad="40000" dist="23000" dir="5400000" rotWithShape="0">
+              <a:srgbClr val="000000">
+                <a:alpha val="35000"/>
+              </a:srgbClr>
+            </a:outerShdw>
+          </a:effectLst>
+          <a:scene3d>
+            <a:camera prst="orthographicFront">
+              <a:rot lat="0" lon="0" rev="0"/>
+            </a:camera>
+            <a:lightRig rig="threePt" dir="t">
+              <a:rot lat="0" lon="0" rev="1200000"/>
+            </a:lightRig>
+          </a:scene3d>
+          <a:sp3d>
+            <a:bevelT w="63500" h="25400"/>
+          </a:sp3d>
+        </a:effectStyle>
+      </a:effectStyleLst>
+      <a:bgFillStyleLst>
+        <a:solidFill>
+          <a:schemeClr val="phClr"/>
+        </a:solidFill>
+        <a:gradFill rotWithShape="1">
+          <a:gsLst>
+            <a:gs pos="0">
+              <a:schemeClr val="phClr">
+                <a:tint val="40000"/>
+                <a:satMod val="350000"/>
+              </a:schemeClr>
+            </a:gs>
+            <a:gs pos="40000">
+              <a:schemeClr val="phClr">
+                <a:tint val="45000"/>
+                <a:shade val="99000"/>
+                <a:satMod val="350000"/>
+              </a:schemeClr>
+            </a:gs>
+            <a:gs pos="100000">
+              <a:schemeClr val="phClr">
+                <a:shade val="20000"/>
+                <a:satMod val="255000"/>
+              </a:schemeClr>
+            </a:gs>
+          </a:gsLst>
+          <a:path path="circle">
+            <a:fillToRect l="50000" t="-80000" r="50000" b="180000"/>
+          </a:path>
+        </a:gradFill>
+        <a:gradFill rotWithShape="1">
+          <a:gsLst>
+            <a:gs pos="0">
+              <a:schemeClr val="phClr">
+                <a:tint val="80000"/>
+                <a:satMod val="300000"/>
+              </a:schemeClr>
+            </a:gs>
+            <a:gs pos="100000">
+              <a:schemeClr val="phClr">
+                <a:shade val="30000"/>
+                <a:satMod val="200000"/>
+              </a:schemeClr>
+            </a:gs>
+          </a:gsLst>
+          <a:path path="circle">
+            <a:fillToRect l="50000" t="50000" r="50000" b="50000"/>
+          </a:path>
+        </a:gradFill>
+      </a:bgFillStyleLst>
+    </a:fmtScheme>
+  </a:themeElements>
+</a:theme>
+</file>
+
+<file path=ppt/theme/theme2.xml><?xml version="1.0" encoding="utf-8"?>
 <a:theme xmlns:a="http://schemas.openxmlformats.org/drawingml/2006/main" xmlns:r="http://schemas.openxmlformats.org/officeDocument/2006/relationships">
   <a:themeElements>
     <a:clrScheme name="Default">
@@ -14028,283 +14323,4 @@
     </a:fmtScheme>
   </a:themeElements>
 </a:theme>
-</file>
-
-<file path=ppt/theme/theme2.xml><?xml version="1.0" encoding="utf-8"?>
-<a:theme xmlns:a="http://schemas.openxmlformats.org/drawingml/2006/main" xmlns:r="http://schemas.openxmlformats.org/officeDocument/2006/relationships" name="Focus">
-  <a:themeElements>
-    <a:clrScheme name="Focus">
-      <a:dk1>
-        <a:srgbClr val="1B212C"/>
-      </a:dk1>
-      <a:lt1>
-        <a:srgbClr val="FFFFFF"/>
-      </a:lt1>
-      <a:dk2>
-        <a:srgbClr val="D9D9D9"/>
-      </a:dk2>
-      <a:lt2>
-        <a:srgbClr val="82C7A5"/>
-      </a:lt2>
-      <a:accent1>
-        <a:srgbClr val="0145AC"/>
-      </a:accent1>
-      <a:accent2>
-        <a:srgbClr val="EECE1A"/>
-      </a:accent2>
-      <a:accent3>
-        <a:srgbClr val="4E5567"/>
-      </a:accent3>
-      <a:accent4>
-        <a:srgbClr val="F4D6AD"/>
-      </a:accent4>
-      <a:accent5>
-        <a:srgbClr val="7890CD"/>
-      </a:accent5>
-      <a:accent6>
-        <a:srgbClr val="F15E22"/>
-      </a:accent6>
-      <a:hlink>
-        <a:srgbClr val="7890CD"/>
-      </a:hlink>
-      <a:folHlink>
-        <a:srgbClr val="7890CD"/>
-      </a:folHlink>
-    </a:clrScheme>
-    <a:fontScheme name="Office">
-      <a:majorFont>
-        <a:latin typeface="Arial"/>
-        <a:ea typeface=""/>
-        <a:cs typeface=""/>
-        <a:font script="Jpan" typeface="ＭＳ Ｐゴシック"/>
-        <a:font script="Hang" typeface="맑은 고딕"/>
-        <a:font script="Hans" typeface="宋体"/>
-        <a:font script="Hant" typeface="新細明體"/>
-        <a:font script="Arab" typeface="Times New Roman"/>
-        <a:font script="Hebr" typeface="Times New Roman"/>
-        <a:font script="Thai" typeface="Angsana New"/>
-        <a:font script="Ethi" typeface="Nyala"/>
-        <a:font script="Beng" typeface="Vrinda"/>
-        <a:font script="Gujr" typeface="Shruti"/>
-        <a:font script="Khmr" typeface="MoolBoran"/>
-        <a:font script="Knda" typeface="Tunga"/>
-        <a:font script="Guru" typeface="Raavi"/>
-        <a:font script="Cans" typeface="Euphemia"/>
-        <a:font script="Cher" typeface="Plantagenet Cherokee"/>
-        <a:font script="Yiii" typeface="Microsoft Yi Baiti"/>
-        <a:font script="Tibt" typeface="Microsoft Himalaya"/>
-        <a:font script="Thaa" typeface="MV Boli"/>
-        <a:font script="Deva" typeface="Mangal"/>
-        <a:font script="Telu" typeface="Gautami"/>
-        <a:font script="Taml" typeface="Latha"/>
-        <a:font script="Syrc" typeface="Estrangelo Edessa"/>
-        <a:font script="Orya" typeface="Kalinga"/>
-        <a:font script="Mlym" typeface="Kartika"/>
-        <a:font script="Laoo" typeface="DokChampa"/>
-        <a:font script="Sinh" typeface="Iskoola Pota"/>
-        <a:font script="Mong" typeface="Mongolian Baiti"/>
-        <a:font script="Viet" typeface="Times New Roman"/>
-        <a:font script="Uigh" typeface="Microsoft Uighur"/>
-        <a:font script="Geor" typeface="Sylfaen"/>
-      </a:majorFont>
-      <a:minorFont>
-        <a:latin typeface="Arial"/>
-        <a:ea typeface=""/>
-        <a:cs typeface=""/>
-        <a:font script="Jpan" typeface="ＭＳ Ｐゴシック"/>
-        <a:font script="Hang" typeface="맑은 고딕"/>
-        <a:font script="Hans" typeface="宋体"/>
-        <a:font script="Hant" typeface="新細明體"/>
-        <a:font script="Arab" typeface="Arial"/>
-        <a:font script="Hebr" typeface="Arial"/>
-        <a:font script="Thai" typeface="Cordia New"/>
-        <a:font script="Ethi" typeface="Nyala"/>
-        <a:font script="Beng" typeface="Vrinda"/>
-        <a:font script="Gujr" typeface="Shruti"/>
-        <a:font script="Khmr" typeface="DaunPenh"/>
-        <a:font script="Knda" typeface="Tunga"/>
-        <a:font script="Guru" typeface="Raavi"/>
-        <a:font script="Cans" typeface="Euphemia"/>
-        <a:font script="Cher" typeface="Plantagenet Cherokee"/>
-        <a:font script="Yiii" typeface="Microsoft Yi Baiti"/>
-        <a:font script="Tibt" typeface="Microsoft Himalaya"/>
-        <a:font script="Thaa" typeface="MV Boli"/>
-        <a:font script="Deva" typeface="Mangal"/>
-        <a:font script="Telu" typeface="Gautami"/>
-        <a:font script="Taml" typeface="Latha"/>
-        <a:font script="Syrc" typeface="Estrangelo Edessa"/>
-        <a:font script="Orya" typeface="Kalinga"/>
-        <a:font script="Mlym" typeface="Kartika"/>
-        <a:font script="Laoo" typeface="DokChampa"/>
-        <a:font script="Sinh" typeface="Iskoola Pota"/>
-        <a:font script="Mong" typeface="Mongolian Baiti"/>
-        <a:font script="Viet" typeface="Arial"/>
-        <a:font script="Uigh" typeface="Microsoft Uighur"/>
-        <a:font script="Geor" typeface="Sylfaen"/>
-      </a:minorFont>
-    </a:fontScheme>
-    <a:fmtScheme name="Office">
-      <a:fillStyleLst>
-        <a:solidFill>
-          <a:schemeClr val="phClr"/>
-        </a:solidFill>
-        <a:gradFill rotWithShape="1">
-          <a:gsLst>
-            <a:gs pos="0">
-              <a:schemeClr val="phClr">
-                <a:tint val="50000"/>
-                <a:satMod val="300000"/>
-              </a:schemeClr>
-            </a:gs>
-            <a:gs pos="35000">
-              <a:schemeClr val="phClr">
-                <a:tint val="37000"/>
-                <a:satMod val="300000"/>
-              </a:schemeClr>
-            </a:gs>
-            <a:gs pos="100000">
-              <a:schemeClr val="phClr">
-                <a:tint val="15000"/>
-                <a:satMod val="350000"/>
-              </a:schemeClr>
-            </a:gs>
-          </a:gsLst>
-          <a:lin ang="16200000" scaled="1"/>
-        </a:gradFill>
-        <a:gradFill rotWithShape="1">
-          <a:gsLst>
-            <a:gs pos="0">
-              <a:schemeClr val="phClr">
-                <a:tint val="100000"/>
-                <a:shade val="100000"/>
-                <a:satMod val="130000"/>
-              </a:schemeClr>
-            </a:gs>
-            <a:gs pos="100000">
-              <a:schemeClr val="phClr">
-                <a:tint val="50000"/>
-                <a:shade val="100000"/>
-                <a:satMod val="350000"/>
-              </a:schemeClr>
-            </a:gs>
-          </a:gsLst>
-          <a:lin ang="16200000" scaled="0"/>
-        </a:gradFill>
-      </a:fillStyleLst>
-      <a:lnStyleLst>
-        <a:ln w="9525" cap="flat" cmpd="sng" algn="ctr">
-          <a:solidFill>
-            <a:schemeClr val="phClr">
-              <a:shade val="95000"/>
-              <a:satMod val="105000"/>
-            </a:schemeClr>
-          </a:solidFill>
-          <a:prstDash val="solid"/>
-        </a:ln>
-        <a:ln w="25400" cap="flat" cmpd="sng" algn="ctr">
-          <a:solidFill>
-            <a:schemeClr val="phClr"/>
-          </a:solidFill>
-          <a:prstDash val="solid"/>
-        </a:ln>
-        <a:ln w="38100" cap="flat" cmpd="sng" algn="ctr">
-          <a:solidFill>
-            <a:schemeClr val="phClr"/>
-          </a:solidFill>
-          <a:prstDash val="solid"/>
-        </a:ln>
-      </a:lnStyleLst>
-      <a:effectStyleLst>
-        <a:effectStyle>
-          <a:effectLst>
-            <a:outerShdw blurRad="40000" dist="20000" dir="5400000" rotWithShape="0">
-              <a:srgbClr val="000000">
-                <a:alpha val="38000"/>
-              </a:srgbClr>
-            </a:outerShdw>
-          </a:effectLst>
-        </a:effectStyle>
-        <a:effectStyle>
-          <a:effectLst>
-            <a:outerShdw blurRad="40000" dist="23000" dir="5400000" rotWithShape="0">
-              <a:srgbClr val="000000">
-                <a:alpha val="35000"/>
-              </a:srgbClr>
-            </a:outerShdw>
-          </a:effectLst>
-        </a:effectStyle>
-        <a:effectStyle>
-          <a:effectLst>
-            <a:outerShdw blurRad="40000" dist="23000" dir="5400000" rotWithShape="0">
-              <a:srgbClr val="000000">
-                <a:alpha val="35000"/>
-              </a:srgbClr>
-            </a:outerShdw>
-          </a:effectLst>
-          <a:scene3d>
-            <a:camera prst="orthographicFront">
-              <a:rot lat="0" lon="0" rev="0"/>
-            </a:camera>
-            <a:lightRig rig="threePt" dir="t">
-              <a:rot lat="0" lon="0" rev="1200000"/>
-            </a:lightRig>
-          </a:scene3d>
-          <a:sp3d>
-            <a:bevelT w="63500" h="25400"/>
-          </a:sp3d>
-        </a:effectStyle>
-      </a:effectStyleLst>
-      <a:bgFillStyleLst>
-        <a:solidFill>
-          <a:schemeClr val="phClr"/>
-        </a:solidFill>
-        <a:gradFill rotWithShape="1">
-          <a:gsLst>
-            <a:gs pos="0">
-              <a:schemeClr val="phClr">
-                <a:tint val="40000"/>
-                <a:satMod val="350000"/>
-              </a:schemeClr>
-            </a:gs>
-            <a:gs pos="40000">
-              <a:schemeClr val="phClr">
-                <a:tint val="45000"/>
-                <a:shade val="99000"/>
-                <a:satMod val="350000"/>
-              </a:schemeClr>
-            </a:gs>
-            <a:gs pos="100000">
-              <a:schemeClr val="phClr">
-                <a:shade val="20000"/>
-                <a:satMod val="255000"/>
-              </a:schemeClr>
-            </a:gs>
-          </a:gsLst>
-          <a:path path="circle">
-            <a:fillToRect l="50000" t="-80000" r="50000" b="180000"/>
-          </a:path>
-        </a:gradFill>
-        <a:gradFill rotWithShape="1">
-          <a:gsLst>
-            <a:gs pos="0">
-              <a:schemeClr val="phClr">
-                <a:tint val="80000"/>
-                <a:satMod val="300000"/>
-              </a:schemeClr>
-            </a:gs>
-            <a:gs pos="100000">
-              <a:schemeClr val="phClr">
-                <a:shade val="30000"/>
-                <a:satMod val="200000"/>
-              </a:schemeClr>
-            </a:gs>
-          </a:gsLst>
-          <a:path path="circle">
-            <a:fillToRect l="50000" t="50000" r="50000" b="50000"/>
-          </a:path>
-        </a:gradFill>
-      </a:bgFillStyleLst>
-    </a:fmtScheme>
-  </a:themeElements>
-</a:theme>
 </file>
</xml_diff>

<commit_message>
edited some of the slides to read better
</commit_message>
<xml_diff>
--- a/Predicting the Presence of Cancer in Breast Cancer Cells.pptx
+++ b/Predicting the Presence of Cancer in Breast Cancer Cells.pptx
@@ -10741,7 +10741,7 @@
         </p:spPr>
         <p:txBody>
           <a:bodyPr anchorCtr="0" anchor="t" bIns="91425" lIns="91425" spcFirstLastPara="1" rIns="91425" wrap="square" tIns="91425">
-            <a:normAutofit lnSpcReduction="10000"/>
+            <a:normAutofit lnSpcReduction="20000"/>
           </a:bodyPr>
           <a:lstStyle/>
           <a:p>
@@ -10755,10 +10755,10 @@
               <a:buNone/>
             </a:pPr>
             <a:r>
-              <a:rPr lang="en"/>
+              <a:rPr b="1" lang="en" sz="1500"/>
               <a:t>Machine Learning Model: Google Colab - Python, Pandas, PySpark, and Matplot</a:t>
             </a:r>
-            <a:endParaRPr/>
+            <a:endParaRPr b="1" sz="1500"/>
           </a:p>
           <a:p>
             <a:pPr indent="457200" lvl="0" marL="0" rtl="0" algn="l">
@@ -10787,14 +10787,14 @@
               <a:buNone/>
             </a:pPr>
             <a:r>
-              <a:rPr lang="en"/>
+              <a:rPr b="1" lang="en" sz="1500"/>
               <a:t>DataBase: AWS - RDS and S3 &amp; </a:t>
             </a:r>
             <a:r>
-              <a:rPr lang="en"/>
+              <a:rPr b="1" lang="en" sz="1500"/>
               <a:t>Postgres</a:t>
             </a:r>
-            <a:endParaRPr/>
+            <a:endParaRPr b="1" sz="1500"/>
           </a:p>
           <a:p>
             <a:pPr indent="0" lvl="0" marL="0" rtl="0" algn="l">
@@ -10839,10 +10839,10 @@
               <a:buNone/>
             </a:pPr>
             <a:r>
-              <a:rPr lang="en"/>
+              <a:rPr b="1" lang="en" sz="1500"/>
               <a:t>Interactive Visualization: Tableau</a:t>
             </a:r>
-            <a:endParaRPr/>
+            <a:endParaRPr b="1" sz="1500"/>
           </a:p>
           <a:p>
             <a:pPr indent="0" lvl="0" marL="0" rtl="0" algn="l">
@@ -13640,18 +13640,18 @@
               <a:buNone/>
             </a:pPr>
             <a:r>
-              <a:rPr lang="en"/>
+              <a:rPr lang="en" sz="2622"/>
               <a:t>What we learned from our </a:t>
             </a:r>
             <a:r>
-              <a:rPr lang="en"/>
+              <a:rPr lang="en" sz="2622"/>
               <a:t>Machine</a:t>
             </a:r>
             <a:r>
-              <a:rPr lang="en"/>
+              <a:rPr lang="en" sz="2622"/>
               <a:t> Learning Model…</a:t>
             </a:r>
-            <a:endParaRPr/>
+            <a:endParaRPr sz="2622"/>
           </a:p>
         </p:txBody>
       </p:sp>
@@ -13688,21 +13688,21 @@
               <a:buNone/>
             </a:pPr>
             <a:r>
-              <a:rPr lang="en"/>
+              <a:rPr lang="en" sz="1500"/>
               <a:t>We ran both a Linear and </a:t>
             </a:r>
             <a:r>
-              <a:rPr lang="en"/>
+              <a:rPr lang="en" sz="1500"/>
               <a:t>Logistic</a:t>
             </a:r>
             <a:r>
-              <a:rPr lang="en"/>
+              <a:rPr lang="en" sz="1500"/>
               <a:t> Regression Models to determine which was better for predicting cancer based off the list of features provided.</a:t>
             </a:r>
-            <a:endParaRPr/>
+            <a:endParaRPr sz="1500"/>
           </a:p>
           <a:p>
-            <a:pPr indent="0" lvl="0" marL="0" rtl="0" algn="l">
+            <a:pPr indent="0" lvl="0" marL="457200" marR="917728" rtl="0" algn="l">
               <a:spcBef>
                 <a:spcPts val="1200"/>
               </a:spcBef>
@@ -13712,21 +13712,29 @@
               <a:buNone/>
             </a:pPr>
             <a:r>
-              <a:rPr lang="en"/>
+              <a:rPr lang="en" sz="1500"/>
               <a:t>For the Linear Regression, we </a:t>
             </a:r>
             <a:r>
-              <a:rPr lang="en"/>
+              <a:rPr lang="en" sz="1500"/>
               <a:t>achieved</a:t>
             </a:r>
             <a:r>
-              <a:rPr lang="en"/>
-              <a:t> an 84.27% accuracy score which is considered acceptable.</a:t>
+              <a:rPr lang="en" sz="1500"/>
+              <a:t> an </a:t>
             </a:r>
-            <a:endParaRPr/>
+            <a:r>
+              <a:rPr b="1" lang="en" sz="1500"/>
+              <a:t>84.27%</a:t>
+            </a:r>
+            <a:r>
+              <a:rPr lang="en" sz="1500"/>
+              <a:t> accuracy score which is considered acceptable.</a:t>
+            </a:r>
+            <a:endParaRPr sz="1500"/>
           </a:p>
           <a:p>
-            <a:pPr indent="0" lvl="0" marL="0" rtl="0" algn="l">
+            <a:pPr indent="0" lvl="0" marL="457200" marR="917728" rtl="0" algn="l">
               <a:spcBef>
                 <a:spcPts val="1200"/>
               </a:spcBef>
@@ -13736,26 +13744,34 @@
               <a:buNone/>
             </a:pPr>
             <a:r>
-              <a:rPr lang="en"/>
+              <a:rPr lang="en" sz="1500"/>
               <a:t>For Logistic Regression, we </a:t>
             </a:r>
             <a:r>
-              <a:rPr lang="en"/>
+              <a:rPr lang="en" sz="1500"/>
               <a:t>received</a:t>
             </a:r>
             <a:r>
-              <a:rPr lang="en"/>
-              <a:t> a 97.09% accuracy score meaning that a Logistic Regression is a very reliable model to use to predict </a:t>
+              <a:rPr lang="en" sz="1500"/>
+              <a:t> a </a:t>
             </a:r>
             <a:r>
-              <a:rPr lang="en"/>
+              <a:rPr b="1" lang="en" sz="1500"/>
+              <a:t>97.09%</a:t>
+            </a:r>
+            <a:r>
+              <a:rPr lang="en" sz="1500"/>
+              <a:t> accuracy score meaning that a Logistic Regression is a very reliable model to use to predict </a:t>
+            </a:r>
+            <a:r>
+              <a:rPr lang="en" sz="1500"/>
               <a:t>whether</a:t>
             </a:r>
             <a:r>
-              <a:rPr lang="en"/>
+              <a:rPr lang="en" sz="1500"/>
               <a:t> someone has cancer based off the list of features we have provided the model.</a:t>
             </a:r>
-            <a:endParaRPr/>
+            <a:endParaRPr sz="1500"/>
           </a:p>
         </p:txBody>
       </p:sp>

</xml_diff>

<commit_message>
added new slides and assigned slides
</commit_message>
<xml_diff>
--- a/Predicting the Presence of Cancer in Breast Cancer Cells.pptx
+++ b/Predicting the Presence of Cancer in Breast Cancer Cells.pptx
@@ -20,30 +20,34 @@
     <p:sldId id="265" r:id="rId15"/>
     <p:sldId id="266" r:id="rId16"/>
     <p:sldId id="267" r:id="rId17"/>
+    <p:sldId id="268" r:id="rId18"/>
+    <p:sldId id="269" r:id="rId19"/>
+    <p:sldId id="270" r:id="rId20"/>
+    <p:sldId id="271" r:id="rId21"/>
   </p:sldIdLst>
   <p:sldSz cy="5143500" cx="9144000"/>
   <p:notesSz cx="6858000" cy="9144000"/>
   <p:embeddedFontLst>
     <p:embeddedFont>
       <p:font typeface="Roboto"/>
-      <p:regular r:id="rId18"/>
-      <p:bold r:id="rId19"/>
-      <p:italic r:id="rId20"/>
-      <p:boldItalic r:id="rId21"/>
-    </p:embeddedFont>
-    <p:embeddedFont>
-      <p:font typeface="Montserrat"/>
       <p:regular r:id="rId22"/>
       <p:bold r:id="rId23"/>
       <p:italic r:id="rId24"/>
       <p:boldItalic r:id="rId25"/>
     </p:embeddedFont>
     <p:embeddedFont>
-      <p:font typeface="Lato"/>
+      <p:font typeface="Montserrat"/>
       <p:regular r:id="rId26"/>
       <p:bold r:id="rId27"/>
       <p:italic r:id="rId28"/>
       <p:boldItalic r:id="rId29"/>
+    </p:embeddedFont>
+    <p:embeddedFont>
+      <p:font typeface="Lato"/>
+      <p:regular r:id="rId30"/>
+      <p:bold r:id="rId31"/>
+      <p:italic r:id="rId32"/>
+      <p:boldItalic r:id="rId33"/>
     </p:embeddedFont>
   </p:embeddedFontLst>
   <p:defaultTextStyle>
@@ -805,7 +809,8 @@
               <a:buNone/>
             </a:pPr>
             <a:r>
-              <a:t/>
+              <a:rPr lang="en"/>
+              <a:t>MacKenzie</a:t>
             </a:r>
             <a:endParaRPr/>
           </a:p>
@@ -824,7 +829,7 @@
   <p:cSld>
     <p:spTree>
       <p:nvGrpSpPr>
-        <p:cNvPr id="213" name="Shape 213"/>
+        <p:cNvPr id="214" name="Shape 214"/>
         <p:cNvGrpSpPr/>
         <p:nvPr/>
       </p:nvGrpSpPr>
@@ -838,7 +843,7 @@
       </p:grpSpPr>
       <p:sp>
         <p:nvSpPr>
-          <p:cNvPr id="214" name="Google Shape;214;g12d9ec015e5_0_5:notes"/>
+          <p:cNvPr id="215" name="Google Shape;215;g12e5ee9067f_0_2:notes"/>
           <p:cNvSpPr/>
           <p:nvPr>
             <p:ph idx="2" type="sldImg"/>
@@ -873,7 +878,7 @@
       </p:sp>
       <p:sp>
         <p:nvSpPr>
-          <p:cNvPr id="215" name="Google Shape;215;g12d9ec015e5_0_5:notes"/>
+          <p:cNvPr id="216" name="Google Shape;216;g12e5ee9067f_0_2:notes"/>
           <p:cNvSpPr txBox="1"/>
           <p:nvPr>
             <p:ph idx="1" type="body"/>
@@ -905,62 +910,7 @@
             </a:pPr>
             <a:r>
               <a:rPr lang="en"/>
-              <a:t>Thinking about it simply, we know that cancer cells are often characterized by its size so we decided to drop the radius, perimeter, and area features from our data.</a:t>
-            </a:r>
-            <a:endParaRPr/>
-          </a:p>
-          <a:p>
-            <a:pPr indent="0" lvl="0" marL="0" rtl="0" algn="l">
-              <a:spcBef>
-                <a:spcPts val="0"/>
-              </a:spcBef>
-              <a:spcAft>
-                <a:spcPts val="0"/>
-              </a:spcAft>
-              <a:buNone/>
-            </a:pPr>
-            <a:r>
-              <a:rPr lang="en"/>
-              <a:t>From there, we ran the </a:t>
-            </a:r>
-            <a:r>
-              <a:rPr lang="en"/>
-              <a:t>logistic</a:t>
-            </a:r>
-            <a:r>
-              <a:rPr lang="en"/>
-              <a:t> model again to see if there was any change in the outcomes.</a:t>
-            </a:r>
-            <a:endParaRPr/>
-          </a:p>
-          <a:p>
-            <a:pPr indent="0" lvl="0" marL="0" rtl="0" algn="l">
-              <a:spcBef>
-                <a:spcPts val="0"/>
-              </a:spcBef>
-              <a:spcAft>
-                <a:spcPts val="0"/>
-              </a:spcAft>
-              <a:buNone/>
-            </a:pPr>
-            <a:r>
-              <a:rPr lang="en"/>
-              <a:t>T</a:t>
-            </a:r>
-            <a:endParaRPr/>
-          </a:p>
-          <a:p>
-            <a:pPr indent="0" lvl="0" marL="0" rtl="0" algn="l">
-              <a:spcBef>
-                <a:spcPts val="0"/>
-              </a:spcBef>
-              <a:spcAft>
-                <a:spcPts val="0"/>
-              </a:spcAft>
-              <a:buNone/>
-            </a:pPr>
-            <a:r>
-              <a:t/>
+              <a:t>Kenny</a:t>
             </a:r>
             <a:endParaRPr/>
           </a:p>
@@ -979,7 +929,7 @@
   <p:cSld>
     <p:spTree>
       <p:nvGrpSpPr>
-        <p:cNvPr id="219" name="Shape 219"/>
+        <p:cNvPr id="220" name="Shape 220"/>
         <p:cNvGrpSpPr/>
         <p:nvPr/>
       </p:nvGrpSpPr>
@@ -993,7 +943,7 @@
       </p:grpSpPr>
       <p:sp>
         <p:nvSpPr>
-          <p:cNvPr id="220" name="Google Shape;220;g12d9ec015e5_0_10:notes"/>
+          <p:cNvPr id="221" name="Google Shape;221;g12cae811305_0_44:notes"/>
           <p:cNvSpPr/>
           <p:nvPr>
             <p:ph idx="2" type="sldImg"/>
@@ -1028,7 +978,7 @@
       </p:sp>
       <p:sp>
         <p:nvSpPr>
-          <p:cNvPr id="221" name="Google Shape;221;g12d9ec015e5_0_10:notes"/>
+          <p:cNvPr id="222" name="Google Shape;222;g12cae811305_0_44:notes"/>
           <p:cNvSpPr txBox="1"/>
           <p:nvPr>
             <p:ph idx="1" type="body"/>
@@ -1056,26 +1006,13 @@
               <a:spcAft>
                 <a:spcPts val="0"/>
               </a:spcAft>
-              <a:buClr>
-                <a:schemeClr val="dk1"/>
-              </a:buClr>
-              <a:buSzPts val="1100"/>
-              <a:buFont typeface="Arial"/>
-              <a:buNone/>
-            </a:pPr>
-            <a:r>
-              <a:rPr lang="en">
-                <a:solidFill>
-                  <a:schemeClr val="dk1"/>
-                </a:solidFill>
-              </a:rPr>
-              <a:t>After running the new regression, we achieved an accuracy score of 93% which is only 4 points less than the previous regression. This indicated to us that size was not as important as a factor in predicting whether the patient has a malignant or benign tumor. </a:t>
-            </a:r>
-            <a:endParaRPr>
-              <a:solidFill>
-                <a:schemeClr val="dk1"/>
-              </a:solidFill>
-            </a:endParaRPr>
+              <a:buNone/>
+            </a:pPr>
+            <a:r>
+              <a:rPr lang="en"/>
+              <a:t>Kenny</a:t>
+            </a:r>
+            <a:endParaRPr/>
           </a:p>
           <a:p>
             <a:pPr indent="0" lvl="0" marL="0" rtl="0" algn="l">
@@ -1085,26 +1022,12 @@
               <a:spcAft>
                 <a:spcPts val="0"/>
               </a:spcAft>
-              <a:buClr>
-                <a:schemeClr val="dk1"/>
-              </a:buClr>
-              <a:buSzPts val="1100"/>
-              <a:buFont typeface="Arial"/>
-              <a:buNone/>
-            </a:pPr>
-            <a:r>
-              <a:rPr lang="en">
-                <a:solidFill>
-                  <a:schemeClr val="dk1"/>
-                </a:solidFill>
-              </a:rPr>
-              <a:t>There are other factors in the dataset that are significant indicators of cancer.</a:t>
-            </a:r>
-            <a:endParaRPr>
-              <a:solidFill>
-                <a:schemeClr val="dk1"/>
-              </a:solidFill>
-            </a:endParaRPr>
+              <a:buNone/>
+            </a:pPr>
+            <a:r>
+              <a:t/>
+            </a:r>
+            <a:endParaRPr/>
           </a:p>
           <a:p>
             <a:pPr indent="0" lvl="0" marL="0" rtl="0" algn="l">
@@ -1114,26 +1037,52 @@
               <a:spcAft>
                 <a:spcPts val="0"/>
               </a:spcAft>
-              <a:buClr>
-                <a:schemeClr val="dk1"/>
-              </a:buClr>
-              <a:buSzPts val="1100"/>
-              <a:buFont typeface="Arial"/>
-              <a:buNone/>
-            </a:pPr>
-            <a:r>
-              <a:rPr lang="en">
-                <a:solidFill>
-                  <a:schemeClr val="dk1"/>
-                </a:solidFill>
-              </a:rPr>
-              <a:t>A more in depth analysis would need to conducted to determine if using the majority of the features lead to the model being so accurate or if there just a few that are significant indicators of cancer.</a:t>
-            </a:r>
-            <a:endParaRPr>
-              <a:solidFill>
-                <a:schemeClr val="dk1"/>
-              </a:solidFill>
-            </a:endParaRPr>
+              <a:buNone/>
+            </a:pPr>
+            <a:r>
+              <a:rPr lang="en"/>
+              <a:t>Read slide</a:t>
+            </a:r>
+            <a:endParaRPr/>
+          </a:p>
+          <a:p>
+            <a:pPr indent="0" lvl="0" marL="0" rtl="0" algn="l">
+              <a:spcBef>
+                <a:spcPts val="0"/>
+              </a:spcBef>
+              <a:spcAft>
+                <a:spcPts val="0"/>
+              </a:spcAft>
+              <a:buNone/>
+            </a:pPr>
+            <a:r>
+              <a:t/>
+            </a:r>
+            <a:endParaRPr/>
+          </a:p>
+          <a:p>
+            <a:pPr indent="0" lvl="0" marL="0" rtl="0" algn="l">
+              <a:spcBef>
+                <a:spcPts val="0"/>
+              </a:spcBef>
+              <a:spcAft>
+                <a:spcPts val="0"/>
+              </a:spcAft>
+              <a:buNone/>
+            </a:pPr>
+            <a:r>
+              <a:rPr lang="en"/>
+              <a:t>Unsure why our accuracy score for the </a:t>
+            </a:r>
+            <a:r>
+              <a:rPr lang="en"/>
+              <a:t>logistic</a:t>
+            </a:r>
+            <a:r>
+              <a:rPr lang="en"/>
+              <a:t> regression accuracy score was so high, we put our heads back together to try and determine what exactly in our data was leading our model to be so accurate.</a:t>
+            </a:r>
+            <a:endParaRPr/>
           </a:p>
         </p:txBody>
       </p:sp>
@@ -1150,7 +1099,7 @@
   <p:cSld>
     <p:spTree>
       <p:nvGrpSpPr>
-        <p:cNvPr id="225" name="Shape 225"/>
+        <p:cNvPr id="226" name="Shape 226"/>
         <p:cNvGrpSpPr/>
         <p:nvPr/>
       </p:nvGrpSpPr>
@@ -1164,7 +1113,7 @@
       </p:grpSpPr>
       <p:sp>
         <p:nvSpPr>
-          <p:cNvPr id="226" name="Google Shape;226;g12cae811305_0_49:notes"/>
+          <p:cNvPr id="227" name="Google Shape;227;g12d9ec015e5_0_5:notes"/>
           <p:cNvSpPr/>
           <p:nvPr>
             <p:ph idx="2" type="sldImg"/>
@@ -1199,7 +1148,7 @@
       </p:sp>
       <p:sp>
         <p:nvSpPr>
-          <p:cNvPr id="227" name="Google Shape;227;g12cae811305_0_49:notes"/>
+          <p:cNvPr id="228" name="Google Shape;228;g12d9ec015e5_0_5:notes"/>
           <p:cNvSpPr txBox="1"/>
           <p:nvPr>
             <p:ph idx="1" type="body"/>
@@ -1231,116 +1180,724 @@
             </a:pPr>
             <a:r>
               <a:rPr lang="en"/>
-              <a:t>Machine Learning Model:</a:t>
+              <a:t>David</a:t>
             </a:r>
             <a:endParaRPr/>
           </a:p>
           <a:p>
-            <a:pPr indent="-298450" lvl="0" marL="457200" rtl="0" algn="l">
-              <a:spcBef>
-                <a:spcPts val="0"/>
-              </a:spcBef>
-              <a:spcAft>
-                <a:spcPts val="0"/>
-              </a:spcAft>
+            <a:pPr indent="0" lvl="0" marL="0" rtl="0" algn="l">
+              <a:spcBef>
+                <a:spcPts val="0"/>
+              </a:spcBef>
+              <a:spcAft>
+                <a:spcPts val="0"/>
+              </a:spcAft>
+              <a:buNone/>
+            </a:pPr>
+            <a:r>
+              <a:t/>
+            </a:r>
+            <a:endParaRPr/>
+          </a:p>
+          <a:p>
+            <a:pPr indent="0" lvl="0" marL="0" rtl="0" algn="l">
+              <a:spcBef>
+                <a:spcPts val="0"/>
+              </a:spcBef>
+              <a:spcAft>
+                <a:spcPts val="0"/>
+              </a:spcAft>
+              <a:buNone/>
+            </a:pPr>
+            <a:r>
+              <a:rPr lang="en"/>
+              <a:t>Thinking about it simply, we know that cancer cells are often characterized by its size so we decided to drop the radius, perimeter, and area features from our data.</a:t>
+            </a:r>
+            <a:endParaRPr/>
+          </a:p>
+          <a:p>
+            <a:pPr indent="0" lvl="0" marL="0" rtl="0" algn="l">
+              <a:spcBef>
+                <a:spcPts val="0"/>
+              </a:spcBef>
+              <a:spcAft>
+                <a:spcPts val="0"/>
+              </a:spcAft>
+              <a:buNone/>
+            </a:pPr>
+            <a:r>
+              <a:rPr lang="en"/>
+              <a:t>To double check our train of thought, we </a:t>
+            </a:r>
+            <a:r>
+              <a:rPr lang="en"/>
+              <a:t>referred</a:t>
+            </a:r>
+            <a:r>
+              <a:rPr lang="en"/>
+              <a:t> back to the heat map to see if there were strong </a:t>
+            </a:r>
+            <a:r>
+              <a:rPr lang="en"/>
+              <a:t>correlations</a:t>
+            </a:r>
+            <a:r>
+              <a:rPr lang="en"/>
+              <a:t> between these size features</a:t>
+            </a:r>
+            <a:endParaRPr/>
+          </a:p>
+          <a:p>
+            <a:pPr indent="0" lvl="0" marL="0" rtl="0" algn="l">
+              <a:spcBef>
+                <a:spcPts val="0"/>
+              </a:spcBef>
+              <a:spcAft>
+                <a:spcPts val="0"/>
+              </a:spcAft>
+              <a:buNone/>
+            </a:pPr>
+            <a:r>
+              <a:rPr lang="en"/>
+              <a:t>From there, we ran the </a:t>
+            </a:r>
+            <a:r>
+              <a:rPr lang="en"/>
+              <a:t>logistic</a:t>
+            </a:r>
+            <a:r>
+              <a:rPr lang="en"/>
+              <a:t> model again to see if there was any change in the outcomes.</a:t>
+            </a:r>
+            <a:endParaRPr/>
+          </a:p>
+          <a:p>
+            <a:pPr indent="0" lvl="0" marL="0" rtl="0" algn="l">
+              <a:spcBef>
+                <a:spcPts val="0"/>
+              </a:spcBef>
+              <a:spcAft>
+                <a:spcPts val="0"/>
+              </a:spcAft>
+              <a:buNone/>
+            </a:pPr>
+            <a:r>
+              <a:t/>
+            </a:r>
+            <a:endParaRPr/>
+          </a:p>
+        </p:txBody>
+      </p:sp>
+    </p:spTree>
+  </p:cSld>
+  <p:clrMapOvr>
+    <a:masterClrMapping/>
+  </p:clrMapOvr>
+</p:notes>
+</file>
+
+<file path=ppt/notesSlides/notesSlide13.xml><?xml version="1.0" encoding="utf-8"?>
+<p:notes xmlns:a="http://schemas.openxmlformats.org/drawingml/2006/main" xmlns:r="http://schemas.openxmlformats.org/officeDocument/2006/relationships" xmlns:mc="http://schemas.openxmlformats.org/markup-compatibility/2006" xmlns:mv="urn:schemas-microsoft-com:mac:vml" xmlns:p="http://schemas.openxmlformats.org/presentationml/2006/main" xmlns:c="http://schemas.openxmlformats.org/drawingml/2006/chart" xmlns:dgm="http://schemas.openxmlformats.org/drawingml/2006/diagram" xmlns:o="urn:schemas-microsoft-com:office:office" xmlns:v="urn:schemas-microsoft-com:vml" xmlns:pvml="urn:schemas-microsoft-com:office:powerpoint" xmlns:com="http://schemas.openxmlformats.org/drawingml/2006/compatibility" xmlns:p14="http://schemas.microsoft.com/office/powerpoint/2010/main" xmlns:p15="http://schemas.microsoft.com/office/powerpoint/2012/main" xmlns:ahyp="http://schemas.microsoft.com/office/drawing/2018/hyperlinkcolor" showMasterPhAnim="0" showMasterSp="0">
+  <p:cSld>
+    <p:spTree>
+      <p:nvGrpSpPr>
+        <p:cNvPr id="233" name="Shape 233"/>
+        <p:cNvGrpSpPr/>
+        <p:nvPr/>
+      </p:nvGrpSpPr>
+      <p:grpSpPr>
+        <a:xfrm>
+          <a:off x="0" y="0"/>
+          <a:ext cx="0" cy="0"/>
+          <a:chOff x="0" y="0"/>
+          <a:chExt cx="0" cy="0"/>
+        </a:xfrm>
+      </p:grpSpPr>
+      <p:sp>
+        <p:nvSpPr>
+          <p:cNvPr id="234" name="Google Shape;234;g12d9ec015e5_0_10:notes"/>
+          <p:cNvSpPr/>
+          <p:nvPr>
+            <p:ph idx="2" type="sldImg"/>
+          </p:nvPr>
+        </p:nvSpPr>
+        <p:spPr>
+          <a:xfrm>
+            <a:off x="381300" y="685800"/>
+            <a:ext cx="6096000" cy="3429000"/>
+          </a:xfrm>
+          <a:custGeom>
+            <a:rect b="b" l="l" r="r" t="t"/>
+            <a:pathLst>
+              <a:path extrusionOk="0" h="120000" w="120000">
+                <a:moveTo>
+                  <a:pt x="0" y="0"/>
+                </a:moveTo>
+                <a:lnTo>
+                  <a:pt x="120000" y="0"/>
+                </a:lnTo>
+                <a:lnTo>
+                  <a:pt x="120000" y="120000"/>
+                </a:lnTo>
+                <a:lnTo>
+                  <a:pt x="0" y="120000"/>
+                </a:lnTo>
+                <a:close/>
+              </a:path>
+            </a:pathLst>
+          </a:custGeom>
+        </p:spPr>
+      </p:sp>
+      <p:sp>
+        <p:nvSpPr>
+          <p:cNvPr id="235" name="Google Shape;235;g12d9ec015e5_0_10:notes"/>
+          <p:cNvSpPr txBox="1"/>
+          <p:nvPr>
+            <p:ph idx="1" type="body"/>
+          </p:nvPr>
+        </p:nvSpPr>
+        <p:spPr>
+          <a:xfrm>
+            <a:off x="685800" y="4343400"/>
+            <a:ext cx="5486400" cy="4114800"/>
+          </a:xfrm>
+          <a:prstGeom prst="rect">
+            <a:avLst/>
+          </a:prstGeom>
+        </p:spPr>
+        <p:txBody>
+          <a:bodyPr anchorCtr="0" anchor="t" bIns="91425" lIns="91425" spcFirstLastPara="1" rIns="91425" wrap="square" tIns="91425">
+            <a:noAutofit/>
+          </a:bodyPr>
+          <a:lstStyle/>
+          <a:p>
+            <a:pPr indent="0" lvl="0" marL="0" rtl="0" algn="l">
+              <a:spcBef>
+                <a:spcPts val="0"/>
+              </a:spcBef>
+              <a:spcAft>
+                <a:spcPts val="0"/>
+              </a:spcAft>
+              <a:buClr>
+                <a:schemeClr val="dk1"/>
+              </a:buClr>
               <a:buSzPts val="1100"/>
-              <a:buChar char="●"/>
-            </a:pPr>
-            <a:r>
-              <a:rPr lang="en"/>
-              <a:t>For our machine learning model, we used Google Colab to write all our code so we can share it amongst all the people in our group since it uses the Cloud to save all our work and it allows us to load packages with ease.</a:t>
+              <a:buFont typeface="Arial"/>
+              <a:buNone/>
+            </a:pPr>
+            <a:r>
+              <a:rPr lang="en">
+                <a:solidFill>
+                  <a:schemeClr val="dk1"/>
+                </a:solidFill>
+              </a:rPr>
+              <a:t>David</a:t>
+            </a:r>
+            <a:endParaRPr>
+              <a:solidFill>
+                <a:schemeClr val="dk1"/>
+              </a:solidFill>
+            </a:endParaRPr>
+          </a:p>
+          <a:p>
+            <a:pPr indent="0" lvl="0" marL="0" rtl="0" algn="l">
+              <a:spcBef>
+                <a:spcPts val="0"/>
+              </a:spcBef>
+              <a:spcAft>
+                <a:spcPts val="0"/>
+              </a:spcAft>
+              <a:buClr>
+                <a:schemeClr val="dk1"/>
+              </a:buClr>
+              <a:buSzPts val="1100"/>
+              <a:buFont typeface="Arial"/>
+              <a:buNone/>
+            </a:pPr>
+            <a:r>
+              <a:t/>
+            </a:r>
+            <a:endParaRPr>
+              <a:solidFill>
+                <a:schemeClr val="dk1"/>
+              </a:solidFill>
+            </a:endParaRPr>
+          </a:p>
+          <a:p>
+            <a:pPr indent="0" lvl="0" marL="0" rtl="0" algn="l">
+              <a:spcBef>
+                <a:spcPts val="0"/>
+              </a:spcBef>
+              <a:spcAft>
+                <a:spcPts val="0"/>
+              </a:spcAft>
+              <a:buClr>
+                <a:schemeClr val="dk1"/>
+              </a:buClr>
+              <a:buSzPts val="1100"/>
+              <a:buFont typeface="Arial"/>
+              <a:buNone/>
+            </a:pPr>
+            <a:r>
+              <a:rPr lang="en">
+                <a:solidFill>
+                  <a:schemeClr val="dk1"/>
+                </a:solidFill>
+              </a:rPr>
+              <a:t>After running the new regression, we achieved an accuracy score of 93% which is only 4 points less than the previous regression. This indicated to us that size was not as important as a factor in predicting whether the patient has a malignant or benign tumor. </a:t>
+            </a:r>
+            <a:endParaRPr>
+              <a:solidFill>
+                <a:schemeClr val="dk1"/>
+              </a:solidFill>
+            </a:endParaRPr>
+          </a:p>
+          <a:p>
+            <a:pPr indent="0" lvl="0" marL="0" rtl="0" algn="l">
+              <a:spcBef>
+                <a:spcPts val="0"/>
+              </a:spcBef>
+              <a:spcAft>
+                <a:spcPts val="0"/>
+              </a:spcAft>
+              <a:buClr>
+                <a:schemeClr val="dk1"/>
+              </a:buClr>
+              <a:buSzPts val="1100"/>
+              <a:buFont typeface="Arial"/>
+              <a:buNone/>
+            </a:pPr>
+            <a:r>
+              <a:rPr lang="en">
+                <a:solidFill>
+                  <a:schemeClr val="dk1"/>
+                </a:solidFill>
+              </a:rPr>
+              <a:t>There are other factors in the dataset that are significant indicators of cancer.</a:t>
+            </a:r>
+            <a:endParaRPr>
+              <a:solidFill>
+                <a:schemeClr val="dk1"/>
+              </a:solidFill>
+            </a:endParaRPr>
+          </a:p>
+          <a:p>
+            <a:pPr indent="0" lvl="0" marL="0" rtl="0" algn="l">
+              <a:spcBef>
+                <a:spcPts val="0"/>
+              </a:spcBef>
+              <a:spcAft>
+                <a:spcPts val="0"/>
+              </a:spcAft>
+              <a:buClr>
+                <a:schemeClr val="dk1"/>
+              </a:buClr>
+              <a:buSzPts val="1100"/>
+              <a:buFont typeface="Arial"/>
+              <a:buNone/>
+            </a:pPr>
+            <a:r>
+              <a:rPr lang="en">
+                <a:solidFill>
+                  <a:schemeClr val="dk1"/>
+                </a:solidFill>
+              </a:rPr>
+              <a:t>A more in depth analysis would need to conducted to determine if using the majority of the features lead to the model being so accurate or if there just a few that are significant indicators of cancer.</a:t>
+            </a:r>
+            <a:endParaRPr>
+              <a:solidFill>
+                <a:schemeClr val="dk1"/>
+              </a:solidFill>
+            </a:endParaRPr>
+          </a:p>
+          <a:p>
+            <a:pPr indent="0" lvl="0" marL="0" rtl="0" algn="l">
+              <a:spcBef>
+                <a:spcPts val="0"/>
+              </a:spcBef>
+              <a:spcAft>
+                <a:spcPts val="0"/>
+              </a:spcAft>
+              <a:buClr>
+                <a:schemeClr val="dk1"/>
+              </a:buClr>
+              <a:buSzPts val="1100"/>
+              <a:buFont typeface="Arial"/>
+              <a:buNone/>
+            </a:pPr>
+            <a:r>
+              <a:t/>
+            </a:r>
+            <a:endParaRPr>
+              <a:solidFill>
+                <a:schemeClr val="dk1"/>
+              </a:solidFill>
+            </a:endParaRPr>
+          </a:p>
+          <a:p>
+            <a:pPr indent="0" lvl="0" marL="0" rtl="0" algn="l">
+              <a:spcBef>
+                <a:spcPts val="0"/>
+              </a:spcBef>
+              <a:spcAft>
+                <a:spcPts val="0"/>
+              </a:spcAft>
+              <a:buClr>
+                <a:schemeClr val="dk1"/>
+              </a:buClr>
+              <a:buSzPts val="1100"/>
+              <a:buFont typeface="Arial"/>
+              <a:buNone/>
+            </a:pPr>
+            <a:r>
+              <a:rPr lang="en">
+                <a:solidFill>
+                  <a:schemeClr val="dk1"/>
+                </a:solidFill>
+              </a:rPr>
+              <a:t>79%</a:t>
+            </a:r>
+            <a:endParaRPr>
+              <a:solidFill>
+                <a:schemeClr val="dk1"/>
+              </a:solidFill>
+            </a:endParaRPr>
+          </a:p>
+          <a:p>
+            <a:pPr indent="0" lvl="0" marL="0" rtl="0" algn="l">
+              <a:spcBef>
+                <a:spcPts val="0"/>
+              </a:spcBef>
+              <a:spcAft>
+                <a:spcPts val="0"/>
+              </a:spcAft>
+              <a:buClr>
+                <a:schemeClr val="dk1"/>
+              </a:buClr>
+              <a:buSzPts val="1100"/>
+              <a:buFont typeface="Arial"/>
+              <a:buNone/>
+            </a:pPr>
+            <a:r>
+              <a:t/>
+            </a:r>
+            <a:endParaRPr>
+              <a:solidFill>
+                <a:schemeClr val="dk1"/>
+              </a:solidFill>
+            </a:endParaRPr>
+          </a:p>
+          <a:p>
+            <a:pPr indent="0" lvl="0" marL="0" rtl="0" algn="l">
+              <a:spcBef>
+                <a:spcPts val="0"/>
+              </a:spcBef>
+              <a:spcAft>
+                <a:spcPts val="0"/>
+              </a:spcAft>
+              <a:buClr>
+                <a:schemeClr val="dk1"/>
+              </a:buClr>
+              <a:buSzPts val="1100"/>
+              <a:buFont typeface="Arial"/>
+              <a:buNone/>
+            </a:pPr>
+            <a:r>
+              <a:rPr lang="en">
+                <a:solidFill>
+                  <a:schemeClr val="dk1"/>
+                </a:solidFill>
+              </a:rPr>
+              <a:t>Size have linear correlation</a:t>
+            </a:r>
+            <a:endParaRPr>
+              <a:solidFill>
+                <a:schemeClr val="dk1"/>
+              </a:solidFill>
+            </a:endParaRPr>
+          </a:p>
+        </p:txBody>
+      </p:sp>
+    </p:spTree>
+  </p:cSld>
+  <p:clrMapOvr>
+    <a:masterClrMapping/>
+  </p:clrMapOvr>
+</p:notes>
+</file>
+
+<file path=ppt/notesSlides/notesSlide14.xml><?xml version="1.0" encoding="utf-8"?>
+<p:notes xmlns:a="http://schemas.openxmlformats.org/drawingml/2006/main" xmlns:r="http://schemas.openxmlformats.org/officeDocument/2006/relationships" xmlns:mc="http://schemas.openxmlformats.org/markup-compatibility/2006" xmlns:mv="urn:schemas-microsoft-com:mac:vml" xmlns:p="http://schemas.openxmlformats.org/presentationml/2006/main" xmlns:c="http://schemas.openxmlformats.org/drawingml/2006/chart" xmlns:dgm="http://schemas.openxmlformats.org/drawingml/2006/diagram" xmlns:o="urn:schemas-microsoft-com:office:office" xmlns:v="urn:schemas-microsoft-com:vml" xmlns:pvml="urn:schemas-microsoft-com:office:powerpoint" xmlns:com="http://schemas.openxmlformats.org/drawingml/2006/compatibility" xmlns:p14="http://schemas.microsoft.com/office/powerpoint/2010/main" xmlns:p15="http://schemas.microsoft.com/office/powerpoint/2012/main" xmlns:ahyp="http://schemas.microsoft.com/office/drawing/2018/hyperlinkcolor" showMasterPhAnim="0" showMasterSp="0">
+  <p:cSld>
+    <p:spTree>
+      <p:nvGrpSpPr>
+        <p:cNvPr id="239" name="Shape 239"/>
+        <p:cNvGrpSpPr/>
+        <p:nvPr/>
+      </p:nvGrpSpPr>
+      <p:grpSpPr>
+        <a:xfrm>
+          <a:off x="0" y="0"/>
+          <a:ext cx="0" cy="0"/>
+          <a:chOff x="0" y="0"/>
+          <a:chExt cx="0" cy="0"/>
+        </a:xfrm>
+      </p:grpSpPr>
+      <p:sp>
+        <p:nvSpPr>
+          <p:cNvPr id="240" name="Google Shape;240;g12e5ee9067f_0_24:notes"/>
+          <p:cNvSpPr/>
+          <p:nvPr>
+            <p:ph idx="2" type="sldImg"/>
+          </p:nvPr>
+        </p:nvSpPr>
+        <p:spPr>
+          <a:xfrm>
+            <a:off x="381300" y="685800"/>
+            <a:ext cx="6096000" cy="3429000"/>
+          </a:xfrm>
+          <a:custGeom>
+            <a:rect b="b" l="l" r="r" t="t"/>
+            <a:pathLst>
+              <a:path extrusionOk="0" h="120000" w="120000">
+                <a:moveTo>
+                  <a:pt x="0" y="0"/>
+                </a:moveTo>
+                <a:lnTo>
+                  <a:pt x="120000" y="0"/>
+                </a:lnTo>
+                <a:lnTo>
+                  <a:pt x="120000" y="120000"/>
+                </a:lnTo>
+                <a:lnTo>
+                  <a:pt x="0" y="120000"/>
+                </a:lnTo>
+                <a:close/>
+              </a:path>
+            </a:pathLst>
+          </a:custGeom>
+        </p:spPr>
+      </p:sp>
+      <p:sp>
+        <p:nvSpPr>
+          <p:cNvPr id="241" name="Google Shape;241;g12e5ee9067f_0_24:notes"/>
+          <p:cNvSpPr txBox="1"/>
+          <p:nvPr>
+            <p:ph idx="1" type="body"/>
+          </p:nvPr>
+        </p:nvSpPr>
+        <p:spPr>
+          <a:xfrm>
+            <a:off x="685800" y="4343400"/>
+            <a:ext cx="5486400" cy="4114800"/>
+          </a:xfrm>
+          <a:prstGeom prst="rect">
+            <a:avLst/>
+          </a:prstGeom>
+        </p:spPr>
+        <p:txBody>
+          <a:bodyPr anchorCtr="0" anchor="t" bIns="91425" lIns="91425" spcFirstLastPara="1" rIns="91425" wrap="square" tIns="91425">
+            <a:noAutofit/>
+          </a:bodyPr>
+          <a:lstStyle/>
+          <a:p>
+            <a:pPr indent="0" lvl="0" marL="0" rtl="0" algn="l">
+              <a:spcBef>
+                <a:spcPts val="0"/>
+              </a:spcBef>
+              <a:spcAft>
+                <a:spcPts val="0"/>
+              </a:spcAft>
+              <a:buNone/>
+            </a:pPr>
+            <a:r>
+              <a:t/>
             </a:r>
             <a:endParaRPr/>
           </a:p>
-          <a:p>
-            <a:pPr indent="-298450" lvl="1" marL="914400" rtl="0" algn="l">
-              <a:spcBef>
-                <a:spcPts val="0"/>
-              </a:spcBef>
-              <a:spcAft>
-                <a:spcPts val="0"/>
-              </a:spcAft>
-              <a:buSzPts val="1100"/>
-              <a:buChar char="○"/>
-            </a:pPr>
-            <a:r>
-              <a:rPr lang="en"/>
-              <a:t>Languages</a:t>
+        </p:txBody>
+      </p:sp>
+    </p:spTree>
+  </p:cSld>
+  <p:clrMapOvr>
+    <a:masterClrMapping/>
+  </p:clrMapOvr>
+</p:notes>
+</file>
+
+<file path=ppt/notesSlides/notesSlide15.xml><?xml version="1.0" encoding="utf-8"?>
+<p:notes xmlns:a="http://schemas.openxmlformats.org/drawingml/2006/main" xmlns:r="http://schemas.openxmlformats.org/officeDocument/2006/relationships" xmlns:mc="http://schemas.openxmlformats.org/markup-compatibility/2006" xmlns:mv="urn:schemas-microsoft-com:mac:vml" xmlns:p="http://schemas.openxmlformats.org/presentationml/2006/main" xmlns:c="http://schemas.openxmlformats.org/drawingml/2006/chart" xmlns:dgm="http://schemas.openxmlformats.org/drawingml/2006/diagram" xmlns:o="urn:schemas-microsoft-com:office:office" xmlns:v="urn:schemas-microsoft-com:vml" xmlns:pvml="urn:schemas-microsoft-com:office:powerpoint" xmlns:com="http://schemas.openxmlformats.org/drawingml/2006/compatibility" xmlns:p14="http://schemas.microsoft.com/office/powerpoint/2010/main" xmlns:p15="http://schemas.microsoft.com/office/powerpoint/2012/main" xmlns:ahyp="http://schemas.microsoft.com/office/drawing/2018/hyperlinkcolor" showMasterPhAnim="0" showMasterSp="0">
+  <p:cSld>
+    <p:spTree>
+      <p:nvGrpSpPr>
+        <p:cNvPr id="245" name="Shape 245"/>
+        <p:cNvGrpSpPr/>
+        <p:nvPr/>
+      </p:nvGrpSpPr>
+      <p:grpSpPr>
+        <a:xfrm>
+          <a:off x="0" y="0"/>
+          <a:ext cx="0" cy="0"/>
+          <a:chOff x="0" y="0"/>
+          <a:chExt cx="0" cy="0"/>
+        </a:xfrm>
+      </p:grpSpPr>
+      <p:sp>
+        <p:nvSpPr>
+          <p:cNvPr id="246" name="Google Shape;246;g12e5ee9067f_0_19:notes"/>
+          <p:cNvSpPr/>
+          <p:nvPr>
+            <p:ph idx="2" type="sldImg"/>
+          </p:nvPr>
+        </p:nvSpPr>
+        <p:spPr>
+          <a:xfrm>
+            <a:off x="381300" y="685800"/>
+            <a:ext cx="6096000" cy="3429000"/>
+          </a:xfrm>
+          <a:custGeom>
+            <a:rect b="b" l="l" r="r" t="t"/>
+            <a:pathLst>
+              <a:path extrusionOk="0" h="120000" w="120000">
+                <a:moveTo>
+                  <a:pt x="0" y="0"/>
+                </a:moveTo>
+                <a:lnTo>
+                  <a:pt x="120000" y="0"/>
+                </a:lnTo>
+                <a:lnTo>
+                  <a:pt x="120000" y="120000"/>
+                </a:lnTo>
+                <a:lnTo>
+                  <a:pt x="0" y="120000"/>
+                </a:lnTo>
+                <a:close/>
+              </a:path>
+            </a:pathLst>
+          </a:custGeom>
+        </p:spPr>
+      </p:sp>
+      <p:sp>
+        <p:nvSpPr>
+          <p:cNvPr id="247" name="Google Shape;247;g12e5ee9067f_0_19:notes"/>
+          <p:cNvSpPr txBox="1"/>
+          <p:nvPr>
+            <p:ph idx="1" type="body"/>
+          </p:nvPr>
+        </p:nvSpPr>
+        <p:spPr>
+          <a:xfrm>
+            <a:off x="685800" y="4343400"/>
+            <a:ext cx="5486400" cy="4114800"/>
+          </a:xfrm>
+          <a:prstGeom prst="rect">
+            <a:avLst/>
+          </a:prstGeom>
+        </p:spPr>
+        <p:txBody>
+          <a:bodyPr anchorCtr="0" anchor="t" bIns="91425" lIns="91425" spcFirstLastPara="1" rIns="91425" wrap="square" tIns="91425">
+            <a:noAutofit/>
+          </a:bodyPr>
+          <a:lstStyle/>
+          <a:p>
+            <a:pPr indent="0" lvl="0" marL="0" rtl="0" algn="l">
+              <a:spcBef>
+                <a:spcPts val="0"/>
+              </a:spcBef>
+              <a:spcAft>
+                <a:spcPts val="0"/>
+              </a:spcAft>
+              <a:buNone/>
+            </a:pPr>
+            <a:r>
+              <a:t/>
             </a:r>
             <a:endParaRPr/>
           </a:p>
-          <a:p>
-            <a:pPr indent="-298450" lvl="2" marL="1371600" rtl="0" algn="l">
-              <a:spcBef>
-                <a:spcPts val="0"/>
-              </a:spcBef>
-              <a:spcAft>
-                <a:spcPts val="0"/>
-              </a:spcAft>
-              <a:buSzPts val="1100"/>
-              <a:buChar char="■"/>
-            </a:pPr>
-            <a:r>
-              <a:rPr lang="en"/>
-              <a:t>To build our </a:t>
-            </a:r>
-            <a:r>
-              <a:rPr lang="en"/>
-              <a:t>machine learning model, we used the language Python. Within Python, we used Pandas, PySpark, and Matplotlib.</a:t>
-            </a:r>
-            <a:endParaRPr/>
-          </a:p>
-          <a:p>
-            <a:pPr indent="-298450" lvl="3" marL="1828800" rtl="0" algn="l">
-              <a:spcBef>
-                <a:spcPts val="0"/>
-              </a:spcBef>
-              <a:spcAft>
-                <a:spcPts val="0"/>
-              </a:spcAft>
-              <a:buSzPts val="1100"/>
-              <a:buChar char="●"/>
-            </a:pPr>
-            <a:r>
-              <a:rPr lang="en"/>
-              <a:t>Pandas allows us to load a CSV file with all the data we are trying to analyze directly into our notebook. From there we can create tables and dataframes with our data to conduct our analysis.</a:t>
-            </a:r>
-            <a:endParaRPr/>
-          </a:p>
-          <a:p>
-            <a:pPr indent="-298450" lvl="3" marL="1828800" rtl="0" algn="l">
-              <a:spcBef>
-                <a:spcPts val="0"/>
-              </a:spcBef>
-              <a:spcAft>
-                <a:spcPts val="0"/>
-              </a:spcAft>
-              <a:buSzPts val="1100"/>
-              <a:buChar char="●"/>
-            </a:pPr>
-            <a:r>
-              <a:rPr lang="en"/>
-              <a:t>PySpark allows us to load our data from Amazon Web Services into our notebook over the cloud. Similarly to Pandas, we were able to create schemas to visualize the data in table formatting.</a:t>
-            </a:r>
-            <a:endParaRPr/>
-          </a:p>
-          <a:p>
-            <a:pPr indent="-298450" lvl="3" marL="1828800" rtl="0" algn="l">
-              <a:spcBef>
-                <a:spcPts val="0"/>
-              </a:spcBef>
-              <a:spcAft>
-                <a:spcPts val="0"/>
-              </a:spcAft>
-              <a:buSzPts val="1100"/>
-              <a:buChar char="●"/>
-            </a:pPr>
-            <a:r>
-              <a:rPr lang="en"/>
-              <a:t>Matplotlib and Seaborn are programs that allowed us to create visualizations of our analysis so we could further comprehend what the data is telling us. The visual graphs and charts used in our presentation were created using these programs.</a:t>
-            </a:r>
-            <a:endParaRPr/>
-          </a:p>
+        </p:txBody>
+      </p:sp>
+    </p:spTree>
+  </p:cSld>
+  <p:clrMapOvr>
+    <a:masterClrMapping/>
+  </p:clrMapOvr>
+</p:notes>
+</file>
+
+<file path=ppt/notesSlides/notesSlide16.xml><?xml version="1.0" encoding="utf-8"?>
+<p:notes xmlns:a="http://schemas.openxmlformats.org/drawingml/2006/main" xmlns:r="http://schemas.openxmlformats.org/officeDocument/2006/relationships" xmlns:mc="http://schemas.openxmlformats.org/markup-compatibility/2006" xmlns:mv="urn:schemas-microsoft-com:mac:vml" xmlns:p="http://schemas.openxmlformats.org/presentationml/2006/main" xmlns:c="http://schemas.openxmlformats.org/drawingml/2006/chart" xmlns:dgm="http://schemas.openxmlformats.org/drawingml/2006/diagram" xmlns:o="urn:schemas-microsoft-com:office:office" xmlns:v="urn:schemas-microsoft-com:vml" xmlns:pvml="urn:schemas-microsoft-com:office:powerpoint" xmlns:com="http://schemas.openxmlformats.org/drawingml/2006/compatibility" xmlns:p14="http://schemas.microsoft.com/office/powerpoint/2010/main" xmlns:p15="http://schemas.microsoft.com/office/powerpoint/2012/main" xmlns:ahyp="http://schemas.microsoft.com/office/drawing/2018/hyperlinkcolor" showMasterPhAnim="0" showMasterSp="0">
+  <p:cSld>
+    <p:spTree>
+      <p:nvGrpSpPr>
+        <p:cNvPr id="251" name="Shape 251"/>
+        <p:cNvGrpSpPr/>
+        <p:nvPr/>
+      </p:nvGrpSpPr>
+      <p:grpSpPr>
+        <a:xfrm>
+          <a:off x="0" y="0"/>
+          <a:ext cx="0" cy="0"/>
+          <a:chOff x="0" y="0"/>
+          <a:chExt cx="0" cy="0"/>
+        </a:xfrm>
+      </p:grpSpPr>
+      <p:sp>
+        <p:nvSpPr>
+          <p:cNvPr id="252" name="Google Shape;252;g12e5ee9067f_0_14:notes"/>
+          <p:cNvSpPr/>
+          <p:nvPr>
+            <p:ph idx="2" type="sldImg"/>
+          </p:nvPr>
+        </p:nvSpPr>
+        <p:spPr>
+          <a:xfrm>
+            <a:off x="381300" y="685800"/>
+            <a:ext cx="6096000" cy="3429000"/>
+          </a:xfrm>
+          <a:custGeom>
+            <a:rect b="b" l="l" r="r" t="t"/>
+            <a:pathLst>
+              <a:path extrusionOk="0" h="120000" w="120000">
+                <a:moveTo>
+                  <a:pt x="0" y="0"/>
+                </a:moveTo>
+                <a:lnTo>
+                  <a:pt x="120000" y="0"/>
+                </a:lnTo>
+                <a:lnTo>
+                  <a:pt x="120000" y="120000"/>
+                </a:lnTo>
+                <a:lnTo>
+                  <a:pt x="0" y="120000"/>
+                </a:lnTo>
+                <a:close/>
+              </a:path>
+            </a:pathLst>
+          </a:custGeom>
+        </p:spPr>
+      </p:sp>
+      <p:sp>
+        <p:nvSpPr>
+          <p:cNvPr id="253" name="Google Shape;253;g12e5ee9067f_0_14:notes"/>
+          <p:cNvSpPr txBox="1"/>
+          <p:nvPr>
+            <p:ph idx="1" type="body"/>
+          </p:nvPr>
+        </p:nvSpPr>
+        <p:spPr>
+          <a:xfrm>
+            <a:off x="685800" y="4343400"/>
+            <a:ext cx="5486400" cy="4114800"/>
+          </a:xfrm>
+          <a:prstGeom prst="rect">
+            <a:avLst/>
+          </a:prstGeom>
+        </p:spPr>
+        <p:txBody>
+          <a:bodyPr anchorCtr="0" anchor="t" bIns="91425" lIns="91425" spcFirstLastPara="1" rIns="91425" wrap="square" tIns="91425">
+            <a:noAutofit/>
+          </a:bodyPr>
+          <a:lstStyle/>
           <a:p>
             <a:pPr indent="0" lvl="0" marL="0" rtl="0" algn="l">
               <a:spcBef>
@@ -1353,85 +1910,6 @@
             </a:pPr>
             <a:r>
               <a:t/>
-            </a:r>
-            <a:endParaRPr/>
-          </a:p>
-          <a:p>
-            <a:pPr indent="0" lvl="0" marL="0" rtl="0" algn="l">
-              <a:spcBef>
-                <a:spcPts val="0"/>
-              </a:spcBef>
-              <a:spcAft>
-                <a:spcPts val="0"/>
-              </a:spcAft>
-              <a:buNone/>
-            </a:pPr>
-            <a:r>
-              <a:rPr lang="en"/>
-              <a:t>DataBase:</a:t>
-            </a:r>
-            <a:endParaRPr/>
-          </a:p>
-          <a:p>
-            <a:pPr indent="0" lvl="0" marL="0" rtl="0" algn="l">
-              <a:spcBef>
-                <a:spcPts val="0"/>
-              </a:spcBef>
-              <a:spcAft>
-                <a:spcPts val="0"/>
-              </a:spcAft>
-              <a:buNone/>
-            </a:pPr>
-            <a:r>
-              <a:rPr lang="en"/>
-              <a:t>Read from slide</a:t>
-            </a:r>
-            <a:endParaRPr/>
-          </a:p>
-          <a:p>
-            <a:pPr indent="0" lvl="0" marL="0" rtl="0" algn="l">
-              <a:spcBef>
-                <a:spcPts val="0"/>
-              </a:spcBef>
-              <a:spcAft>
-                <a:spcPts val="0"/>
-              </a:spcAft>
-              <a:buNone/>
-            </a:pPr>
-            <a:r>
-              <a:t/>
-            </a:r>
-            <a:endParaRPr/>
-          </a:p>
-          <a:p>
-            <a:pPr indent="0" lvl="0" marL="0" rtl="0" algn="l">
-              <a:spcBef>
-                <a:spcPts val="0"/>
-              </a:spcBef>
-              <a:spcAft>
-                <a:spcPts val="0"/>
-              </a:spcAft>
-              <a:buNone/>
-            </a:pPr>
-            <a:r>
-              <a:rPr lang="en"/>
-              <a:t>Interactive Visualization:</a:t>
-            </a:r>
-            <a:endParaRPr/>
-          </a:p>
-          <a:p>
-            <a:pPr indent="0" lvl="0" marL="0" rtl="0" algn="l">
-              <a:spcBef>
-                <a:spcPts val="0"/>
-              </a:spcBef>
-              <a:spcAft>
-                <a:spcPts val="0"/>
-              </a:spcAft>
-              <a:buNone/>
-            </a:pPr>
-            <a:r>
-              <a:rPr lang="en"/>
-              <a:t>Read from slide</a:t>
             </a:r>
             <a:endParaRPr/>
           </a:p>
@@ -1531,6 +2009,37 @@
             </a:pPr>
             <a:r>
               <a:rPr lang="en"/>
+              <a:t>MacKenzie</a:t>
+            </a:r>
+            <a:endParaRPr/>
+          </a:p>
+          <a:p>
+            <a:pPr indent="0" lvl="0" marL="0" rtl="0" algn="l">
+              <a:spcBef>
+                <a:spcPts val="0"/>
+              </a:spcBef>
+              <a:spcAft>
+                <a:spcPts val="0"/>
+              </a:spcAft>
+              <a:buNone/>
+            </a:pPr>
+            <a:r>
+              <a:t/>
+            </a:r>
+            <a:endParaRPr/>
+          </a:p>
+          <a:p>
+            <a:pPr indent="0" lvl="0" marL="0" rtl="0" algn="l">
+              <a:spcBef>
+                <a:spcPts val="0"/>
+              </a:spcBef>
+              <a:spcAft>
+                <a:spcPts val="0"/>
+              </a:spcAft>
+              <a:buNone/>
+            </a:pPr>
+            <a:r>
+              <a:rPr lang="en"/>
               <a:t>Breast cancer is the most common type of cancer in women following skin cancer. </a:t>
             </a:r>
             <a:endParaRPr/>
@@ -1683,6 +2192,37 @@
             </a:pPr>
             <a:r>
               <a:rPr lang="en"/>
+              <a:t>MacKenzie</a:t>
+            </a:r>
+            <a:endParaRPr/>
+          </a:p>
+          <a:p>
+            <a:pPr indent="0" lvl="0" marL="0" rtl="0" algn="l">
+              <a:spcBef>
+                <a:spcPts val="0"/>
+              </a:spcBef>
+              <a:spcAft>
+                <a:spcPts val="0"/>
+              </a:spcAft>
+              <a:buNone/>
+            </a:pPr>
+            <a:r>
+              <a:t/>
+            </a:r>
+            <a:endParaRPr/>
+          </a:p>
+          <a:p>
+            <a:pPr indent="0" lvl="0" marL="0" rtl="0" algn="l">
+              <a:spcBef>
+                <a:spcPts val="0"/>
+              </a:spcBef>
+              <a:spcAft>
+                <a:spcPts val="0"/>
+              </a:spcAft>
+              <a:buNone/>
+            </a:pPr>
+            <a:r>
+              <a:rPr lang="en"/>
               <a:t>Before we get into the analysis part, let’s discuss what would actually be considered cancer.</a:t>
             </a:r>
             <a:endParaRPr/>
@@ -1747,7 +2287,7 @@
             </a:pPr>
             <a:r>
               <a:rPr lang="en"/>
-              <a:t>Simply put, one mutated cell does not mean mean it is cancer; there are other factors involved in the cells mutation over several generations that would lead to the cell to grow into cancerous tissue</a:t>
+              <a:t>Simply put, one mutated cell does not mean mean it is cancer; there are other factors involved in the cells mutation over several generations that would lead to the cell to grow into cancerous tissue.</a:t>
             </a:r>
             <a:endParaRPr/>
           </a:p>
@@ -1762,8 +2302,7 @@
               <a:buNone/>
             </a:pPr>
             <a:r>
-              <a:rPr lang="en"/>
-              <a:t>The figure shown shows the steps a cell and its daughter cells need to take to become cancerous.</a:t>
+              <a:t/>
             </a:r>
             <a:endParaRPr/>
           </a:p>
@@ -1879,7 +2418,182 @@
                 <a:cs typeface="Lato"/>
                 <a:sym typeface="Lato"/>
               </a:rPr>
+              <a:t>MacKenzie</a:t>
+            </a:r>
+            <a:endParaRPr sz="1135">
+              <a:solidFill>
+                <a:schemeClr val="dk1"/>
+              </a:solidFill>
+              <a:latin typeface="Lato"/>
+              <a:ea typeface="Lato"/>
+              <a:cs typeface="Lato"/>
+              <a:sym typeface="Lato"/>
+            </a:endParaRPr>
+          </a:p>
+          <a:p>
+            <a:pPr indent="0" lvl="0" marL="0" rtl="0" algn="l">
+              <a:lnSpc>
+                <a:spcPct val="95000"/>
+              </a:lnSpc>
+              <a:spcBef>
+                <a:spcPts val="0"/>
+              </a:spcBef>
+              <a:spcAft>
+                <a:spcPts val="0"/>
+              </a:spcAft>
+              <a:buClr>
+                <a:schemeClr val="dk1"/>
+              </a:buClr>
+              <a:buSzPts val="935"/>
+              <a:buFont typeface="Arial"/>
+              <a:buNone/>
+            </a:pPr>
+            <a:r>
+              <a:t/>
+            </a:r>
+            <a:endParaRPr sz="1135">
+              <a:solidFill>
+                <a:schemeClr val="dk1"/>
+              </a:solidFill>
+              <a:latin typeface="Lato"/>
+              <a:ea typeface="Lato"/>
+              <a:cs typeface="Lato"/>
+              <a:sym typeface="Lato"/>
+            </a:endParaRPr>
+          </a:p>
+          <a:p>
+            <a:pPr indent="0" lvl="0" marL="0" rtl="0" algn="l">
+              <a:lnSpc>
+                <a:spcPct val="95000"/>
+              </a:lnSpc>
+              <a:spcBef>
+                <a:spcPts val="0"/>
+              </a:spcBef>
+              <a:spcAft>
+                <a:spcPts val="0"/>
+              </a:spcAft>
+              <a:buClr>
+                <a:schemeClr val="dk1"/>
+              </a:buClr>
+              <a:buSzPts val="935"/>
+              <a:buFont typeface="Arial"/>
+              <a:buNone/>
+            </a:pPr>
+            <a:r>
+              <a:rPr lang="en" sz="1135">
+                <a:solidFill>
+                  <a:schemeClr val="dk1"/>
+                </a:solidFill>
+                <a:latin typeface="Lato"/>
+                <a:ea typeface="Lato"/>
+                <a:cs typeface="Lato"/>
+                <a:sym typeface="Lato"/>
+              </a:rPr>
               <a:t>Our dataset consists of measurements taken of cells using FNA, or fine needle aspiration, from people with suspected tumors.</a:t>
+            </a:r>
+            <a:endParaRPr sz="1135">
+              <a:solidFill>
+                <a:schemeClr val="dk1"/>
+              </a:solidFill>
+              <a:latin typeface="Lato"/>
+              <a:ea typeface="Lato"/>
+              <a:cs typeface="Lato"/>
+              <a:sym typeface="Lato"/>
+            </a:endParaRPr>
+          </a:p>
+          <a:p>
+            <a:pPr indent="0" lvl="0" marL="0" rtl="0" algn="l">
+              <a:lnSpc>
+                <a:spcPct val="95000"/>
+              </a:lnSpc>
+              <a:spcBef>
+                <a:spcPts val="0"/>
+              </a:spcBef>
+              <a:spcAft>
+                <a:spcPts val="0"/>
+              </a:spcAft>
+              <a:buClr>
+                <a:schemeClr val="dk1"/>
+              </a:buClr>
+              <a:buSzPts val="935"/>
+              <a:buFont typeface="Arial"/>
+              <a:buNone/>
+            </a:pPr>
+            <a:r>
+              <a:rPr lang="en" sz="1135">
+                <a:solidFill>
+                  <a:schemeClr val="dk1"/>
+                </a:solidFill>
+                <a:latin typeface="Lato"/>
+                <a:ea typeface="Lato"/>
+                <a:cs typeface="Lato"/>
+                <a:sym typeface="Lato"/>
+              </a:rPr>
+              <a:t>The image to the right shows how each sample would have been taken from each patient using this method.</a:t>
+            </a:r>
+            <a:endParaRPr sz="1135">
+              <a:solidFill>
+                <a:schemeClr val="dk1"/>
+              </a:solidFill>
+              <a:latin typeface="Lato"/>
+              <a:ea typeface="Lato"/>
+              <a:cs typeface="Lato"/>
+              <a:sym typeface="Lato"/>
+            </a:endParaRPr>
+          </a:p>
+          <a:p>
+            <a:pPr indent="0" lvl="0" marL="0" rtl="0" algn="l">
+              <a:lnSpc>
+                <a:spcPct val="95000"/>
+              </a:lnSpc>
+              <a:spcBef>
+                <a:spcPts val="0"/>
+              </a:spcBef>
+              <a:spcAft>
+                <a:spcPts val="0"/>
+              </a:spcAft>
+              <a:buClr>
+                <a:schemeClr val="dk1"/>
+              </a:buClr>
+              <a:buSzPts val="935"/>
+              <a:buFont typeface="Arial"/>
+              <a:buNone/>
+            </a:pPr>
+            <a:r>
+              <a:rPr lang="en" sz="1135">
+                <a:solidFill>
+                  <a:schemeClr val="dk1"/>
+                </a:solidFill>
+                <a:latin typeface="Lato"/>
+                <a:ea typeface="Lato"/>
+                <a:cs typeface="Lato"/>
+                <a:sym typeface="Lato"/>
+              </a:rPr>
+              <a:t>The ultrasound would locate the tumor within the breast tissue and then be used to guide the needle to the desired location to </a:t>
+            </a:r>
+            <a:r>
+              <a:rPr lang="en" sz="1135">
+                <a:solidFill>
+                  <a:schemeClr val="dk1"/>
+                </a:solidFill>
+                <a:latin typeface="Lato"/>
+                <a:ea typeface="Lato"/>
+                <a:cs typeface="Lato"/>
+                <a:sym typeface="Lato"/>
+              </a:rPr>
+              <a:t>acquire</a:t>
+            </a:r>
+            <a:r>
+              <a:rPr lang="en" sz="1135">
+                <a:solidFill>
+                  <a:schemeClr val="dk1"/>
+                </a:solidFill>
+                <a:latin typeface="Lato"/>
+                <a:ea typeface="Lato"/>
+                <a:cs typeface="Lato"/>
+                <a:sym typeface="Lato"/>
+              </a:rPr>
+              <a:t> the sample.</a:t>
             </a:r>
             <a:endParaRPr sz="1135">
               <a:solidFill>
@@ -2647,7 +3361,7 @@
   <p:cSld>
     <p:spTree>
       <p:nvGrpSpPr>
-        <p:cNvPr id="163" name="Shape 163"/>
+        <p:cNvPr id="164" name="Shape 164"/>
         <p:cNvGrpSpPr/>
         <p:nvPr/>
       </p:nvGrpSpPr>
@@ -2661,7 +3375,7 @@
       </p:grpSpPr>
       <p:sp>
         <p:nvSpPr>
-          <p:cNvPr id="164" name="Google Shape;164;g12cae811305_0_5:notes"/>
+          <p:cNvPr id="165" name="Google Shape;165;g12cae811305_0_5:notes"/>
           <p:cNvSpPr/>
           <p:nvPr>
             <p:ph idx="2" type="sldImg"/>
@@ -2696,7 +3410,7 @@
       </p:sp>
       <p:sp>
         <p:nvSpPr>
-          <p:cNvPr id="165" name="Google Shape;165;g12cae811305_0_5:notes"/>
+          <p:cNvPr id="166" name="Google Shape;166;g12cae811305_0_5:notes"/>
           <p:cNvSpPr txBox="1"/>
           <p:nvPr>
             <p:ph idx="1" type="body"/>
@@ -2728,6 +3442,37 @@
             </a:pPr>
             <a:r>
               <a:rPr lang="en"/>
+              <a:t>Bryan</a:t>
+            </a:r>
+            <a:endParaRPr/>
+          </a:p>
+          <a:p>
+            <a:pPr indent="0" lvl="0" marL="0" rtl="0" algn="l">
+              <a:spcBef>
+                <a:spcPts val="0"/>
+              </a:spcBef>
+              <a:spcAft>
+                <a:spcPts val="0"/>
+              </a:spcAft>
+              <a:buNone/>
+            </a:pPr>
+            <a:r>
+              <a:t/>
+            </a:r>
+            <a:endParaRPr/>
+          </a:p>
+          <a:p>
+            <a:pPr indent="0" lvl="0" marL="0" rtl="0" algn="l">
+              <a:spcBef>
+                <a:spcPts val="0"/>
+              </a:spcBef>
+              <a:spcAft>
+                <a:spcPts val="0"/>
+              </a:spcAft>
+              <a:buNone/>
+            </a:pPr>
+            <a:r>
+              <a:rPr lang="en"/>
               <a:t>Read the slide</a:t>
             </a:r>
             <a:endParaRPr/>
@@ -2747,7 +3492,7 @@
   <p:cSld>
     <p:spTree>
       <p:nvGrpSpPr>
-        <p:cNvPr id="169" name="Shape 169"/>
+        <p:cNvPr id="170" name="Shape 170"/>
         <p:cNvGrpSpPr/>
         <p:nvPr/>
       </p:nvGrpSpPr>
@@ -2761,7 +3506,7 @@
       </p:grpSpPr>
       <p:sp>
         <p:nvSpPr>
-          <p:cNvPr id="170" name="Google Shape;170;g12cae811305_0_10:notes"/>
+          <p:cNvPr id="171" name="Google Shape;171;g12cae811305_0_49:notes"/>
           <p:cNvSpPr/>
           <p:nvPr>
             <p:ph idx="2" type="sldImg"/>
@@ -2796,7 +3541,7 @@
       </p:sp>
       <p:sp>
         <p:nvSpPr>
-          <p:cNvPr id="171" name="Google Shape;171;g12cae811305_0_10:notes"/>
+          <p:cNvPr id="172" name="Google Shape;172;g12cae811305_0_49:notes"/>
           <p:cNvSpPr txBox="1"/>
           <p:nvPr>
             <p:ph idx="1" type="body"/>
@@ -2828,7 +3573,7 @@
             </a:pPr>
             <a:r>
               <a:rPr lang="en"/>
-              <a:t>Our initial exploratory of the data allowed us to find correlation between certain features within our dataset.</a:t>
+              <a:t>Bryan</a:t>
             </a:r>
             <a:endParaRPr/>
           </a:p>
@@ -2843,16 +3588,223 @@
               <a:buNone/>
             </a:pPr>
             <a:r>
+              <a:t/>
+            </a:r>
+            <a:endParaRPr/>
+          </a:p>
+          <a:p>
+            <a:pPr indent="0" lvl="0" marL="0" rtl="0" algn="l">
+              <a:spcBef>
+                <a:spcPts val="0"/>
+              </a:spcBef>
+              <a:spcAft>
+                <a:spcPts val="0"/>
+              </a:spcAft>
+              <a:buNone/>
+            </a:pPr>
+            <a:r>
               <a:rPr lang="en"/>
-              <a:t>From there we decided to run a linear regression model on those features and then we decided to run a </a:t>
-            </a:r>
+              <a:t>Machine Learning Model:</a:t>
+            </a:r>
+            <a:endParaRPr/>
+          </a:p>
+          <a:p>
+            <a:pPr indent="-298450" lvl="0" marL="457200" rtl="0" algn="l">
+              <a:spcBef>
+                <a:spcPts val="0"/>
+              </a:spcBef>
+              <a:spcAft>
+                <a:spcPts val="0"/>
+              </a:spcAft>
+              <a:buSzPts val="1100"/>
+              <a:buChar char="●"/>
+            </a:pPr>
             <a:r>
               <a:rPr lang="en"/>
-              <a:t>logistic</a:t>
-            </a:r>
+              <a:t>For our machine learning model, we used Google Colab to write all our code so we can share it amongst all the people in our group since it uses the Cloud to save all our work and it allows us to load packages with ease.</a:t>
+            </a:r>
+            <a:endParaRPr/>
+          </a:p>
+          <a:p>
+            <a:pPr indent="-298450" lvl="1" marL="914400" rtl="0" algn="l">
+              <a:spcBef>
+                <a:spcPts val="0"/>
+              </a:spcBef>
+              <a:spcAft>
+                <a:spcPts val="0"/>
+              </a:spcAft>
+              <a:buSzPts val="1100"/>
+              <a:buChar char="○"/>
+            </a:pPr>
             <a:r>
               <a:rPr lang="en"/>
-              <a:t> regression on all the features in our dataset.</a:t>
+              <a:t>Languages</a:t>
+            </a:r>
+            <a:endParaRPr/>
+          </a:p>
+          <a:p>
+            <a:pPr indent="-298450" lvl="2" marL="1371600" rtl="0" algn="l">
+              <a:spcBef>
+                <a:spcPts val="0"/>
+              </a:spcBef>
+              <a:spcAft>
+                <a:spcPts val="0"/>
+              </a:spcAft>
+              <a:buSzPts val="1100"/>
+              <a:buChar char="■"/>
+            </a:pPr>
+            <a:r>
+              <a:rPr lang="en"/>
+              <a:t>To build our </a:t>
+            </a:r>
+            <a:r>
+              <a:rPr lang="en"/>
+              <a:t>machine learning model, we used the language Python. Within Python, we used Pandas, PySpark, and Matplotlib.</a:t>
+            </a:r>
+            <a:endParaRPr/>
+          </a:p>
+          <a:p>
+            <a:pPr indent="-298450" lvl="3" marL="1828800" rtl="0" algn="l">
+              <a:spcBef>
+                <a:spcPts val="0"/>
+              </a:spcBef>
+              <a:spcAft>
+                <a:spcPts val="0"/>
+              </a:spcAft>
+              <a:buSzPts val="1100"/>
+              <a:buChar char="●"/>
+            </a:pPr>
+            <a:r>
+              <a:rPr lang="en"/>
+              <a:t>Pandas allows us to load a CSV file with all the data we are trying to analyze directly into our notebook. From there we can create tables and dataframes with our data to conduct our analysis.</a:t>
+            </a:r>
+            <a:endParaRPr/>
+          </a:p>
+          <a:p>
+            <a:pPr indent="-298450" lvl="3" marL="1828800" rtl="0" algn="l">
+              <a:spcBef>
+                <a:spcPts val="0"/>
+              </a:spcBef>
+              <a:spcAft>
+                <a:spcPts val="0"/>
+              </a:spcAft>
+              <a:buSzPts val="1100"/>
+              <a:buChar char="●"/>
+            </a:pPr>
+            <a:r>
+              <a:rPr lang="en"/>
+              <a:t>PySpark allows us to load our data from Amazon Web Services into our notebook over the cloud. Similarly to Pandas, we were able to create schemas to visualize the data in table formatting.</a:t>
+            </a:r>
+            <a:endParaRPr/>
+          </a:p>
+          <a:p>
+            <a:pPr indent="-298450" lvl="3" marL="1828800" rtl="0" algn="l">
+              <a:spcBef>
+                <a:spcPts val="0"/>
+              </a:spcBef>
+              <a:spcAft>
+                <a:spcPts val="0"/>
+              </a:spcAft>
+              <a:buSzPts val="1100"/>
+              <a:buChar char="●"/>
+            </a:pPr>
+            <a:r>
+              <a:rPr lang="en"/>
+              <a:t>Matplotlib and Seaborn are programs that allowed us to create visualizations of our analysis so we could further comprehend what the data is telling us. The visual graphs and charts used in our presentation were created using these programs.</a:t>
+            </a:r>
+            <a:endParaRPr/>
+          </a:p>
+          <a:p>
+            <a:pPr indent="0" lvl="0" marL="0" rtl="0" algn="l">
+              <a:spcBef>
+                <a:spcPts val="0"/>
+              </a:spcBef>
+              <a:spcAft>
+                <a:spcPts val="0"/>
+              </a:spcAft>
+              <a:buNone/>
+            </a:pPr>
+            <a:r>
+              <a:t/>
+            </a:r>
+            <a:endParaRPr/>
+          </a:p>
+          <a:p>
+            <a:pPr indent="0" lvl="0" marL="0" rtl="0" algn="l">
+              <a:spcBef>
+                <a:spcPts val="0"/>
+              </a:spcBef>
+              <a:spcAft>
+                <a:spcPts val="0"/>
+              </a:spcAft>
+              <a:buNone/>
+            </a:pPr>
+            <a:r>
+              <a:rPr lang="en"/>
+              <a:t>DataBase:</a:t>
+            </a:r>
+            <a:endParaRPr/>
+          </a:p>
+          <a:p>
+            <a:pPr indent="0" lvl="0" marL="0" rtl="0" algn="l">
+              <a:spcBef>
+                <a:spcPts val="0"/>
+              </a:spcBef>
+              <a:spcAft>
+                <a:spcPts val="0"/>
+              </a:spcAft>
+              <a:buNone/>
+            </a:pPr>
+            <a:r>
+              <a:rPr lang="en"/>
+              <a:t>Read from slide</a:t>
+            </a:r>
+            <a:endParaRPr/>
+          </a:p>
+          <a:p>
+            <a:pPr indent="0" lvl="0" marL="0" rtl="0" algn="l">
+              <a:spcBef>
+                <a:spcPts val="0"/>
+              </a:spcBef>
+              <a:spcAft>
+                <a:spcPts val="0"/>
+              </a:spcAft>
+              <a:buNone/>
+            </a:pPr>
+            <a:r>
+              <a:t/>
+            </a:r>
+            <a:endParaRPr/>
+          </a:p>
+          <a:p>
+            <a:pPr indent="0" lvl="0" marL="0" rtl="0" algn="l">
+              <a:spcBef>
+                <a:spcPts val="0"/>
+              </a:spcBef>
+              <a:spcAft>
+                <a:spcPts val="0"/>
+              </a:spcAft>
+              <a:buNone/>
+            </a:pPr>
+            <a:r>
+              <a:rPr lang="en"/>
+              <a:t>Interactive Visualization:</a:t>
+            </a:r>
+            <a:endParaRPr/>
+          </a:p>
+          <a:p>
+            <a:pPr indent="0" lvl="0" marL="0" rtl="0" algn="l">
+              <a:spcBef>
+                <a:spcPts val="0"/>
+              </a:spcBef>
+              <a:spcAft>
+                <a:spcPts val="0"/>
+              </a:spcAft>
+              <a:buNone/>
+            </a:pPr>
+            <a:r>
+              <a:rPr lang="en"/>
+              <a:t>Read from slide</a:t>
             </a:r>
             <a:endParaRPr/>
           </a:p>
@@ -2871,7 +3823,7 @@
   <p:cSld>
     <p:spTree>
       <p:nvGrpSpPr>
-        <p:cNvPr id="182" name="Shape 182"/>
+        <p:cNvPr id="176" name="Shape 176"/>
         <p:cNvGrpSpPr/>
         <p:nvPr/>
       </p:nvGrpSpPr>
@@ -2885,7 +3837,7 @@
       </p:grpSpPr>
       <p:sp>
         <p:nvSpPr>
-          <p:cNvPr id="183" name="Google Shape;183;g12cae811305_0_22:notes"/>
+          <p:cNvPr id="177" name="Google Shape;177;g12cae811305_0_10:notes"/>
           <p:cNvSpPr/>
           <p:nvPr>
             <p:ph idx="2" type="sldImg"/>
@@ -2920,7 +3872,7 @@
       </p:sp>
       <p:sp>
         <p:nvSpPr>
-          <p:cNvPr id="184" name="Google Shape;184;g12cae811305_0_22:notes"/>
+          <p:cNvPr id="178" name="Google Shape;178;g12cae811305_0_10:notes"/>
           <p:cNvSpPr txBox="1"/>
           <p:nvPr>
             <p:ph idx="1" type="body"/>
@@ -2951,26 +3903,10 @@
               <a:buNone/>
             </a:pPr>
             <a:r>
-              <a:rPr lang="en">
-                <a:solidFill>
-                  <a:schemeClr val="dk1"/>
-                </a:solidFill>
-                <a:latin typeface="Lato"/>
-                <a:ea typeface="Lato"/>
-                <a:cs typeface="Lato"/>
-                <a:sym typeface="Lato"/>
-              </a:rPr>
-              <a:t>The figure to the right provides the correlation of all our features against themselves by shading does of high correlation closer to the color Purple and those with less correlation white or light red.</a:t>
-            </a:r>
-            <a:endParaRPr>
-              <a:solidFill>
-                <a:schemeClr val="dk1"/>
-              </a:solidFill>
-              <a:latin typeface="Lato"/>
-              <a:ea typeface="Lato"/>
-              <a:cs typeface="Lato"/>
-              <a:sym typeface="Lato"/>
-            </a:endParaRPr>
+              <a:rPr lang="en"/>
+              <a:t>Bryan</a:t>
+            </a:r>
+            <a:endParaRPr/>
           </a:p>
           <a:p>
             <a:pPr indent="0" lvl="0" marL="0" rtl="0" algn="l">
@@ -2980,34 +3916,52 @@
               <a:spcAft>
                 <a:spcPts val="0"/>
               </a:spcAft>
-              <a:buClr>
-                <a:schemeClr val="dk1"/>
-              </a:buClr>
-              <a:buSzPts val="1100"/>
-              <a:buFont typeface="Arial"/>
-              <a:buNone/>
-            </a:pPr>
-            <a:r>
-              <a:rPr lang="en">
-                <a:solidFill>
-                  <a:schemeClr val="dk1"/>
-                </a:solidFill>
-                <a:latin typeface="Lato"/>
-                <a:ea typeface="Lato"/>
-                <a:cs typeface="Lato"/>
-                <a:sym typeface="Lato"/>
-              </a:rPr>
-              <a:t>From looking at the heat map, we created tables based off the features that have the features that correlate with each other the most</a:t>
-            </a:r>
-            <a:endParaRPr>
-              <a:solidFill>
-                <a:schemeClr val="dk1"/>
-              </a:solidFill>
-              <a:latin typeface="Lato"/>
-              <a:ea typeface="Lato"/>
-              <a:cs typeface="Lato"/>
-              <a:sym typeface="Lato"/>
-            </a:endParaRPr>
+              <a:buNone/>
+            </a:pPr>
+            <a:r>
+              <a:t/>
+            </a:r>
+            <a:endParaRPr/>
+          </a:p>
+          <a:p>
+            <a:pPr indent="0" lvl="0" marL="0" rtl="0" algn="l">
+              <a:spcBef>
+                <a:spcPts val="0"/>
+              </a:spcBef>
+              <a:spcAft>
+                <a:spcPts val="0"/>
+              </a:spcAft>
+              <a:buNone/>
+            </a:pPr>
+            <a:r>
+              <a:rPr lang="en"/>
+              <a:t>Our initial exploratory of the data allowed us to find correlation between certain features within our dataset.</a:t>
+            </a:r>
+            <a:endParaRPr/>
+          </a:p>
+          <a:p>
+            <a:pPr indent="0" lvl="0" marL="0" rtl="0" algn="l">
+              <a:spcBef>
+                <a:spcPts val="0"/>
+              </a:spcBef>
+              <a:spcAft>
+                <a:spcPts val="0"/>
+              </a:spcAft>
+              <a:buNone/>
+            </a:pPr>
+            <a:r>
+              <a:rPr lang="en"/>
+              <a:t>From there we decided to run a linear regression model on those features and then we decided to run a </a:t>
+            </a:r>
+            <a:r>
+              <a:rPr lang="en"/>
+              <a:t>logistic</a:t>
+            </a:r>
+            <a:r>
+              <a:rPr lang="en"/>
+              <a:t> regression on all the features in our dataset.</a:t>
+            </a:r>
+            <a:endParaRPr/>
           </a:p>
         </p:txBody>
       </p:sp>
@@ -3024,7 +3978,7 @@
   <p:cSld>
     <p:spTree>
       <p:nvGrpSpPr>
-        <p:cNvPr id="191" name="Shape 191"/>
+        <p:cNvPr id="189" name="Shape 189"/>
         <p:cNvGrpSpPr/>
         <p:nvPr/>
       </p:nvGrpSpPr>
@@ -3038,7 +3992,7 @@
       </p:grpSpPr>
       <p:sp>
         <p:nvSpPr>
-          <p:cNvPr id="192" name="Google Shape;192;g12cae811305_0_29:notes"/>
+          <p:cNvPr id="190" name="Google Shape;190;g12cae811305_0_22:notes"/>
           <p:cNvSpPr/>
           <p:nvPr>
             <p:ph idx="2" type="sldImg"/>
@@ -3073,7 +4027,7 @@
       </p:sp>
       <p:sp>
         <p:nvSpPr>
-          <p:cNvPr id="193" name="Google Shape;193;g12cae811305_0_29:notes"/>
+          <p:cNvPr id="191" name="Google Shape;191;g12cae811305_0_22:notes"/>
           <p:cNvSpPr txBox="1"/>
           <p:nvPr>
             <p:ph idx="1" type="body"/>
@@ -3104,26 +4058,118 @@
               <a:buNone/>
             </a:pPr>
             <a:r>
-              <a:rPr lang="en"/>
-              <a:t>After running the classification report and the confusion matrix, we can see that the model was </a:t>
-            </a:r>
-            <a:r>
-              <a:rPr lang="en"/>
-              <a:t>extremely</a:t>
-            </a:r>
-            <a:r>
-              <a:rPr lang="en"/>
-              <a:t> accurate </a:t>
-            </a:r>
-            <a:r>
-              <a:rPr lang="en"/>
-              <a:t>across</a:t>
-            </a:r>
-            <a:r>
-              <a:rPr lang="en"/>
-              <a:t> all the fields. From there, we ran our accuracy scores.</a:t>
-            </a:r>
-            <a:endParaRPr/>
+              <a:rPr lang="en">
+                <a:solidFill>
+                  <a:schemeClr val="dk1"/>
+                </a:solidFill>
+                <a:latin typeface="Lato"/>
+                <a:ea typeface="Lato"/>
+                <a:cs typeface="Lato"/>
+                <a:sym typeface="Lato"/>
+              </a:rPr>
+              <a:t>Kenny </a:t>
+            </a:r>
+            <a:endParaRPr>
+              <a:solidFill>
+                <a:schemeClr val="dk1"/>
+              </a:solidFill>
+              <a:latin typeface="Lato"/>
+              <a:ea typeface="Lato"/>
+              <a:cs typeface="Lato"/>
+              <a:sym typeface="Lato"/>
+            </a:endParaRPr>
+          </a:p>
+          <a:p>
+            <a:pPr indent="0" lvl="0" marL="0" rtl="0" algn="l">
+              <a:spcBef>
+                <a:spcPts val="0"/>
+              </a:spcBef>
+              <a:spcAft>
+                <a:spcPts val="0"/>
+              </a:spcAft>
+              <a:buNone/>
+            </a:pPr>
+            <a:r>
+              <a:t/>
+            </a:r>
+            <a:endParaRPr>
+              <a:solidFill>
+                <a:schemeClr val="dk1"/>
+              </a:solidFill>
+              <a:latin typeface="Lato"/>
+              <a:ea typeface="Lato"/>
+              <a:cs typeface="Lato"/>
+              <a:sym typeface="Lato"/>
+            </a:endParaRPr>
+          </a:p>
+          <a:p>
+            <a:pPr indent="0" lvl="0" marL="0" rtl="0" algn="l">
+              <a:spcBef>
+                <a:spcPts val="0"/>
+              </a:spcBef>
+              <a:spcAft>
+                <a:spcPts val="0"/>
+              </a:spcAft>
+              <a:buNone/>
+            </a:pPr>
+            <a:r>
+              <a:rPr lang="en">
+                <a:solidFill>
+                  <a:schemeClr val="dk1"/>
+                </a:solidFill>
+                <a:latin typeface="Lato"/>
+                <a:ea typeface="Lato"/>
+                <a:cs typeface="Lato"/>
+                <a:sym typeface="Lato"/>
+              </a:rPr>
+              <a:t>The figure to the right provides the correlation of all our features against themselves by shading does of high correlation closer to the color Purple and those with less correlation white or light red.</a:t>
+            </a:r>
+            <a:endParaRPr>
+              <a:solidFill>
+                <a:schemeClr val="dk1"/>
+              </a:solidFill>
+              <a:latin typeface="Lato"/>
+              <a:ea typeface="Lato"/>
+              <a:cs typeface="Lato"/>
+              <a:sym typeface="Lato"/>
+            </a:endParaRPr>
+          </a:p>
+          <a:p>
+            <a:pPr indent="0" lvl="0" marL="0" rtl="0" algn="l">
+              <a:spcBef>
+                <a:spcPts val="0"/>
+              </a:spcBef>
+              <a:spcAft>
+                <a:spcPts val="0"/>
+              </a:spcAft>
+              <a:buClr>
+                <a:schemeClr val="dk1"/>
+              </a:buClr>
+              <a:buSzPts val="1100"/>
+              <a:buFont typeface="Arial"/>
+              <a:buNone/>
+            </a:pPr>
+            <a:r>
+              <a:rPr lang="en">
+                <a:solidFill>
+                  <a:schemeClr val="dk1"/>
+                </a:solidFill>
+                <a:latin typeface="Lato"/>
+                <a:ea typeface="Lato"/>
+                <a:cs typeface="Lato"/>
+                <a:sym typeface="Lato"/>
+              </a:rPr>
+              <a:t>From looking at the heat map, we created tables based off the features that have the features that correlate with each other the most</a:t>
+            </a:r>
+            <a:endParaRPr>
+              <a:solidFill>
+                <a:schemeClr val="dk1"/>
+              </a:solidFill>
+              <a:latin typeface="Lato"/>
+              <a:ea typeface="Lato"/>
+              <a:cs typeface="Lato"/>
+              <a:sym typeface="Lato"/>
+            </a:endParaRPr>
           </a:p>
         </p:txBody>
       </p:sp>
@@ -3140,7 +4186,7 @@
   <p:cSld>
     <p:spTree>
       <p:nvGrpSpPr>
-        <p:cNvPr id="207" name="Shape 207"/>
+        <p:cNvPr id="198" name="Shape 198"/>
         <p:cNvGrpSpPr/>
         <p:nvPr/>
       </p:nvGrpSpPr>
@@ -3154,7 +4200,7 @@
       </p:grpSpPr>
       <p:sp>
         <p:nvSpPr>
-          <p:cNvPr id="208" name="Google Shape;208;g12cae811305_0_44:notes"/>
+          <p:cNvPr id="199" name="Google Shape;199;g12cae811305_0_29:notes"/>
           <p:cNvSpPr/>
           <p:nvPr>
             <p:ph idx="2" type="sldImg"/>
@@ -3189,7 +4235,7 @@
       </p:sp>
       <p:sp>
         <p:nvSpPr>
-          <p:cNvPr id="209" name="Google Shape;209;g12cae811305_0_44:notes"/>
+          <p:cNvPr id="200" name="Google Shape;200;g12cae811305_0_29:notes"/>
           <p:cNvSpPr txBox="1"/>
           <p:nvPr>
             <p:ph idx="1" type="body"/>
@@ -3221,7 +4267,7 @@
             </a:pPr>
             <a:r>
               <a:rPr lang="en"/>
-              <a:t>Read slide</a:t>
+              <a:t>Kenny</a:t>
             </a:r>
             <a:endParaRPr/>
           </a:p>
@@ -3252,15 +4298,62 @@
             </a:pPr>
             <a:r>
               <a:rPr lang="en"/>
-              <a:t>Unsure why our accuracy score for the </a:t>
+              <a:t>Within the confusion matrix, the positive prediction, </a:t>
             </a:r>
             <a:r>
               <a:rPr lang="en"/>
-              <a:t>logistic</a:t>
+              <a:t>labeled</a:t>
             </a:r>
             <a:r>
               <a:rPr lang="en"/>
-              <a:t> regression accuracy score was so high, we put our heads back together to try and determine what exactly in our data was leading our model to be so accurate.</a:t>
+              <a:t> 0, is malignant tumor and negative is a benign tumor, labeled 1.</a:t>
+            </a:r>
+            <a:endParaRPr/>
+          </a:p>
+          <a:p>
+            <a:pPr indent="0" lvl="0" marL="0" rtl="0" algn="l">
+              <a:spcBef>
+                <a:spcPts val="0"/>
+              </a:spcBef>
+              <a:spcAft>
+                <a:spcPts val="0"/>
+              </a:spcAft>
+              <a:buNone/>
+            </a:pPr>
+            <a:r>
+              <a:t/>
+            </a:r>
+            <a:endParaRPr/>
+          </a:p>
+          <a:p>
+            <a:pPr indent="0" lvl="0" marL="0" rtl="0" algn="l">
+              <a:spcBef>
+                <a:spcPts val="0"/>
+              </a:spcBef>
+              <a:spcAft>
+                <a:spcPts val="0"/>
+              </a:spcAft>
+              <a:buNone/>
+            </a:pPr>
+            <a:r>
+              <a:rPr lang="en"/>
+              <a:t>After running the classification report and the confusion matrix, we can see that the model was </a:t>
+            </a:r>
+            <a:r>
+              <a:rPr lang="en"/>
+              <a:t>extremely</a:t>
+            </a:r>
+            <a:r>
+              <a:rPr lang="en"/>
+              <a:t> accurate </a:t>
+            </a:r>
+            <a:r>
+              <a:rPr lang="en"/>
+              <a:t>across</a:t>
+            </a:r>
+            <a:r>
+              <a:rPr lang="en"/>
+              <a:t> all the fields. From there, we ran our accuracy scores.</a:t>
             </a:r>
             <a:endParaRPr/>
           </a:p>
@@ -11575,7 +12668,7 @@
   <p:cSld>
     <p:spTree>
       <p:nvGrpSpPr>
-        <p:cNvPr id="216" name="Shape 216"/>
+        <p:cNvPr id="217" name="Shape 217"/>
         <p:cNvGrpSpPr/>
         <p:nvPr/>
       </p:nvGrpSpPr>
@@ -11589,7 +12682,7 @@
       </p:grpSpPr>
       <p:sp>
         <p:nvSpPr>
-          <p:cNvPr id="217" name="Google Shape;217;p22"/>
+          <p:cNvPr id="218" name="Google Shape;218;p22"/>
           <p:cNvSpPr txBox="1"/>
           <p:nvPr>
             <p:ph type="title"/>
@@ -11621,11 +12714,7 @@
             </a:pPr>
             <a:r>
               <a:rPr lang="en"/>
-              <a:t>Further</a:t>
-            </a:r>
-            <a:r>
-              <a:rPr lang="en"/>
-              <a:t> Exploratory</a:t>
+              <a:t>Interactive Dashboard</a:t>
             </a:r>
             <a:endParaRPr/>
           </a:p>
@@ -11633,7 +12722,129 @@
       </p:sp>
       <p:sp>
         <p:nvSpPr>
-          <p:cNvPr id="218" name="Google Shape;218;p22"/>
+          <p:cNvPr id="219" name="Google Shape;219;p22"/>
+          <p:cNvSpPr txBox="1"/>
+          <p:nvPr>
+            <p:ph idx="1" type="body"/>
+          </p:nvPr>
+        </p:nvSpPr>
+        <p:spPr>
+          <a:xfrm>
+            <a:off x="1297500" y="1558625"/>
+            <a:ext cx="7038900" cy="2911200"/>
+          </a:xfrm>
+          <a:prstGeom prst="rect">
+            <a:avLst/>
+          </a:prstGeom>
+        </p:spPr>
+        <p:txBody>
+          <a:bodyPr anchorCtr="0" anchor="t" bIns="91425" lIns="91425" spcFirstLastPara="1" rIns="91425" wrap="square" tIns="91425">
+            <a:normAutofit/>
+          </a:bodyPr>
+          <a:lstStyle/>
+          <a:p>
+            <a:pPr indent="0" lvl="0" marL="0" rtl="0" algn="ctr">
+              <a:spcBef>
+                <a:spcPts val="0"/>
+              </a:spcBef>
+              <a:spcAft>
+                <a:spcPts val="1200"/>
+              </a:spcAft>
+              <a:buNone/>
+            </a:pPr>
+            <a:r>
+              <a:rPr lang="en" sz="2000" u="sng">
+                <a:solidFill>
+                  <a:schemeClr val="hlink"/>
+                </a:solidFill>
+                <a:hlinkClick r:id="rId3"/>
+              </a:rPr>
+              <a:t>Interactive Tableau Dashboard</a:t>
+            </a:r>
+            <a:r>
+              <a:rPr lang="en" sz="2000"/>
+              <a:t> </a:t>
+            </a:r>
+            <a:endParaRPr sz="2000"/>
+          </a:p>
+        </p:txBody>
+      </p:sp>
+    </p:spTree>
+  </p:cSld>
+  <p:clrMapOvr>
+    <a:masterClrMapping/>
+  </p:clrMapOvr>
+</p:sld>
+</file>
+
+<file path=ppt/slides/slide11.xml><?xml version="1.0" encoding="utf-8"?>
+<p:sld xmlns:a="http://schemas.openxmlformats.org/drawingml/2006/main" xmlns:r="http://schemas.openxmlformats.org/officeDocument/2006/relationships" xmlns:mc="http://schemas.openxmlformats.org/markup-compatibility/2006" xmlns:mv="urn:schemas-microsoft-com:mac:vml" xmlns:p="http://schemas.openxmlformats.org/presentationml/2006/main" xmlns:c="http://schemas.openxmlformats.org/drawingml/2006/chart" xmlns:dgm="http://schemas.openxmlformats.org/drawingml/2006/diagram" xmlns:o="urn:schemas-microsoft-com:office:office" xmlns:v="urn:schemas-microsoft-com:vml" xmlns:pvml="urn:schemas-microsoft-com:office:powerpoint" xmlns:com="http://schemas.openxmlformats.org/drawingml/2006/compatibility" xmlns:p14="http://schemas.microsoft.com/office/powerpoint/2010/main" xmlns:p15="http://schemas.microsoft.com/office/powerpoint/2012/main" xmlns:ahyp="http://schemas.microsoft.com/office/drawing/2018/hyperlinkcolor">
+  <p:cSld>
+    <p:spTree>
+      <p:nvGrpSpPr>
+        <p:cNvPr id="223" name="Shape 223"/>
+        <p:cNvGrpSpPr/>
+        <p:nvPr/>
+      </p:nvGrpSpPr>
+      <p:grpSpPr>
+        <a:xfrm>
+          <a:off x="0" y="0"/>
+          <a:ext cx="0" cy="0"/>
+          <a:chOff x="0" y="0"/>
+          <a:chExt cx="0" cy="0"/>
+        </a:xfrm>
+      </p:grpSpPr>
+      <p:sp>
+        <p:nvSpPr>
+          <p:cNvPr id="224" name="Google Shape;224;p23"/>
+          <p:cNvSpPr txBox="1"/>
+          <p:nvPr>
+            <p:ph type="title"/>
+          </p:nvPr>
+        </p:nvSpPr>
+        <p:spPr>
+          <a:xfrm>
+            <a:off x="1297500" y="393750"/>
+            <a:ext cx="7038900" cy="914100"/>
+          </a:xfrm>
+          <a:prstGeom prst="rect">
+            <a:avLst/>
+          </a:prstGeom>
+        </p:spPr>
+        <p:txBody>
+          <a:bodyPr anchorCtr="0" anchor="t" bIns="91425" lIns="91425" spcFirstLastPara="1" rIns="91425" wrap="square" tIns="91425">
+            <a:normAutofit fontScale="90000"/>
+          </a:bodyPr>
+          <a:lstStyle/>
+          <a:p>
+            <a:pPr indent="0" lvl="0" marL="0" rtl="0" algn="l">
+              <a:spcBef>
+                <a:spcPts val="0"/>
+              </a:spcBef>
+              <a:spcAft>
+                <a:spcPts val="0"/>
+              </a:spcAft>
+              <a:buNone/>
+            </a:pPr>
+            <a:r>
+              <a:rPr lang="en" sz="2622"/>
+              <a:t>What we learned from our </a:t>
+            </a:r>
+            <a:r>
+              <a:rPr lang="en" sz="2622"/>
+              <a:t>Machine</a:t>
+            </a:r>
+            <a:r>
+              <a:rPr lang="en" sz="2622"/>
+              <a:t> Learning Model…</a:t>
+            </a:r>
+            <a:endParaRPr sz="2622"/>
+          </a:p>
+        </p:txBody>
+      </p:sp>
+      <p:sp>
+        <p:nvSpPr>
+          <p:cNvPr id="225" name="Google Shape;225;p23"/>
           <p:cNvSpPr txBox="1"/>
           <p:nvPr>
             <p:ph idx="1" type="body"/>
@@ -11664,21 +12875,21 @@
               <a:buNone/>
             </a:pPr>
             <a:r>
-              <a:rPr lang="en"/>
-              <a:t>We went back to our dataframe and dropped all the features that </a:t>
-            </a:r>
-            <a:r>
-              <a:rPr lang="en"/>
-              <a:t>involved</a:t>
-            </a:r>
-            <a:r>
-              <a:rPr lang="en"/>
-              <a:t> size.</a:t>
-            </a:r>
-            <a:endParaRPr/>
-          </a:p>
-          <a:p>
-            <a:pPr indent="0" lvl="0" marL="0" rtl="0" algn="l">
+              <a:rPr lang="en" sz="1500"/>
+              <a:t>We ran both a Linear and </a:t>
+            </a:r>
+            <a:r>
+              <a:rPr lang="en" sz="1500"/>
+              <a:t>Logistic</a:t>
+            </a:r>
+            <a:r>
+              <a:rPr lang="en" sz="1500"/>
+              <a:t> Regression Models to determine which was better for predicting cancer based off the list of features provided.</a:t>
+            </a:r>
+            <a:endParaRPr sz="1500"/>
+          </a:p>
+          <a:p>
+            <a:pPr indent="0" lvl="0" marL="457200" marR="917728" rtl="0" algn="l">
               <a:spcBef>
                 <a:spcPts val="1200"/>
               </a:spcBef>
@@ -11688,13 +12899,29 @@
               <a:buNone/>
             </a:pPr>
             <a:r>
-              <a:rPr lang="en"/>
-              <a:t>Those features include:</a:t>
-            </a:r>
-            <a:endParaRPr/>
-          </a:p>
-          <a:p>
-            <a:pPr indent="0" lvl="0" marL="0" rtl="0" algn="l">
+              <a:rPr lang="en" sz="1500"/>
+              <a:t>For the Linear Regression, we </a:t>
+            </a:r>
+            <a:r>
+              <a:rPr lang="en" sz="1500"/>
+              <a:t>achieved</a:t>
+            </a:r>
+            <a:r>
+              <a:rPr lang="en" sz="1500"/>
+              <a:t> an </a:t>
+            </a:r>
+            <a:r>
+              <a:rPr b="1" lang="en" sz="1500"/>
+              <a:t>84.27%</a:t>
+            </a:r>
+            <a:r>
+              <a:rPr lang="en" sz="1500"/>
+              <a:t> accuracy score which is considered acceptable.</a:t>
+            </a:r>
+            <a:endParaRPr sz="1500"/>
+          </a:p>
+          <a:p>
+            <a:pPr indent="0" lvl="0" marL="457200" marR="917728" rtl="0" algn="l">
               <a:spcBef>
                 <a:spcPts val="1200"/>
               </a:spcBef>
@@ -11704,10 +12931,34 @@
               <a:buNone/>
             </a:pPr>
             <a:r>
-              <a:rPr lang="en"/>
-              <a:t>radius_mean, radius_worst, area_mean, area_worst, perimeter_mean, perimeter_worst</a:t>
-            </a:r>
-            <a:endParaRPr/>
+              <a:rPr lang="en" sz="1500"/>
+              <a:t>For Logistic Regression, we </a:t>
+            </a:r>
+            <a:r>
+              <a:rPr lang="en" sz="1500"/>
+              <a:t>received</a:t>
+            </a:r>
+            <a:r>
+              <a:rPr lang="en" sz="1500"/>
+              <a:t> a </a:t>
+            </a:r>
+            <a:r>
+              <a:rPr b="1" lang="en" sz="1500"/>
+              <a:t>97.09%</a:t>
+            </a:r>
+            <a:r>
+              <a:rPr lang="en" sz="1500"/>
+              <a:t> accuracy score meaning that a Logistic Regression is a very reliable model to use to predict </a:t>
+            </a:r>
+            <a:r>
+              <a:rPr lang="en" sz="1500"/>
+              <a:t>whether</a:t>
+            </a:r>
+            <a:r>
+              <a:rPr lang="en" sz="1500"/>
+              <a:t> someone has cancer based off the list of features we have provided the model.</a:t>
+            </a:r>
+            <a:endParaRPr sz="1500"/>
           </a:p>
         </p:txBody>
       </p:sp>
@@ -11719,12 +12970,12 @@
 </p:sld>
 </file>
 
-<file path=ppt/slides/slide11.xml><?xml version="1.0" encoding="utf-8"?>
+<file path=ppt/slides/slide12.xml><?xml version="1.0" encoding="utf-8"?>
 <p:sld xmlns:a="http://schemas.openxmlformats.org/drawingml/2006/main" xmlns:r="http://schemas.openxmlformats.org/officeDocument/2006/relationships" xmlns:mc="http://schemas.openxmlformats.org/markup-compatibility/2006" xmlns:mv="urn:schemas-microsoft-com:mac:vml" xmlns:p="http://schemas.openxmlformats.org/presentationml/2006/main" xmlns:c="http://schemas.openxmlformats.org/drawingml/2006/chart" xmlns:dgm="http://schemas.openxmlformats.org/drawingml/2006/diagram" xmlns:o="urn:schemas-microsoft-com:office:office" xmlns:v="urn:schemas-microsoft-com:vml" xmlns:pvml="urn:schemas-microsoft-com:office:powerpoint" xmlns:com="http://schemas.openxmlformats.org/drawingml/2006/compatibility" xmlns:p14="http://schemas.microsoft.com/office/powerpoint/2010/main" xmlns:p15="http://schemas.microsoft.com/office/powerpoint/2012/main" xmlns:ahyp="http://schemas.microsoft.com/office/drawing/2018/hyperlinkcolor">
   <p:cSld>
     <p:spTree>
       <p:nvGrpSpPr>
-        <p:cNvPr id="222" name="Shape 222"/>
+        <p:cNvPr id="229" name="Shape 229"/>
         <p:cNvGrpSpPr/>
         <p:nvPr/>
       </p:nvGrpSpPr>
@@ -11738,7 +12989,7 @@
       </p:grpSpPr>
       <p:sp>
         <p:nvSpPr>
-          <p:cNvPr id="223" name="Google Shape;223;p23"/>
+          <p:cNvPr id="230" name="Google Shape;230;p24"/>
           <p:cNvSpPr txBox="1"/>
           <p:nvPr>
             <p:ph type="title"/>
@@ -11770,7 +13021,11 @@
             </a:pPr>
             <a:r>
               <a:rPr lang="en"/>
-              <a:t>After our adjustments</a:t>
+              <a:t>Further</a:t>
+            </a:r>
+            <a:r>
+              <a:rPr lang="en"/>
+              <a:t> Exploratory</a:t>
             </a:r>
             <a:endParaRPr/>
           </a:p>
@@ -11778,7 +13033,205 @@
       </p:sp>
       <p:sp>
         <p:nvSpPr>
-          <p:cNvPr id="224" name="Google Shape;224;p23"/>
+          <p:cNvPr id="231" name="Google Shape;231;p24"/>
+          <p:cNvSpPr txBox="1"/>
+          <p:nvPr>
+            <p:ph idx="1" type="body"/>
+          </p:nvPr>
+        </p:nvSpPr>
+        <p:spPr>
+          <a:xfrm>
+            <a:off x="3777250" y="1567550"/>
+            <a:ext cx="4559100" cy="2911200"/>
+          </a:xfrm>
+          <a:prstGeom prst="rect">
+            <a:avLst/>
+          </a:prstGeom>
+        </p:spPr>
+        <p:txBody>
+          <a:bodyPr anchorCtr="0" anchor="t" bIns="91425" lIns="91425" spcFirstLastPara="1" rIns="91425" wrap="square" tIns="91425">
+            <a:normAutofit/>
+          </a:bodyPr>
+          <a:lstStyle/>
+          <a:p>
+            <a:pPr indent="0" lvl="0" marL="0" rtl="0" algn="l">
+              <a:spcBef>
+                <a:spcPts val="0"/>
+              </a:spcBef>
+              <a:spcAft>
+                <a:spcPts val="0"/>
+              </a:spcAft>
+              <a:buNone/>
+            </a:pPr>
+            <a:r>
+              <a:rPr lang="en" sz="1400"/>
+              <a:t>We went back to our dataframe and dropped all the features that </a:t>
+            </a:r>
+            <a:r>
+              <a:rPr lang="en" sz="1400"/>
+              <a:t>involved</a:t>
+            </a:r>
+            <a:r>
+              <a:rPr lang="en" sz="1400"/>
+              <a:t> size.</a:t>
+            </a:r>
+            <a:endParaRPr sz="1400"/>
+          </a:p>
+          <a:p>
+            <a:pPr indent="0" lvl="0" marL="0" rtl="0" algn="l">
+              <a:lnSpc>
+                <a:spcPct val="95000"/>
+              </a:lnSpc>
+              <a:spcBef>
+                <a:spcPts val="1200"/>
+              </a:spcBef>
+              <a:spcAft>
+                <a:spcPts val="0"/>
+              </a:spcAft>
+              <a:buNone/>
+            </a:pPr>
+            <a:r>
+              <a:rPr lang="en" sz="1400"/>
+              <a:t>Those features include:</a:t>
+            </a:r>
+            <a:endParaRPr sz="1400"/>
+          </a:p>
+          <a:p>
+            <a:pPr indent="0" lvl="0" marL="0" rtl="0" algn="l">
+              <a:lnSpc>
+                <a:spcPct val="95000"/>
+              </a:lnSpc>
+              <a:spcBef>
+                <a:spcPts val="1200"/>
+              </a:spcBef>
+              <a:spcAft>
+                <a:spcPts val="0"/>
+              </a:spcAft>
+              <a:buNone/>
+            </a:pPr>
+            <a:r>
+              <a:rPr b="1" lang="en" sz="1500"/>
+              <a:t>radius_mean, radius_worst, area_mean, area_worst, perimeter_mean, perimeter_worst</a:t>
+            </a:r>
+            <a:endParaRPr b="1" sz="1500"/>
+          </a:p>
+          <a:p>
+            <a:pPr indent="0" lvl="0" marL="0" rtl="0" algn="l">
+              <a:lnSpc>
+                <a:spcPct val="95000"/>
+              </a:lnSpc>
+              <a:spcBef>
+                <a:spcPts val="1200"/>
+              </a:spcBef>
+              <a:spcAft>
+                <a:spcPts val="1200"/>
+              </a:spcAft>
+              <a:buNone/>
+            </a:pPr>
+            <a:r>
+              <a:rPr lang="en"/>
+              <a:t>This look the original 20 features we started with and brought it down to 14 total.</a:t>
+            </a:r>
+            <a:endParaRPr/>
+          </a:p>
+        </p:txBody>
+      </p:sp>
+      <p:pic>
+        <p:nvPicPr>
+          <p:cNvPr id="232" name="Google Shape;232;p24"/>
+          <p:cNvPicPr preferRelativeResize="0"/>
+          <p:nvPr/>
+        </p:nvPicPr>
+        <p:blipFill>
+          <a:blip r:embed="rId3">
+            <a:alphaModFix/>
+          </a:blip>
+          <a:stretch>
+            <a:fillRect/>
+          </a:stretch>
+        </p:blipFill>
+        <p:spPr>
+          <a:xfrm>
+            <a:off x="312550" y="1542524"/>
+            <a:ext cx="3342850" cy="2961249"/>
+          </a:xfrm>
+          <a:prstGeom prst="rect">
+            <a:avLst/>
+          </a:prstGeom>
+          <a:noFill/>
+          <a:ln>
+            <a:noFill/>
+          </a:ln>
+        </p:spPr>
+      </p:pic>
+    </p:spTree>
+  </p:cSld>
+  <p:clrMapOvr>
+    <a:masterClrMapping/>
+  </p:clrMapOvr>
+</p:sld>
+</file>
+
+<file path=ppt/slides/slide13.xml><?xml version="1.0" encoding="utf-8"?>
+<p:sld xmlns:a="http://schemas.openxmlformats.org/drawingml/2006/main" xmlns:r="http://schemas.openxmlformats.org/officeDocument/2006/relationships" xmlns:mc="http://schemas.openxmlformats.org/markup-compatibility/2006" xmlns:mv="urn:schemas-microsoft-com:mac:vml" xmlns:p="http://schemas.openxmlformats.org/presentationml/2006/main" xmlns:c="http://schemas.openxmlformats.org/drawingml/2006/chart" xmlns:dgm="http://schemas.openxmlformats.org/drawingml/2006/diagram" xmlns:o="urn:schemas-microsoft-com:office:office" xmlns:v="urn:schemas-microsoft-com:vml" xmlns:pvml="urn:schemas-microsoft-com:office:powerpoint" xmlns:com="http://schemas.openxmlformats.org/drawingml/2006/compatibility" xmlns:p14="http://schemas.microsoft.com/office/powerpoint/2010/main" xmlns:p15="http://schemas.microsoft.com/office/powerpoint/2012/main" xmlns:ahyp="http://schemas.microsoft.com/office/drawing/2018/hyperlinkcolor">
+  <p:cSld>
+    <p:spTree>
+      <p:nvGrpSpPr>
+        <p:cNvPr id="236" name="Shape 236"/>
+        <p:cNvGrpSpPr/>
+        <p:nvPr/>
+      </p:nvGrpSpPr>
+      <p:grpSpPr>
+        <a:xfrm>
+          <a:off x="0" y="0"/>
+          <a:ext cx="0" cy="0"/>
+          <a:chOff x="0" y="0"/>
+          <a:chExt cx="0" cy="0"/>
+        </a:xfrm>
+      </p:grpSpPr>
+      <p:sp>
+        <p:nvSpPr>
+          <p:cNvPr id="237" name="Google Shape;237;p25"/>
+          <p:cNvSpPr txBox="1"/>
+          <p:nvPr>
+            <p:ph type="title"/>
+          </p:nvPr>
+        </p:nvSpPr>
+        <p:spPr>
+          <a:xfrm>
+            <a:off x="1297500" y="393750"/>
+            <a:ext cx="7038900" cy="914100"/>
+          </a:xfrm>
+          <a:prstGeom prst="rect">
+            <a:avLst/>
+          </a:prstGeom>
+        </p:spPr>
+        <p:txBody>
+          <a:bodyPr anchorCtr="0" anchor="t" bIns="91425" lIns="91425" spcFirstLastPara="1" rIns="91425" wrap="square" tIns="91425">
+            <a:normAutofit/>
+          </a:bodyPr>
+          <a:lstStyle/>
+          <a:p>
+            <a:pPr indent="0" lvl="0" marL="0" rtl="0" algn="l">
+              <a:spcBef>
+                <a:spcPts val="0"/>
+              </a:spcBef>
+              <a:spcAft>
+                <a:spcPts val="0"/>
+              </a:spcAft>
+              <a:buNone/>
+            </a:pPr>
+            <a:r>
+              <a:rPr lang="en"/>
+              <a:t>After our adjustments</a:t>
+            </a:r>
+            <a:endParaRPr/>
+          </a:p>
+        </p:txBody>
+      </p:sp>
+      <p:sp>
+        <p:nvSpPr>
+          <p:cNvPr id="238" name="Google Shape;238;p25"/>
           <p:cNvSpPr txBox="1"/>
           <p:nvPr>
             <p:ph idx="1" type="body"/>
@@ -11810,7 +13263,7 @@
             </a:pPr>
             <a:r>
               <a:rPr lang="en"/>
-              <a:t>The second time around, we ran another logistic regression. This time the accuracy score we achieved was 93%, just a mere 4 points less than the regression we ran with the size features. This leads us to believe there are other features that also have a strong indication of cancer besides just size.</a:t>
+              <a:t>The second time around, we ran another logistic regression. This time the accuracy score we achieved was__%, just a mere _ points less than the regression we ran with the size features. This leads us to believe there are other features that also have a strong indication of cancer besides just size.</a:t>
             </a:r>
             <a:endParaRPr/>
           </a:p>
@@ -11839,12 +13292,12 @@
 </p:sld>
 </file>
 
-<file path=ppt/slides/slide12.xml><?xml version="1.0" encoding="utf-8"?>
+<file path=ppt/slides/slide14.xml><?xml version="1.0" encoding="utf-8"?>
 <p:sld xmlns:a="http://schemas.openxmlformats.org/drawingml/2006/main" xmlns:r="http://schemas.openxmlformats.org/officeDocument/2006/relationships" xmlns:mc="http://schemas.openxmlformats.org/markup-compatibility/2006" xmlns:mv="urn:schemas-microsoft-com:mac:vml" xmlns:p="http://schemas.openxmlformats.org/presentationml/2006/main" xmlns:c="http://schemas.openxmlformats.org/drawingml/2006/chart" xmlns:dgm="http://schemas.openxmlformats.org/drawingml/2006/diagram" xmlns:o="urn:schemas-microsoft-com:office:office" xmlns:v="urn:schemas-microsoft-com:vml" xmlns:pvml="urn:schemas-microsoft-com:office:powerpoint" xmlns:com="http://schemas.openxmlformats.org/drawingml/2006/compatibility" xmlns:p14="http://schemas.microsoft.com/office/powerpoint/2010/main" xmlns:p15="http://schemas.microsoft.com/office/powerpoint/2012/main" xmlns:ahyp="http://schemas.microsoft.com/office/drawing/2018/hyperlinkcolor">
   <p:cSld>
     <p:spTree>
       <p:nvGrpSpPr>
-        <p:cNvPr id="228" name="Shape 228"/>
+        <p:cNvPr id="242" name="Shape 242"/>
         <p:cNvGrpSpPr/>
         <p:nvPr/>
       </p:nvGrpSpPr>
@@ -11858,7 +13311,7 @@
       </p:grpSpPr>
       <p:sp>
         <p:nvSpPr>
-          <p:cNvPr id="229" name="Google Shape;229;p24"/>
+          <p:cNvPr id="243" name="Google Shape;243;p26"/>
           <p:cNvSpPr txBox="1"/>
           <p:nvPr>
             <p:ph type="title"/>
@@ -11875,7 +13328,7 @@
         </p:spPr>
         <p:txBody>
           <a:bodyPr anchorCtr="0" anchor="t" bIns="91425" lIns="91425" spcFirstLastPara="1" rIns="91425" wrap="square" tIns="91425">
-            <a:normAutofit fontScale="90000"/>
+            <a:normAutofit/>
           </a:bodyPr>
           <a:lstStyle/>
           <a:p>
@@ -11890,20 +13343,11 @@
             </a:pPr>
             <a:r>
               <a:rPr lang="en"/>
-              <a:t>Recount of </a:t>
-            </a:r>
-            <a:r>
-              <a:rPr lang="en" sz="1500">
-                <a:latin typeface="Roboto"/>
-                <a:ea typeface="Roboto"/>
-                <a:cs typeface="Roboto"/>
-                <a:sym typeface="Roboto"/>
-              </a:rPr>
-              <a:t> </a:t>
+              <a:t>Recommendations</a:t>
             </a:r>
             <a:r>
               <a:rPr lang="en"/>
-              <a:t>Technologies, Tools, Languages, and Algorithms</a:t>
+              <a:t> for the Future</a:t>
             </a:r>
             <a:endParaRPr/>
           </a:p>
@@ -11911,7 +13355,7 @@
       </p:sp>
       <p:sp>
         <p:nvSpPr>
-          <p:cNvPr id="230" name="Google Shape;230;p24"/>
+          <p:cNvPr id="244" name="Google Shape;244;p26"/>
           <p:cNvSpPr txBox="1"/>
           <p:nvPr>
             <p:ph idx="1" type="body"/>
@@ -11919,8 +13363,8 @@
         </p:nvSpPr>
         <p:spPr>
           <a:xfrm>
-            <a:off x="1158525" y="1307850"/>
-            <a:ext cx="7720200" cy="3645900"/>
+            <a:off x="1297500" y="1567550"/>
+            <a:ext cx="7038900" cy="2911200"/>
           </a:xfrm>
           <a:prstGeom prst="rect">
             <a:avLst/>
@@ -11928,7 +13372,7 @@
         </p:spPr>
         <p:txBody>
           <a:bodyPr anchorCtr="0" anchor="t" bIns="91425" lIns="91425" spcFirstLastPara="1" rIns="91425" wrap="square" tIns="91425">
-            <a:normAutofit fontScale="92500"/>
+            <a:normAutofit/>
           </a:bodyPr>
           <a:lstStyle/>
           <a:p>
@@ -11937,20 +13381,68 @@
                 <a:spcPts val="0"/>
               </a:spcBef>
               <a:spcAft>
-                <a:spcPts val="0"/>
-              </a:spcAft>
-              <a:buNone/>
-            </a:pPr>
-            <a:r>
-              <a:rPr b="1" lang="en" sz="1500"/>
-              <a:t>Machine Learning Model: Google Colab - Python, Pandas, PySpark, and Matplotlib/Seaborn</a:t>
-            </a:r>
-            <a:endParaRPr b="1" sz="1500"/>
-          </a:p>
-          <a:p>
-            <a:pPr indent="457200" lvl="0" marL="0" rtl="0" algn="l">
-              <a:spcBef>
                 <a:spcPts val="1200"/>
+              </a:spcAft>
+              <a:buNone/>
+            </a:pPr>
+            <a:r>
+              <a:t/>
+            </a:r>
+            <a:endParaRPr/>
+          </a:p>
+        </p:txBody>
+      </p:sp>
+    </p:spTree>
+  </p:cSld>
+  <p:clrMapOvr>
+    <a:masterClrMapping/>
+  </p:clrMapOvr>
+</p:sld>
+</file>
+
+<file path=ppt/slides/slide15.xml><?xml version="1.0" encoding="utf-8"?>
+<p:sld xmlns:a="http://schemas.openxmlformats.org/drawingml/2006/main" xmlns:r="http://schemas.openxmlformats.org/officeDocument/2006/relationships" xmlns:mc="http://schemas.openxmlformats.org/markup-compatibility/2006" xmlns:mv="urn:schemas-microsoft-com:mac:vml" xmlns:p="http://schemas.openxmlformats.org/presentationml/2006/main" xmlns:c="http://schemas.openxmlformats.org/drawingml/2006/chart" xmlns:dgm="http://schemas.openxmlformats.org/drawingml/2006/diagram" xmlns:o="urn:schemas-microsoft-com:office:office" xmlns:v="urn:schemas-microsoft-com:vml" xmlns:pvml="urn:schemas-microsoft-com:office:powerpoint" xmlns:com="http://schemas.openxmlformats.org/drawingml/2006/compatibility" xmlns:p14="http://schemas.microsoft.com/office/powerpoint/2010/main" xmlns:p15="http://schemas.microsoft.com/office/powerpoint/2012/main" xmlns:ahyp="http://schemas.microsoft.com/office/drawing/2018/hyperlinkcolor">
+  <p:cSld>
+    <p:spTree>
+      <p:nvGrpSpPr>
+        <p:cNvPr id="248" name="Shape 248"/>
+        <p:cNvGrpSpPr/>
+        <p:nvPr/>
+      </p:nvGrpSpPr>
+      <p:grpSpPr>
+        <a:xfrm>
+          <a:off x="0" y="0"/>
+          <a:ext cx="0" cy="0"/>
+          <a:chOff x="0" y="0"/>
+          <a:chExt cx="0" cy="0"/>
+        </a:xfrm>
+      </p:grpSpPr>
+      <p:sp>
+        <p:nvSpPr>
+          <p:cNvPr id="249" name="Google Shape;249;p27"/>
+          <p:cNvSpPr txBox="1"/>
+          <p:nvPr>
+            <p:ph type="title"/>
+          </p:nvPr>
+        </p:nvSpPr>
+        <p:spPr>
+          <a:xfrm>
+            <a:off x="1297500" y="393750"/>
+            <a:ext cx="7038900" cy="914100"/>
+          </a:xfrm>
+          <a:prstGeom prst="rect">
+            <a:avLst/>
+          </a:prstGeom>
+        </p:spPr>
+        <p:txBody>
+          <a:bodyPr anchorCtr="0" anchor="t" bIns="91425" lIns="91425" spcFirstLastPara="1" rIns="91425" wrap="square" tIns="91425">
+            <a:normAutofit/>
+          </a:bodyPr>
+          <a:lstStyle/>
+          <a:p>
+            <a:pPr indent="0" lvl="0" marL="0" rtl="0" algn="l">
+              <a:spcBef>
+                <a:spcPts val="0"/>
               </a:spcBef>
               <a:spcAft>
                 <a:spcPts val="0"/>
@@ -11959,34 +13451,106 @@
             </a:pPr>
             <a:r>
               <a:rPr lang="en"/>
-              <a:t>For ease of sharing amongst all four members, we used Google Colab to write and build our Machine Learning Model. This would also allow us to easily upload the DataBase through the cloud easier with Amazon Web Services (AWS).</a:t>
+              <a:t>What we would have done </a:t>
+            </a:r>
+            <a:r>
+              <a:rPr lang="en"/>
+              <a:t>differently</a:t>
             </a:r>
             <a:endParaRPr/>
           </a:p>
+        </p:txBody>
+      </p:sp>
+      <p:sp>
+        <p:nvSpPr>
+          <p:cNvPr id="250" name="Google Shape;250;p27"/>
+          <p:cNvSpPr txBox="1"/>
+          <p:nvPr>
+            <p:ph idx="1" type="body"/>
+          </p:nvPr>
+        </p:nvSpPr>
+        <p:spPr>
+          <a:xfrm>
+            <a:off x="1297500" y="1567550"/>
+            <a:ext cx="7038900" cy="2911200"/>
+          </a:xfrm>
+          <a:prstGeom prst="rect">
+            <a:avLst/>
+          </a:prstGeom>
+        </p:spPr>
+        <p:txBody>
+          <a:bodyPr anchorCtr="0" anchor="t" bIns="91425" lIns="91425" spcFirstLastPara="1" rIns="91425" wrap="square" tIns="91425">
+            <a:normAutofit/>
+          </a:bodyPr>
+          <a:lstStyle/>
           <a:p>
             <a:pPr indent="0" lvl="0" marL="0" rtl="0" algn="l">
               <a:spcBef>
+                <a:spcPts val="0"/>
+              </a:spcBef>
+              <a:spcAft>
                 <a:spcPts val="1200"/>
-              </a:spcBef>
-              <a:spcAft>
-                <a:spcPts val="0"/>
-              </a:spcAft>
-              <a:buNone/>
-            </a:pPr>
-            <a:r>
-              <a:rPr b="1" lang="en" sz="1500"/>
-              <a:t>DataBase: AWS - RDS and S3 &amp; </a:t>
-            </a:r>
-            <a:r>
-              <a:rPr b="1" lang="en" sz="1500"/>
-              <a:t>Postgres</a:t>
-            </a:r>
-            <a:endParaRPr b="1" sz="1500"/>
-          </a:p>
+              </a:spcAft>
+              <a:buNone/>
+            </a:pPr>
+            <a:r>
+              <a:t/>
+            </a:r>
+            <a:endParaRPr/>
+          </a:p>
+        </p:txBody>
+      </p:sp>
+    </p:spTree>
+  </p:cSld>
+  <p:clrMapOvr>
+    <a:masterClrMapping/>
+  </p:clrMapOvr>
+</p:sld>
+</file>
+
+<file path=ppt/slides/slide16.xml><?xml version="1.0" encoding="utf-8"?>
+<p:sld xmlns:a="http://schemas.openxmlformats.org/drawingml/2006/main" xmlns:r="http://schemas.openxmlformats.org/officeDocument/2006/relationships" xmlns:mc="http://schemas.openxmlformats.org/markup-compatibility/2006" xmlns:mv="urn:schemas-microsoft-com:mac:vml" xmlns:p="http://schemas.openxmlformats.org/presentationml/2006/main" xmlns:c="http://schemas.openxmlformats.org/drawingml/2006/chart" xmlns:dgm="http://schemas.openxmlformats.org/drawingml/2006/diagram" xmlns:o="urn:schemas-microsoft-com:office:office" xmlns:v="urn:schemas-microsoft-com:vml" xmlns:pvml="urn:schemas-microsoft-com:office:powerpoint" xmlns:com="http://schemas.openxmlformats.org/drawingml/2006/compatibility" xmlns:p14="http://schemas.microsoft.com/office/powerpoint/2010/main" xmlns:p15="http://schemas.microsoft.com/office/powerpoint/2012/main" xmlns:ahyp="http://schemas.microsoft.com/office/drawing/2018/hyperlinkcolor">
+  <p:cSld>
+    <p:spTree>
+      <p:nvGrpSpPr>
+        <p:cNvPr id="254" name="Shape 254"/>
+        <p:cNvGrpSpPr/>
+        <p:nvPr/>
+      </p:nvGrpSpPr>
+      <p:grpSpPr>
+        <a:xfrm>
+          <a:off x="0" y="0"/>
+          <a:ext cx="0" cy="0"/>
+          <a:chOff x="0" y="0"/>
+          <a:chExt cx="0" cy="0"/>
+        </a:xfrm>
+      </p:grpSpPr>
+      <p:sp>
+        <p:nvSpPr>
+          <p:cNvPr id="255" name="Google Shape;255;p28"/>
+          <p:cNvSpPr txBox="1"/>
+          <p:nvPr>
+            <p:ph type="title"/>
+          </p:nvPr>
+        </p:nvSpPr>
+        <p:spPr>
+          <a:xfrm>
+            <a:off x="1297500" y="393750"/>
+            <a:ext cx="7038900" cy="914100"/>
+          </a:xfrm>
+          <a:prstGeom prst="rect">
+            <a:avLst/>
+          </a:prstGeom>
+        </p:spPr>
+        <p:txBody>
+          <a:bodyPr anchorCtr="0" anchor="t" bIns="91425" lIns="91425" spcFirstLastPara="1" rIns="91425" wrap="square" tIns="91425">
+            <a:normAutofit/>
+          </a:bodyPr>
+          <a:lstStyle/>
           <a:p>
             <a:pPr indent="0" lvl="0" marL="0" rtl="0" algn="l">
               <a:spcBef>
-                <a:spcPts val="1200"/>
+                <a:spcPts val="0"/>
               </a:spcBef>
               <a:spcAft>
                 <a:spcPts val="0"/>
@@ -11995,55 +13559,7 @@
             </a:pPr>
             <a:r>
               <a:rPr lang="en"/>
-              <a:t>	As stated previously, AWS was used to </a:t>
-            </a:r>
-            <a:r>
-              <a:rPr lang="en"/>
-              <a:t>easily</a:t>
-            </a:r>
-            <a:r>
-              <a:rPr lang="en"/>
-              <a:t> add the DataBase to our notebook. With AWS, we connected to the Database locally with </a:t>
-            </a:r>
-            <a:r>
-              <a:rPr lang="en"/>
-              <a:t>Postgres</a:t>
-            </a:r>
-            <a:r>
-              <a:rPr lang="en"/>
-              <a:t> to create the tables we used for this model. After the tables were created, we loaded them back to AWS, which can then be added to our notebook on Google Colab</a:t>
-            </a:r>
-            <a:endParaRPr/>
-          </a:p>
-          <a:p>
-            <a:pPr indent="0" lvl="0" marL="0" rtl="0" algn="l">
-              <a:spcBef>
-                <a:spcPts val="1200"/>
-              </a:spcBef>
-              <a:spcAft>
-                <a:spcPts val="0"/>
-              </a:spcAft>
-              <a:buNone/>
-            </a:pPr>
-            <a:r>
-              <a:rPr b="1" lang="en" sz="1500"/>
-              <a:t>Interactive Visualization: Tableau</a:t>
-            </a:r>
-            <a:endParaRPr b="1" sz="1500"/>
-          </a:p>
-          <a:p>
-            <a:pPr indent="0" lvl="0" marL="0" rtl="0" algn="l">
-              <a:spcBef>
-                <a:spcPts val="1200"/>
-              </a:spcBef>
-              <a:spcAft>
-                <a:spcPts val="1200"/>
-              </a:spcAft>
-              <a:buNone/>
-            </a:pPr>
-            <a:r>
-              <a:rPr lang="en"/>
-              <a:t>	For the dashboard we created, we used Tableau to create a drop down menu of the different graphs we created in order to allow the user to have a better grasp of how different features affect the diagnosis of the patient’s sample.</a:t>
+              <a:t>Questions</a:t>
             </a:r>
             <a:endParaRPr/>
           </a:p>
@@ -12476,7 +13992,7 @@
         </p:nvSpPr>
         <p:spPr>
           <a:xfrm>
-            <a:off x="2157150" y="1005250"/>
+            <a:off x="2594700" y="1005250"/>
             <a:ext cx="6179400" cy="1054800"/>
           </a:xfrm>
           <a:prstGeom prst="rect">
@@ -12515,7 +14031,7 @@
                 <a:cs typeface="Lato"/>
                 <a:sym typeface="Lato"/>
               </a:rPr>
-              <a:t>Before moving forward, it is important to cover a few details about tumor cells and how they’re distinguishable from normal cells.</a:t>
+              <a:t>Before moving forward, it is important to cover a few details about tumor cells and how they’re distinguishable from normal healthy cells.</a:t>
             </a:r>
             <a:endParaRPr>
               <a:solidFill>
@@ -12538,7 +14054,7 @@
         <p:spPr>
           <a:xfrm>
             <a:off x="3232875" y="1697600"/>
-            <a:ext cx="5796300" cy="2986200"/>
+            <a:ext cx="5796300" cy="1939500"/>
           </a:xfrm>
           <a:prstGeom prst="rect">
             <a:avLst/>
@@ -12630,61 +14146,6 @@
             <a:r>
               <a:t/>
             </a:r>
-            <a:endParaRPr sz="1700">
-              <a:solidFill>
-                <a:srgbClr val="FFFFFF"/>
-              </a:solidFill>
-              <a:latin typeface="Lato"/>
-              <a:ea typeface="Lato"/>
-              <a:cs typeface="Lato"/>
-              <a:sym typeface="Lato"/>
-            </a:endParaRPr>
-          </a:p>
-          <a:p>
-            <a:pPr indent="0" lvl="0" marL="0" rtl="0" algn="l">
-              <a:spcBef>
-                <a:spcPts val="0"/>
-              </a:spcBef>
-              <a:spcAft>
-                <a:spcPts val="0"/>
-              </a:spcAft>
-              <a:buNone/>
-            </a:pPr>
-            <a:r>
-              <a:rPr lang="en" sz="1700">
-                <a:solidFill>
-                  <a:srgbClr val="FFFFFF"/>
-                </a:solidFill>
-                <a:latin typeface="Lato"/>
-                <a:ea typeface="Lato"/>
-                <a:cs typeface="Lato"/>
-                <a:sym typeface="Lato"/>
-              </a:rPr>
-              <a:t>The figure to the left shows the hallmarks of cancer, which are steps a cell and its daughter cells would need to accomplish in order to become cancer cells.</a:t>
-            </a:r>
-            <a:endParaRPr sz="1700">
-              <a:solidFill>
-                <a:srgbClr val="FFFFFF"/>
-              </a:solidFill>
-              <a:latin typeface="Lato"/>
-              <a:ea typeface="Lato"/>
-              <a:cs typeface="Lato"/>
-              <a:sym typeface="Lato"/>
-            </a:endParaRPr>
-          </a:p>
-          <a:p>
-            <a:pPr indent="0" lvl="0" marL="0" rtl="0" algn="l">
-              <a:spcBef>
-                <a:spcPts val="0"/>
-              </a:spcBef>
-              <a:spcAft>
-                <a:spcPts val="0"/>
-              </a:spcAft>
-              <a:buNone/>
-            </a:pPr>
-            <a:r>
-              <a:t/>
-            </a:r>
             <a:endParaRPr sz="1200">
               <a:solidFill>
                 <a:srgbClr val="FFFFFF"/>
@@ -12697,43 +14158,15 @@
           </a:p>
         </p:txBody>
       </p:sp>
-      <p:pic>
-        <p:nvPicPr>
-          <p:cNvPr id="153" name="Google Shape;153;p15"/>
-          <p:cNvPicPr preferRelativeResize="0"/>
-          <p:nvPr/>
-        </p:nvPicPr>
-        <p:blipFill>
-          <a:blip r:embed="rId3">
-            <a:alphaModFix amt="82000"/>
-          </a:blip>
-          <a:stretch>
-            <a:fillRect/>
-          </a:stretch>
-        </p:blipFill>
-        <p:spPr>
-          <a:xfrm>
-            <a:off x="122475" y="1809150"/>
-            <a:ext cx="3031350" cy="1821200"/>
-          </a:xfrm>
-          <a:prstGeom prst="rect">
-            <a:avLst/>
-          </a:prstGeom>
-          <a:noFill/>
-          <a:ln>
-            <a:noFill/>
-          </a:ln>
-        </p:spPr>
-      </p:pic>
       <p:sp>
         <p:nvSpPr>
-          <p:cNvPr id="154" name="Google Shape;154;p15"/>
+          <p:cNvPr id="153" name="Google Shape;153;p15"/>
           <p:cNvSpPr txBox="1"/>
           <p:nvPr/>
         </p:nvSpPr>
         <p:spPr>
           <a:xfrm>
-            <a:off x="138150" y="3630350"/>
+            <a:off x="79700" y="3952200"/>
             <a:ext cx="3000000" cy="276900"/>
           </a:xfrm>
           <a:prstGeom prst="rect">
@@ -12769,12 +14202,48 @@
                 <a:cs typeface="Lato"/>
                 <a:sym typeface="Lato"/>
               </a:rPr>
-              <a:t>https://www.cell.com/fulltext/S0092-8674(11)00127-9</a:t>
-            </a:r>
-            <a:endParaRPr sz="1100"/>
+              <a:t>https://www.verywellhealth.com/cancer-cells-vs-normal-cells-2248794</a:t>
+            </a:r>
+            <a:endParaRPr sz="600">
+              <a:solidFill>
+                <a:schemeClr val="lt1"/>
+              </a:solidFill>
+              <a:latin typeface="Lato"/>
+              <a:ea typeface="Lato"/>
+              <a:cs typeface="Lato"/>
+              <a:sym typeface="Lato"/>
+            </a:endParaRPr>
           </a:p>
         </p:txBody>
       </p:sp>
+      <p:pic>
+        <p:nvPicPr>
+          <p:cNvPr id="154" name="Google Shape;154;p15"/>
+          <p:cNvPicPr preferRelativeResize="0"/>
+          <p:nvPr/>
+        </p:nvPicPr>
+        <p:blipFill>
+          <a:blip r:embed="rId3">
+            <a:alphaModFix/>
+          </a:blip>
+          <a:stretch>
+            <a:fillRect/>
+          </a:stretch>
+        </p:blipFill>
+        <p:spPr>
+          <a:xfrm>
+            <a:off x="79700" y="1576550"/>
+            <a:ext cx="3095626" cy="2322300"/>
+          </a:xfrm>
+          <a:prstGeom prst="rect">
+            <a:avLst/>
+          </a:prstGeom>
+          <a:noFill/>
+          <a:ln>
+            <a:noFill/>
+          </a:ln>
+        </p:spPr>
+      </p:pic>
     </p:spTree>
   </p:cSld>
   <p:clrMapOvr>
@@ -12850,8 +14319,8 @@
         </p:nvSpPr>
         <p:spPr>
           <a:xfrm>
-            <a:off x="1093275" y="1610213"/>
-            <a:ext cx="4203600" cy="2283600"/>
+            <a:off x="1093275" y="1214452"/>
+            <a:ext cx="4203600" cy="2679300"/>
           </a:xfrm>
           <a:prstGeom prst="rect">
             <a:avLst/>
@@ -12877,10 +14346,10 @@
               <a:buNone/>
             </a:pPr>
             <a:r>
-              <a:rPr lang="en" sz="1604"/>
+              <a:rPr lang="en" sz="1704"/>
               <a:t>The measures used to create our dataset were created through the use of FNA (fine needle aspiration) samples of individuals with suspected tumors.</a:t>
             </a:r>
-            <a:endParaRPr sz="1604"/>
+            <a:endParaRPr sz="1704"/>
           </a:p>
           <a:p>
             <a:pPr indent="0" lvl="0" marL="0" rtl="0" algn="l">
@@ -12899,7 +14368,7 @@
             <a:r>
               <a:t/>
             </a:r>
-            <a:endParaRPr sz="1604"/>
+            <a:endParaRPr sz="1704"/>
           </a:p>
           <a:p>
             <a:pPr indent="0" lvl="0" marL="0" rtl="0" algn="l">
@@ -12916,10 +14385,10 @@
               <a:buNone/>
             </a:pPr>
             <a:r>
-              <a:rPr lang="en" sz="1604"/>
+              <a:rPr lang="en" sz="1704"/>
               <a:t>The measures we used are as follows:</a:t>
             </a:r>
-            <a:endParaRPr sz="1604"/>
+            <a:endParaRPr sz="1704"/>
           </a:p>
           <a:p>
             <a:pPr indent="0" lvl="0" marL="0" rtl="0" algn="l">
@@ -12936,10 +14405,10 @@
               <a:buNone/>
             </a:pPr>
             <a:r>
-              <a:rPr b="1" lang="en" sz="1535"/>
+              <a:rPr b="1" lang="en" sz="1635"/>
               <a:t>Radius, Texture, Perimeter, Area,  Smoothness, Compactness, Concavity, Concave Points, Symmetry, and Fractal Dimension</a:t>
             </a:r>
-            <a:endParaRPr b="1" sz="1535"/>
+            <a:endParaRPr b="1" sz="1635"/>
           </a:p>
           <a:p>
             <a:pPr indent="0" lvl="0" marL="0" rtl="0" algn="l">
@@ -12958,47 +14427,19 @@
             <a:r>
               <a:t/>
             </a:r>
-            <a:endParaRPr sz="1604"/>
+            <a:endParaRPr sz="1704"/>
           </a:p>
         </p:txBody>
       </p:sp>
-      <p:pic>
-        <p:nvPicPr>
-          <p:cNvPr id="161" name="Google Shape;161;p16"/>
-          <p:cNvPicPr preferRelativeResize="0"/>
-          <p:nvPr/>
-        </p:nvPicPr>
-        <p:blipFill>
-          <a:blip r:embed="rId3">
-            <a:alphaModFix/>
-          </a:blip>
-          <a:stretch>
-            <a:fillRect/>
-          </a:stretch>
-        </p:blipFill>
-        <p:spPr>
-          <a:xfrm>
-            <a:off x="5395100" y="1569087"/>
-            <a:ext cx="3548850" cy="2365875"/>
-          </a:xfrm>
-          <a:prstGeom prst="rect">
-            <a:avLst/>
-          </a:prstGeom>
-          <a:noFill/>
-          <a:ln>
-            <a:noFill/>
-          </a:ln>
-        </p:spPr>
-      </p:pic>
       <p:sp>
         <p:nvSpPr>
-          <p:cNvPr id="162" name="Google Shape;162;p16"/>
+          <p:cNvPr id="161" name="Google Shape;161;p16"/>
           <p:cNvSpPr txBox="1"/>
           <p:nvPr/>
         </p:nvSpPr>
         <p:spPr>
           <a:xfrm>
-            <a:off x="5458950" y="4039450"/>
+            <a:off x="5271250" y="3555700"/>
             <a:ext cx="2847900" cy="276900"/>
           </a:xfrm>
           <a:prstGeom prst="rect">
@@ -13025,6 +14466,83 @@
               <a:buNone/>
             </a:pPr>
             <a:r>
+              <a:t/>
+            </a:r>
+            <a:endParaRPr sz="600">
+              <a:solidFill>
+                <a:schemeClr val="lt1"/>
+              </a:solidFill>
+              <a:latin typeface="Lato"/>
+              <a:ea typeface="Lato"/>
+              <a:cs typeface="Lato"/>
+              <a:sym typeface="Lato"/>
+            </a:endParaRPr>
+          </a:p>
+        </p:txBody>
+      </p:sp>
+      <p:pic>
+        <p:nvPicPr>
+          <p:cNvPr id="162" name="Google Shape;162;p16"/>
+          <p:cNvPicPr preferRelativeResize="0"/>
+          <p:nvPr/>
+        </p:nvPicPr>
+        <p:blipFill>
+          <a:blip r:embed="rId3">
+            <a:alphaModFix/>
+          </a:blip>
+          <a:stretch>
+            <a:fillRect/>
+          </a:stretch>
+        </p:blipFill>
+        <p:spPr>
+          <a:xfrm>
+            <a:off x="5725875" y="1030975"/>
+            <a:ext cx="2610525" cy="2632875"/>
+          </a:xfrm>
+          <a:prstGeom prst="rect">
+            <a:avLst/>
+          </a:prstGeom>
+          <a:noFill/>
+          <a:ln>
+            <a:noFill/>
+          </a:ln>
+        </p:spPr>
+      </p:pic>
+      <p:sp>
+        <p:nvSpPr>
+          <p:cNvPr id="163" name="Google Shape;163;p16"/>
+          <p:cNvSpPr txBox="1"/>
+          <p:nvPr/>
+        </p:nvSpPr>
+        <p:spPr>
+          <a:xfrm>
+            <a:off x="5725875" y="3714750"/>
+            <a:ext cx="3000000" cy="369300"/>
+          </a:xfrm>
+          <a:prstGeom prst="rect">
+            <a:avLst/>
+          </a:prstGeom>
+          <a:noFill/>
+          <a:ln>
+            <a:noFill/>
+          </a:ln>
+        </p:spPr>
+        <p:txBody>
+          <a:bodyPr anchorCtr="0" anchor="t" bIns="91425" lIns="91425" spcFirstLastPara="1" rIns="91425" wrap="square" tIns="91425">
+            <a:spAutoFit/>
+          </a:bodyPr>
+          <a:lstStyle/>
+          <a:p>
+            <a:pPr indent="0" lvl="0" marL="0" rtl="0" algn="l">
+              <a:spcBef>
+                <a:spcPts val="0"/>
+              </a:spcBef>
+              <a:spcAft>
+                <a:spcPts val="0"/>
+              </a:spcAft>
+              <a:buNone/>
+            </a:pPr>
+            <a:r>
               <a:rPr lang="en" sz="600">
                 <a:solidFill>
                   <a:schemeClr val="lt1"/>
@@ -13034,17 +14552,9 @@
                 <a:cs typeface="Lato"/>
                 <a:sym typeface="Lato"/>
               </a:rPr>
-              <a:t>https://www.cancer.gov/about-cancer/understanding/what-is-cancer</a:t>
-            </a:r>
-            <a:endParaRPr sz="600">
-              <a:solidFill>
-                <a:schemeClr val="lt1"/>
-              </a:solidFill>
-              <a:latin typeface="Lato"/>
-              <a:ea typeface="Lato"/>
-              <a:cs typeface="Lato"/>
-              <a:sym typeface="Lato"/>
-            </a:endParaRPr>
+              <a:t>https://www.cancer.org/cancer/breast-cancer/screening-tests-and-early-detection/breast-biopsy/fine-needle-aspiration-biopsy-of-the-breast.html</a:t>
+            </a:r>
+            <a:endParaRPr sz="1100"/>
           </a:p>
         </p:txBody>
       </p:sp>
@@ -13061,7 +14571,7 @@
   <p:cSld>
     <p:spTree>
       <p:nvGrpSpPr>
-        <p:cNvPr id="166" name="Shape 166"/>
+        <p:cNvPr id="167" name="Shape 167"/>
         <p:cNvGrpSpPr/>
         <p:nvPr/>
       </p:nvGrpSpPr>
@@ -13075,7 +14585,7 @@
       </p:grpSpPr>
       <p:sp>
         <p:nvSpPr>
-          <p:cNvPr id="167" name="Google Shape;167;p17"/>
+          <p:cNvPr id="168" name="Google Shape;168;p17"/>
           <p:cNvSpPr txBox="1"/>
           <p:nvPr>
             <p:ph type="title"/>
@@ -13115,7 +14625,7 @@
       </p:sp>
       <p:sp>
         <p:nvSpPr>
-          <p:cNvPr id="168" name="Google Shape;168;p17"/>
+          <p:cNvPr id="169" name="Google Shape;169;p17"/>
           <p:cNvSpPr txBox="1"/>
           <p:nvPr>
             <p:ph idx="1" type="body"/>
@@ -13124,7 +14634,7 @@
         <p:spPr>
           <a:xfrm>
             <a:off x="1297500" y="1367725"/>
-            <a:ext cx="7038900" cy="2911200"/>
+            <a:ext cx="7038900" cy="3775800"/>
           </a:xfrm>
           <a:prstGeom prst="rect">
             <a:avLst/>
@@ -13147,12 +14657,30 @@
             </a:pPr>
             <a:r>
               <a:rPr lang="en" sz="1700"/>
-              <a:t>Our goal is to apply the power of machine learning models to identify the likelihood that a tumor could either be benign or malignant. To this, we first need to answer the following questions:</a:t>
+              <a:t>Our goal is to apply the power of machine learning models to identify the likelihood that a tumor could either be benign or malignant. To accomplish this, we first need to answer the following questions:</a:t>
             </a:r>
             <a:endParaRPr sz="1700"/>
           </a:p>
           <a:p>
+            <a:pPr indent="0" lvl="0" marL="0" rtl="0" algn="l">
+              <a:spcBef>
+                <a:spcPts val="1200"/>
+              </a:spcBef>
+              <a:spcAft>
+                <a:spcPts val="0"/>
+              </a:spcAft>
+              <a:buNone/>
+            </a:pPr>
+            <a:r>
+              <a:t/>
+            </a:r>
+            <a:endParaRPr sz="1700"/>
+          </a:p>
+          <a:p>
             <a:pPr indent="-323850" lvl="0" marL="457200" rtl="0" algn="l">
+              <a:lnSpc>
+                <a:spcPct val="200000"/>
+              </a:lnSpc>
               <a:spcBef>
                 <a:spcPts val="1200"/>
               </a:spcBef>
@@ -13164,12 +14692,15 @@
             </a:pPr>
             <a:r>
               <a:rPr lang="en" sz="1500"/>
-              <a:t>After examining our data, which features have the greatest likelihood of predicting malignancy?</a:t>
+              <a:t>Which features have the greatest likelihood of predicting malignancy?</a:t>
             </a:r>
             <a:endParaRPr sz="1500"/>
           </a:p>
           <a:p>
             <a:pPr indent="-323850" lvl="0" marL="457200" rtl="0" algn="l">
+              <a:lnSpc>
+                <a:spcPct val="200000"/>
+              </a:lnSpc>
               <a:spcBef>
                 <a:spcPts val="0"/>
               </a:spcBef>
@@ -13187,6 +14718,9 @@
           </a:p>
           <a:p>
             <a:pPr indent="-323850" lvl="0" marL="457200" rtl="0" algn="l">
+              <a:lnSpc>
+                <a:spcPct val="200000"/>
+              </a:lnSpc>
               <a:spcBef>
                 <a:spcPts val="0"/>
               </a:spcBef>
@@ -13232,7 +14766,7 @@
   <p:cSld>
     <p:spTree>
       <p:nvGrpSpPr>
-        <p:cNvPr id="172" name="Shape 172"/>
+        <p:cNvPr id="173" name="Shape 173"/>
         <p:cNvGrpSpPr/>
         <p:nvPr/>
       </p:nvGrpSpPr>
@@ -13246,7 +14780,225 @@
       </p:grpSpPr>
       <p:sp>
         <p:nvSpPr>
-          <p:cNvPr id="173" name="Google Shape;173;p18"/>
+          <p:cNvPr id="174" name="Google Shape;174;p18"/>
+          <p:cNvSpPr txBox="1"/>
+          <p:nvPr>
+            <p:ph type="title"/>
+          </p:nvPr>
+        </p:nvSpPr>
+        <p:spPr>
+          <a:xfrm>
+            <a:off x="1297500" y="393750"/>
+            <a:ext cx="7038900" cy="914100"/>
+          </a:xfrm>
+          <a:prstGeom prst="rect">
+            <a:avLst/>
+          </a:prstGeom>
+        </p:spPr>
+        <p:txBody>
+          <a:bodyPr anchorCtr="0" anchor="t" bIns="91425" lIns="91425" spcFirstLastPara="1" rIns="91425" wrap="square" tIns="91425">
+            <a:normAutofit fontScale="90000"/>
+          </a:bodyPr>
+          <a:lstStyle/>
+          <a:p>
+            <a:pPr indent="0" lvl="0" marL="0" rtl="0" algn="l">
+              <a:spcBef>
+                <a:spcPts val="0"/>
+              </a:spcBef>
+              <a:spcAft>
+                <a:spcPts val="0"/>
+              </a:spcAft>
+              <a:buNone/>
+            </a:pPr>
+            <a:r>
+              <a:rPr lang="en"/>
+              <a:t>Recount of </a:t>
+            </a:r>
+            <a:r>
+              <a:rPr lang="en" sz="1500">
+                <a:latin typeface="Roboto"/>
+                <a:ea typeface="Roboto"/>
+                <a:cs typeface="Roboto"/>
+                <a:sym typeface="Roboto"/>
+              </a:rPr>
+              <a:t> </a:t>
+            </a:r>
+            <a:r>
+              <a:rPr lang="en"/>
+              <a:t>Technologies, Tools, Languages, and Algorithms</a:t>
+            </a:r>
+            <a:endParaRPr/>
+          </a:p>
+        </p:txBody>
+      </p:sp>
+      <p:sp>
+        <p:nvSpPr>
+          <p:cNvPr id="175" name="Google Shape;175;p18"/>
+          <p:cNvSpPr txBox="1"/>
+          <p:nvPr>
+            <p:ph idx="1" type="body"/>
+          </p:nvPr>
+        </p:nvSpPr>
+        <p:spPr>
+          <a:xfrm>
+            <a:off x="1158525" y="1307850"/>
+            <a:ext cx="7720200" cy="3645900"/>
+          </a:xfrm>
+          <a:prstGeom prst="rect">
+            <a:avLst/>
+          </a:prstGeom>
+        </p:spPr>
+        <p:txBody>
+          <a:bodyPr anchorCtr="0" anchor="t" bIns="91425" lIns="91425" spcFirstLastPara="1" rIns="91425" wrap="square" tIns="91425">
+            <a:normAutofit fontScale="92500"/>
+          </a:bodyPr>
+          <a:lstStyle/>
+          <a:p>
+            <a:pPr indent="0" lvl="0" marL="0" rtl="0" algn="l">
+              <a:spcBef>
+                <a:spcPts val="0"/>
+              </a:spcBef>
+              <a:spcAft>
+                <a:spcPts val="0"/>
+              </a:spcAft>
+              <a:buNone/>
+            </a:pPr>
+            <a:r>
+              <a:rPr b="1" lang="en" sz="1500"/>
+              <a:t>Machine Learning Model: Google Colab - Python, Pandas, PySpark, and Matplotlib/Seaborn</a:t>
+            </a:r>
+            <a:endParaRPr b="1" sz="1500"/>
+          </a:p>
+          <a:p>
+            <a:pPr indent="457200" lvl="0" marL="0" rtl="0" algn="l">
+              <a:spcBef>
+                <a:spcPts val="1200"/>
+              </a:spcBef>
+              <a:spcAft>
+                <a:spcPts val="0"/>
+              </a:spcAft>
+              <a:buNone/>
+            </a:pPr>
+            <a:r>
+              <a:rPr lang="en"/>
+              <a:t>For ease of sharing amongst all four members, we used Google Colab to write and build our Machine Learning Model. This would also allow us to easily upload the DataBase through the cloud easier with Amazon Web Services (AWS).</a:t>
+            </a:r>
+            <a:endParaRPr/>
+          </a:p>
+          <a:p>
+            <a:pPr indent="0" lvl="0" marL="0" rtl="0" algn="l">
+              <a:spcBef>
+                <a:spcPts val="1200"/>
+              </a:spcBef>
+              <a:spcAft>
+                <a:spcPts val="0"/>
+              </a:spcAft>
+              <a:buNone/>
+            </a:pPr>
+            <a:r>
+              <a:rPr b="1" lang="en" sz="1500"/>
+              <a:t>DataBase: AWS - RDS and S3 &amp; </a:t>
+            </a:r>
+            <a:r>
+              <a:rPr b="1" lang="en" sz="1500"/>
+              <a:t>Postgres</a:t>
+            </a:r>
+            <a:endParaRPr b="1" sz="1500"/>
+          </a:p>
+          <a:p>
+            <a:pPr indent="0" lvl="0" marL="0" rtl="0" algn="l">
+              <a:spcBef>
+                <a:spcPts val="1200"/>
+              </a:spcBef>
+              <a:spcAft>
+                <a:spcPts val="0"/>
+              </a:spcAft>
+              <a:buNone/>
+            </a:pPr>
+            <a:r>
+              <a:rPr lang="en"/>
+              <a:t>	As stated previously, AWS was used to </a:t>
+            </a:r>
+            <a:r>
+              <a:rPr lang="en"/>
+              <a:t>easily</a:t>
+            </a:r>
+            <a:r>
+              <a:rPr lang="en"/>
+              <a:t> add the DataBase to our notebook. With AWS, we connected to the Database locally with </a:t>
+            </a:r>
+            <a:r>
+              <a:rPr lang="en"/>
+              <a:t>Postgres</a:t>
+            </a:r>
+            <a:r>
+              <a:rPr lang="en"/>
+              <a:t> to create the tables we used for this model. After the tables were created, we loaded them back to AWS, which can then be added to our notebook on Google Colab</a:t>
+            </a:r>
+            <a:endParaRPr/>
+          </a:p>
+          <a:p>
+            <a:pPr indent="0" lvl="0" marL="0" rtl="0" algn="l">
+              <a:spcBef>
+                <a:spcPts val="1200"/>
+              </a:spcBef>
+              <a:spcAft>
+                <a:spcPts val="0"/>
+              </a:spcAft>
+              <a:buNone/>
+            </a:pPr>
+            <a:r>
+              <a:rPr b="1" lang="en" sz="1500"/>
+              <a:t>Interactive Visualization: Tableau</a:t>
+            </a:r>
+            <a:endParaRPr b="1" sz="1500"/>
+          </a:p>
+          <a:p>
+            <a:pPr indent="0" lvl="0" marL="0" rtl="0" algn="l">
+              <a:spcBef>
+                <a:spcPts val="1200"/>
+              </a:spcBef>
+              <a:spcAft>
+                <a:spcPts val="1200"/>
+              </a:spcAft>
+              <a:buNone/>
+            </a:pPr>
+            <a:r>
+              <a:rPr lang="en"/>
+              <a:t>	For the dashboard we created, we used Tableau to create a drop down menu of the different graphs we created in order to allow the user to have a better grasp of how different features affect the diagnosis of the patient’s sample.</a:t>
+            </a:r>
+            <a:endParaRPr/>
+          </a:p>
+        </p:txBody>
+      </p:sp>
+    </p:spTree>
+  </p:cSld>
+  <p:clrMapOvr>
+    <a:masterClrMapping/>
+  </p:clrMapOvr>
+</p:sld>
+</file>
+
+<file path=ppt/slides/slide7.xml><?xml version="1.0" encoding="utf-8"?>
+<p:sld xmlns:a="http://schemas.openxmlformats.org/drawingml/2006/main" xmlns:r="http://schemas.openxmlformats.org/officeDocument/2006/relationships" xmlns:mc="http://schemas.openxmlformats.org/markup-compatibility/2006" xmlns:mv="urn:schemas-microsoft-com:mac:vml" xmlns:p="http://schemas.openxmlformats.org/presentationml/2006/main" xmlns:c="http://schemas.openxmlformats.org/drawingml/2006/chart" xmlns:dgm="http://schemas.openxmlformats.org/drawingml/2006/diagram" xmlns:o="urn:schemas-microsoft-com:office:office" xmlns:v="urn:schemas-microsoft-com:vml" xmlns:pvml="urn:schemas-microsoft-com:office:powerpoint" xmlns:com="http://schemas.openxmlformats.org/drawingml/2006/compatibility" xmlns:p14="http://schemas.microsoft.com/office/powerpoint/2010/main" xmlns:p15="http://schemas.microsoft.com/office/powerpoint/2012/main" xmlns:ahyp="http://schemas.microsoft.com/office/drawing/2018/hyperlinkcolor">
+  <p:cSld>
+    <p:spTree>
+      <p:nvGrpSpPr>
+        <p:cNvPr id="179" name="Shape 179"/>
+        <p:cNvGrpSpPr/>
+        <p:nvPr/>
+      </p:nvGrpSpPr>
+      <p:grpSpPr>
+        <a:xfrm>
+          <a:off x="0" y="0"/>
+          <a:ext cx="0" cy="0"/>
+          <a:chOff x="0" y="0"/>
+          <a:chExt cx="0" cy="0"/>
+        </a:xfrm>
+      </p:grpSpPr>
+      <p:sp>
+        <p:nvSpPr>
+          <p:cNvPr id="180" name="Google Shape;180;p19"/>
           <p:cNvSpPr txBox="1"/>
           <p:nvPr>
             <p:ph type="title"/>
@@ -13286,7 +15038,7 @@
       </p:sp>
       <p:sp>
         <p:nvSpPr>
-          <p:cNvPr id="174" name="Google Shape;174;p18"/>
+          <p:cNvPr id="181" name="Google Shape;181;p19"/>
           <p:cNvSpPr txBox="1"/>
           <p:nvPr>
             <p:ph idx="1" type="body"/>
@@ -13424,7 +15176,7 @@
       </p:sp>
       <p:pic>
         <p:nvPicPr>
-          <p:cNvPr id="175" name="Google Shape;175;p18"/>
+          <p:cNvPr id="182" name="Google Shape;182;p19"/>
           <p:cNvPicPr preferRelativeResize="0"/>
           <p:nvPr/>
         </p:nvPicPr>
@@ -13452,7 +15204,7 @@
       </p:pic>
       <p:pic>
         <p:nvPicPr>
-          <p:cNvPr id="176" name="Google Shape;176;p18"/>
+          <p:cNvPr id="183" name="Google Shape;183;p19"/>
           <p:cNvPicPr preferRelativeResize="0"/>
           <p:nvPr/>
         </p:nvPicPr>
@@ -13480,7 +15232,7 @@
       </p:pic>
       <p:pic>
         <p:nvPicPr>
-          <p:cNvPr id="177" name="Google Shape;177;p18"/>
+          <p:cNvPr id="184" name="Google Shape;184;p19"/>
           <p:cNvPicPr preferRelativeResize="0"/>
           <p:nvPr/>
         </p:nvPicPr>
@@ -13508,7 +15260,7 @@
       </p:pic>
       <p:pic>
         <p:nvPicPr>
-          <p:cNvPr id="178" name="Google Shape;178;p18"/>
+          <p:cNvPr id="185" name="Google Shape;185;p19"/>
           <p:cNvPicPr preferRelativeResize="0"/>
           <p:nvPr/>
         </p:nvPicPr>
@@ -13536,7 +15288,7 @@
       </p:pic>
       <p:sp>
         <p:nvSpPr>
-          <p:cNvPr id="179" name="Google Shape;179;p18"/>
+          <p:cNvPr id="186" name="Google Shape;186;p19"/>
           <p:cNvSpPr txBox="1"/>
           <p:nvPr/>
         </p:nvSpPr>
@@ -13745,7 +15497,7 @@
       </p:sp>
       <p:sp>
         <p:nvSpPr>
-          <p:cNvPr id="180" name="Google Shape;180;p18"/>
+          <p:cNvPr id="187" name="Google Shape;187;p19"/>
           <p:cNvSpPr txBox="1"/>
           <p:nvPr/>
         </p:nvSpPr>
@@ -13803,7 +15555,7 @@
       </p:sp>
       <p:sp>
         <p:nvSpPr>
-          <p:cNvPr id="181" name="Google Shape;181;p18"/>
+          <p:cNvPr id="188" name="Google Shape;188;p19"/>
           <p:cNvSpPr txBox="1"/>
           <p:nvPr/>
         </p:nvSpPr>
@@ -13867,12 +15619,12 @@
 </p:sld>
 </file>
 
-<file path=ppt/slides/slide7.xml><?xml version="1.0" encoding="utf-8"?>
+<file path=ppt/slides/slide8.xml><?xml version="1.0" encoding="utf-8"?>
 <p:sld xmlns:a="http://schemas.openxmlformats.org/drawingml/2006/main" xmlns:r="http://schemas.openxmlformats.org/officeDocument/2006/relationships" xmlns:mc="http://schemas.openxmlformats.org/markup-compatibility/2006" xmlns:mv="urn:schemas-microsoft-com:mac:vml" xmlns:p="http://schemas.openxmlformats.org/presentationml/2006/main" xmlns:c="http://schemas.openxmlformats.org/drawingml/2006/chart" xmlns:dgm="http://schemas.openxmlformats.org/drawingml/2006/diagram" xmlns:o="urn:schemas-microsoft-com:office:office" xmlns:v="urn:schemas-microsoft-com:vml" xmlns:pvml="urn:schemas-microsoft-com:office:powerpoint" xmlns:com="http://schemas.openxmlformats.org/drawingml/2006/compatibility" xmlns:p14="http://schemas.microsoft.com/office/powerpoint/2010/main" xmlns:p15="http://schemas.microsoft.com/office/powerpoint/2012/main" xmlns:ahyp="http://schemas.microsoft.com/office/drawing/2018/hyperlinkcolor">
   <p:cSld>
     <p:spTree>
       <p:nvGrpSpPr>
-        <p:cNvPr id="185" name="Shape 185"/>
+        <p:cNvPr id="192" name="Shape 192"/>
         <p:cNvGrpSpPr/>
         <p:nvPr/>
       </p:nvGrpSpPr>
@@ -13886,7 +15638,7 @@
       </p:grpSpPr>
       <p:sp>
         <p:nvSpPr>
-          <p:cNvPr id="186" name="Google Shape;186;p19"/>
+          <p:cNvPr id="193" name="Google Shape;193;p20"/>
           <p:cNvSpPr txBox="1"/>
           <p:nvPr>
             <p:ph type="title"/>
@@ -13941,7 +15693,7 @@
       </p:sp>
       <p:sp>
         <p:nvSpPr>
-          <p:cNvPr id="187" name="Google Shape;187;p19"/>
+          <p:cNvPr id="194" name="Google Shape;194;p20"/>
           <p:cNvSpPr txBox="1"/>
           <p:nvPr>
             <p:ph idx="1" type="body"/>
@@ -14200,7 +15952,7 @@
       </p:sp>
       <p:pic>
         <p:nvPicPr>
-          <p:cNvPr id="188" name="Google Shape;188;p19"/>
+          <p:cNvPr id="195" name="Google Shape;195;p20"/>
           <p:cNvPicPr preferRelativeResize="0"/>
           <p:nvPr/>
         </p:nvPicPr>
@@ -14228,7 +15980,7 @@
       </p:pic>
       <p:sp>
         <p:nvSpPr>
-          <p:cNvPr id="189" name="Google Shape;189;p19"/>
+          <p:cNvPr id="196" name="Google Shape;196;p20"/>
           <p:cNvSpPr txBox="1"/>
           <p:nvPr/>
         </p:nvSpPr>
@@ -14286,7 +16038,7 @@
       </p:sp>
       <p:cxnSp>
         <p:nvCxnSpPr>
-          <p:cNvPr id="190" name="Google Shape;190;p19"/>
+          <p:cNvPr id="197" name="Google Shape;197;p20"/>
           <p:cNvCxnSpPr/>
           <p:nvPr/>
         </p:nvCxnSpPr>
@@ -14318,12 +16070,12 @@
 </p:sld>
 </file>
 
-<file path=ppt/slides/slide8.xml><?xml version="1.0" encoding="utf-8"?>
+<file path=ppt/slides/slide9.xml><?xml version="1.0" encoding="utf-8"?>
 <p:sld xmlns:a="http://schemas.openxmlformats.org/drawingml/2006/main" xmlns:r="http://schemas.openxmlformats.org/officeDocument/2006/relationships" xmlns:mc="http://schemas.openxmlformats.org/markup-compatibility/2006" xmlns:mv="urn:schemas-microsoft-com:mac:vml" xmlns:p="http://schemas.openxmlformats.org/presentationml/2006/main" xmlns:c="http://schemas.openxmlformats.org/drawingml/2006/chart" xmlns:dgm="http://schemas.openxmlformats.org/drawingml/2006/diagram" xmlns:o="urn:schemas-microsoft-com:office:office" xmlns:v="urn:schemas-microsoft-com:vml" xmlns:pvml="urn:schemas-microsoft-com:office:powerpoint" xmlns:com="http://schemas.openxmlformats.org/drawingml/2006/compatibility" xmlns:p14="http://schemas.microsoft.com/office/powerpoint/2010/main" xmlns:p15="http://schemas.microsoft.com/office/powerpoint/2012/main" xmlns:ahyp="http://schemas.microsoft.com/office/drawing/2018/hyperlinkcolor">
   <p:cSld>
     <p:spTree>
       <p:nvGrpSpPr>
-        <p:cNvPr id="194" name="Shape 194"/>
+        <p:cNvPr id="201" name="Shape 201"/>
         <p:cNvGrpSpPr/>
         <p:nvPr/>
       </p:nvGrpSpPr>
@@ -14337,7 +16089,7 @@
       </p:grpSpPr>
       <p:sp>
         <p:nvSpPr>
-          <p:cNvPr id="195" name="Google Shape;195;p20"/>
+          <p:cNvPr id="202" name="Google Shape;202;p21"/>
           <p:cNvSpPr txBox="1"/>
           <p:nvPr>
             <p:ph type="title"/>
@@ -14392,7 +16144,7 @@
       </p:sp>
       <p:sp>
         <p:nvSpPr>
-          <p:cNvPr id="196" name="Google Shape;196;p20"/>
+          <p:cNvPr id="203" name="Google Shape;203;p21"/>
           <p:cNvSpPr txBox="1"/>
           <p:nvPr>
             <p:ph idx="1" type="body"/>
@@ -14447,7 +16199,7 @@
       </p:sp>
       <p:sp>
         <p:nvSpPr>
-          <p:cNvPr id="197" name="Google Shape;197;p20"/>
+          <p:cNvPr id="204" name="Google Shape;204;p21"/>
           <p:cNvSpPr txBox="1"/>
           <p:nvPr/>
         </p:nvSpPr>
@@ -14560,7 +16312,7 @@
       </p:sp>
       <p:pic>
         <p:nvPicPr>
-          <p:cNvPr id="198" name="Google Shape;198;p20"/>
+          <p:cNvPr id="205" name="Google Shape;205;p21"/>
           <p:cNvPicPr preferRelativeResize="0"/>
           <p:nvPr/>
         </p:nvPicPr>
@@ -14587,7 +16339,7 @@
       </p:pic>
       <p:pic>
         <p:nvPicPr>
-          <p:cNvPr id="199" name="Google Shape;199;p20"/>
+          <p:cNvPr id="206" name="Google Shape;206;p21"/>
           <p:cNvPicPr preferRelativeResize="0"/>
           <p:nvPr/>
         </p:nvPicPr>
@@ -14614,7 +16366,7 @@
       </p:pic>
       <p:pic>
         <p:nvPicPr>
-          <p:cNvPr id="200" name="Google Shape;200;p20"/>
+          <p:cNvPr id="207" name="Google Shape;207;p21"/>
           <p:cNvPicPr preferRelativeResize="0"/>
           <p:nvPr/>
         </p:nvPicPr>
@@ -14641,7 +16393,7 @@
       </p:pic>
       <p:pic>
         <p:nvPicPr>
-          <p:cNvPr id="201" name="Google Shape;201;p20"/>
+          <p:cNvPr id="208" name="Google Shape;208;p21"/>
           <p:cNvPicPr preferRelativeResize="0"/>
           <p:nvPr/>
         </p:nvPicPr>
@@ -14668,7 +16420,7 @@
       </p:pic>
       <p:pic>
         <p:nvPicPr>
-          <p:cNvPr id="202" name="Google Shape;202;p20"/>
+          <p:cNvPr id="209" name="Google Shape;209;p21"/>
           <p:cNvPicPr preferRelativeResize="0"/>
           <p:nvPr/>
         </p:nvPicPr>
@@ -14695,7 +16447,7 @@
       </p:pic>
       <p:pic>
         <p:nvPicPr>
-          <p:cNvPr id="203" name="Google Shape;203;p20"/>
+          <p:cNvPr id="210" name="Google Shape;210;p21"/>
           <p:cNvPicPr preferRelativeResize="0"/>
           <p:nvPr/>
         </p:nvPicPr>
@@ -14722,7 +16474,7 @@
       </p:pic>
       <p:pic>
         <p:nvPicPr>
-          <p:cNvPr id="204" name="Google Shape;204;p20"/>
+          <p:cNvPr id="211" name="Google Shape;211;p21"/>
           <p:cNvPicPr preferRelativeResize="0"/>
           <p:nvPr/>
         </p:nvPicPr>
@@ -14750,7 +16502,7 @@
       </p:pic>
       <p:sp>
         <p:nvSpPr>
-          <p:cNvPr id="205" name="Google Shape;205;p20"/>
+          <p:cNvPr id="212" name="Google Shape;212;p21"/>
           <p:cNvSpPr txBox="1"/>
           <p:nvPr/>
         </p:nvSpPr>
@@ -14808,7 +16560,7 @@
       </p:sp>
       <p:sp>
         <p:nvSpPr>
-          <p:cNvPr id="206" name="Google Shape;206;p20"/>
+          <p:cNvPr id="213" name="Google Shape;213;p21"/>
           <p:cNvSpPr txBox="1"/>
           <p:nvPr/>
         </p:nvSpPr>
@@ -14872,200 +16624,286 @@
 </p:sld>
 </file>
 
-<file path=ppt/slides/slide9.xml><?xml version="1.0" encoding="utf-8"?>
-<p:sld xmlns:a="http://schemas.openxmlformats.org/drawingml/2006/main" xmlns:r="http://schemas.openxmlformats.org/officeDocument/2006/relationships" xmlns:mc="http://schemas.openxmlformats.org/markup-compatibility/2006" xmlns:mv="urn:schemas-microsoft-com:mac:vml" xmlns:p="http://schemas.openxmlformats.org/presentationml/2006/main" xmlns:c="http://schemas.openxmlformats.org/drawingml/2006/chart" xmlns:dgm="http://schemas.openxmlformats.org/drawingml/2006/diagram" xmlns:o="urn:schemas-microsoft-com:office:office" xmlns:v="urn:schemas-microsoft-com:vml" xmlns:pvml="urn:schemas-microsoft-com:office:powerpoint" xmlns:com="http://schemas.openxmlformats.org/drawingml/2006/compatibility" xmlns:p14="http://schemas.microsoft.com/office/powerpoint/2010/main" xmlns:p15="http://schemas.microsoft.com/office/powerpoint/2012/main" xmlns:ahyp="http://schemas.microsoft.com/office/drawing/2018/hyperlinkcolor">
-  <p:cSld>
-    <p:spTree>
-      <p:nvGrpSpPr>
-        <p:cNvPr id="210" name="Shape 210"/>
-        <p:cNvGrpSpPr/>
-        <p:nvPr/>
-      </p:nvGrpSpPr>
-      <p:grpSpPr>
-        <a:xfrm>
-          <a:off x="0" y="0"/>
-          <a:ext cx="0" cy="0"/>
-          <a:chOff x="0" y="0"/>
-          <a:chExt cx="0" cy="0"/>
-        </a:xfrm>
-      </p:grpSpPr>
-      <p:sp>
-        <p:nvSpPr>
-          <p:cNvPr id="211" name="Google Shape;211;p21"/>
-          <p:cNvSpPr txBox="1"/>
-          <p:nvPr>
-            <p:ph type="title"/>
-          </p:nvPr>
-        </p:nvSpPr>
-        <p:spPr>
-          <a:xfrm>
-            <a:off x="1297500" y="393750"/>
-            <a:ext cx="7038900" cy="914100"/>
-          </a:xfrm>
-          <a:prstGeom prst="rect">
-            <a:avLst/>
-          </a:prstGeom>
-        </p:spPr>
-        <p:txBody>
-          <a:bodyPr anchorCtr="0" anchor="t" bIns="91425" lIns="91425" spcFirstLastPara="1" rIns="91425" wrap="square" tIns="91425">
-            <a:normAutofit fontScale="90000"/>
-          </a:bodyPr>
-          <a:lstStyle/>
-          <a:p>
-            <a:pPr indent="0" lvl="0" marL="0" rtl="0" algn="l">
-              <a:spcBef>
-                <a:spcPts val="0"/>
-              </a:spcBef>
-              <a:spcAft>
-                <a:spcPts val="0"/>
-              </a:spcAft>
-              <a:buNone/>
-            </a:pPr>
-            <a:r>
-              <a:rPr lang="en" sz="2622"/>
-              <a:t>What we learned from our </a:t>
-            </a:r>
-            <a:r>
-              <a:rPr lang="en" sz="2622"/>
-              <a:t>Machine</a:t>
-            </a:r>
-            <a:r>
-              <a:rPr lang="en" sz="2622"/>
-              <a:t> Learning Model…</a:t>
-            </a:r>
-            <a:endParaRPr sz="2622"/>
-          </a:p>
-        </p:txBody>
-      </p:sp>
-      <p:sp>
-        <p:nvSpPr>
-          <p:cNvPr id="212" name="Google Shape;212;p21"/>
-          <p:cNvSpPr txBox="1"/>
-          <p:nvPr>
-            <p:ph idx="1" type="body"/>
-          </p:nvPr>
-        </p:nvSpPr>
-        <p:spPr>
-          <a:xfrm>
-            <a:off x="1297500" y="1567550"/>
-            <a:ext cx="7038900" cy="2911200"/>
-          </a:xfrm>
-          <a:prstGeom prst="rect">
-            <a:avLst/>
-          </a:prstGeom>
-        </p:spPr>
-        <p:txBody>
-          <a:bodyPr anchorCtr="0" anchor="t" bIns="91425" lIns="91425" spcFirstLastPara="1" rIns="91425" wrap="square" tIns="91425">
-            <a:normAutofit/>
-          </a:bodyPr>
-          <a:lstStyle/>
-          <a:p>
-            <a:pPr indent="0" lvl="0" marL="0" rtl="0" algn="l">
-              <a:spcBef>
-                <a:spcPts val="0"/>
-              </a:spcBef>
-              <a:spcAft>
-                <a:spcPts val="0"/>
-              </a:spcAft>
-              <a:buNone/>
-            </a:pPr>
-            <a:r>
-              <a:rPr lang="en" sz="1500"/>
-              <a:t>We ran both a Linear and </a:t>
-            </a:r>
-            <a:r>
-              <a:rPr lang="en" sz="1500"/>
-              <a:t>Logistic</a:t>
-            </a:r>
-            <a:r>
-              <a:rPr lang="en" sz="1500"/>
-              <a:t> Regression Models to determine which was better for predicting cancer based off the list of features provided.</a:t>
-            </a:r>
-            <a:endParaRPr sz="1500"/>
-          </a:p>
-          <a:p>
-            <a:pPr indent="0" lvl="0" marL="457200" marR="917728" rtl="0" algn="l">
-              <a:spcBef>
-                <a:spcPts val="1200"/>
-              </a:spcBef>
-              <a:spcAft>
-                <a:spcPts val="0"/>
-              </a:spcAft>
-              <a:buNone/>
-            </a:pPr>
-            <a:r>
-              <a:rPr lang="en" sz="1500"/>
-              <a:t>For the Linear Regression, we </a:t>
-            </a:r>
-            <a:r>
-              <a:rPr lang="en" sz="1500"/>
-              <a:t>achieved</a:t>
-            </a:r>
-            <a:r>
-              <a:rPr lang="en" sz="1500"/>
-              <a:t> an </a:t>
-            </a:r>
-            <a:r>
-              <a:rPr b="1" lang="en" sz="1500"/>
-              <a:t>84.27%</a:t>
-            </a:r>
-            <a:r>
-              <a:rPr lang="en" sz="1500"/>
-              <a:t> accuracy score which is considered acceptable.</a:t>
-            </a:r>
-            <a:endParaRPr sz="1500"/>
-          </a:p>
-          <a:p>
-            <a:pPr indent="0" lvl="0" marL="457200" marR="917728" rtl="0" algn="l">
-              <a:spcBef>
-                <a:spcPts val="1200"/>
-              </a:spcBef>
-              <a:spcAft>
-                <a:spcPts val="1200"/>
-              </a:spcAft>
-              <a:buNone/>
-            </a:pPr>
-            <a:r>
-              <a:rPr lang="en" sz="1500"/>
-              <a:t>For Logistic Regression, we </a:t>
-            </a:r>
-            <a:r>
-              <a:rPr lang="en" sz="1500"/>
-              <a:t>received</a:t>
-            </a:r>
-            <a:r>
-              <a:rPr lang="en" sz="1500"/>
-              <a:t> a </a:t>
-            </a:r>
-            <a:r>
-              <a:rPr b="1" lang="en" sz="1500"/>
-              <a:t>97.09%</a:t>
-            </a:r>
-            <a:r>
-              <a:rPr lang="en" sz="1500"/>
-              <a:t> accuracy score meaning that a Logistic Regression is a very reliable model to use to predict </a:t>
-            </a:r>
-            <a:r>
-              <a:rPr lang="en" sz="1500"/>
-              <a:t>whether</a:t>
-            </a:r>
-            <a:r>
-              <a:rPr lang="en" sz="1500"/>
-              <a:t> someone has cancer based off the list of features we have provided the model.</a:t>
-            </a:r>
-            <a:endParaRPr sz="1500"/>
-          </a:p>
-        </p:txBody>
-      </p:sp>
-    </p:spTree>
-  </p:cSld>
-  <p:clrMapOvr>
-    <a:masterClrMapping/>
-  </p:clrMapOvr>
-</p:sld>
+<file path=ppt/theme/theme1.xml><?xml version="1.0" encoding="utf-8"?>
+<a:theme xmlns:a="http://schemas.openxmlformats.org/drawingml/2006/main" xmlns:r="http://schemas.openxmlformats.org/officeDocument/2006/relationships" name="Focus">
+  <a:themeElements>
+    <a:clrScheme name="Focus">
+      <a:dk1>
+        <a:srgbClr val="1B212C"/>
+      </a:dk1>
+      <a:lt1>
+        <a:srgbClr val="FFFFFF"/>
+      </a:lt1>
+      <a:dk2>
+        <a:srgbClr val="D9D9D9"/>
+      </a:dk2>
+      <a:lt2>
+        <a:srgbClr val="82C7A5"/>
+      </a:lt2>
+      <a:accent1>
+        <a:srgbClr val="0145AC"/>
+      </a:accent1>
+      <a:accent2>
+        <a:srgbClr val="EECE1A"/>
+      </a:accent2>
+      <a:accent3>
+        <a:srgbClr val="4E5567"/>
+      </a:accent3>
+      <a:accent4>
+        <a:srgbClr val="F4D6AD"/>
+      </a:accent4>
+      <a:accent5>
+        <a:srgbClr val="7890CD"/>
+      </a:accent5>
+      <a:accent6>
+        <a:srgbClr val="F15E22"/>
+      </a:accent6>
+      <a:hlink>
+        <a:srgbClr val="7890CD"/>
+      </a:hlink>
+      <a:folHlink>
+        <a:srgbClr val="7890CD"/>
+      </a:folHlink>
+    </a:clrScheme>
+    <a:fontScheme name="Office">
+      <a:majorFont>
+        <a:latin typeface="Arial"/>
+        <a:ea typeface=""/>
+        <a:cs typeface=""/>
+        <a:font script="Jpan" typeface="ＭＳ Ｐゴシック"/>
+        <a:font script="Hang" typeface="맑은 고딕"/>
+        <a:font script="Hans" typeface="宋体"/>
+        <a:font script="Hant" typeface="新細明體"/>
+        <a:font script="Arab" typeface="Times New Roman"/>
+        <a:font script="Hebr" typeface="Times New Roman"/>
+        <a:font script="Thai" typeface="Angsana New"/>
+        <a:font script="Ethi" typeface="Nyala"/>
+        <a:font script="Beng" typeface="Vrinda"/>
+        <a:font script="Gujr" typeface="Shruti"/>
+        <a:font script="Khmr" typeface="MoolBoran"/>
+        <a:font script="Knda" typeface="Tunga"/>
+        <a:font script="Guru" typeface="Raavi"/>
+        <a:font script="Cans" typeface="Euphemia"/>
+        <a:font script="Cher" typeface="Plantagenet Cherokee"/>
+        <a:font script="Yiii" typeface="Microsoft Yi Baiti"/>
+        <a:font script="Tibt" typeface="Microsoft Himalaya"/>
+        <a:font script="Thaa" typeface="MV Boli"/>
+        <a:font script="Deva" typeface="Mangal"/>
+        <a:font script="Telu" typeface="Gautami"/>
+        <a:font script="Taml" typeface="Latha"/>
+        <a:font script="Syrc" typeface="Estrangelo Edessa"/>
+        <a:font script="Orya" typeface="Kalinga"/>
+        <a:font script="Mlym" typeface="Kartika"/>
+        <a:font script="Laoo" typeface="DokChampa"/>
+        <a:font script="Sinh" typeface="Iskoola Pota"/>
+        <a:font script="Mong" typeface="Mongolian Baiti"/>
+        <a:font script="Viet" typeface="Times New Roman"/>
+        <a:font script="Uigh" typeface="Microsoft Uighur"/>
+        <a:font script="Geor" typeface="Sylfaen"/>
+      </a:majorFont>
+      <a:minorFont>
+        <a:latin typeface="Arial"/>
+        <a:ea typeface=""/>
+        <a:cs typeface=""/>
+        <a:font script="Jpan" typeface="ＭＳ Ｐゴシック"/>
+        <a:font script="Hang" typeface="맑은 고딕"/>
+        <a:font script="Hans" typeface="宋体"/>
+        <a:font script="Hant" typeface="新細明體"/>
+        <a:font script="Arab" typeface="Arial"/>
+        <a:font script="Hebr" typeface="Arial"/>
+        <a:font script="Thai" typeface="Cordia New"/>
+        <a:font script="Ethi" typeface="Nyala"/>
+        <a:font script="Beng" typeface="Vrinda"/>
+        <a:font script="Gujr" typeface="Shruti"/>
+        <a:font script="Khmr" typeface="DaunPenh"/>
+        <a:font script="Knda" typeface="Tunga"/>
+        <a:font script="Guru" typeface="Raavi"/>
+        <a:font script="Cans" typeface="Euphemia"/>
+        <a:font script="Cher" typeface="Plantagenet Cherokee"/>
+        <a:font script="Yiii" typeface="Microsoft Yi Baiti"/>
+        <a:font script="Tibt" typeface="Microsoft Himalaya"/>
+        <a:font script="Thaa" typeface="MV Boli"/>
+        <a:font script="Deva" typeface="Mangal"/>
+        <a:font script="Telu" typeface="Gautami"/>
+        <a:font script="Taml" typeface="Latha"/>
+        <a:font script="Syrc" typeface="Estrangelo Edessa"/>
+        <a:font script="Orya" typeface="Kalinga"/>
+        <a:font script="Mlym" typeface="Kartika"/>
+        <a:font script="Laoo" typeface="DokChampa"/>
+        <a:font script="Sinh" typeface="Iskoola Pota"/>
+        <a:font script="Mong" typeface="Mongolian Baiti"/>
+        <a:font script="Viet" typeface="Arial"/>
+        <a:font script="Uigh" typeface="Microsoft Uighur"/>
+        <a:font script="Geor" typeface="Sylfaen"/>
+      </a:minorFont>
+    </a:fontScheme>
+    <a:fmtScheme name="Office">
+      <a:fillStyleLst>
+        <a:solidFill>
+          <a:schemeClr val="phClr"/>
+        </a:solidFill>
+        <a:gradFill rotWithShape="1">
+          <a:gsLst>
+            <a:gs pos="0">
+              <a:schemeClr val="phClr">
+                <a:tint val="50000"/>
+                <a:satMod val="300000"/>
+              </a:schemeClr>
+            </a:gs>
+            <a:gs pos="35000">
+              <a:schemeClr val="phClr">
+                <a:tint val="37000"/>
+                <a:satMod val="300000"/>
+              </a:schemeClr>
+            </a:gs>
+            <a:gs pos="100000">
+              <a:schemeClr val="phClr">
+                <a:tint val="15000"/>
+                <a:satMod val="350000"/>
+              </a:schemeClr>
+            </a:gs>
+          </a:gsLst>
+          <a:lin ang="16200000" scaled="1"/>
+        </a:gradFill>
+        <a:gradFill rotWithShape="1">
+          <a:gsLst>
+            <a:gs pos="0">
+              <a:schemeClr val="phClr">
+                <a:tint val="100000"/>
+                <a:shade val="100000"/>
+                <a:satMod val="130000"/>
+              </a:schemeClr>
+            </a:gs>
+            <a:gs pos="100000">
+              <a:schemeClr val="phClr">
+                <a:tint val="50000"/>
+                <a:shade val="100000"/>
+                <a:satMod val="350000"/>
+              </a:schemeClr>
+            </a:gs>
+          </a:gsLst>
+          <a:lin ang="16200000" scaled="0"/>
+        </a:gradFill>
+      </a:fillStyleLst>
+      <a:lnStyleLst>
+        <a:ln w="9525" cap="flat" cmpd="sng" algn="ctr">
+          <a:solidFill>
+            <a:schemeClr val="phClr">
+              <a:shade val="95000"/>
+              <a:satMod val="105000"/>
+            </a:schemeClr>
+          </a:solidFill>
+          <a:prstDash val="solid"/>
+        </a:ln>
+        <a:ln w="25400" cap="flat" cmpd="sng" algn="ctr">
+          <a:solidFill>
+            <a:schemeClr val="phClr"/>
+          </a:solidFill>
+          <a:prstDash val="solid"/>
+        </a:ln>
+        <a:ln w="38100" cap="flat" cmpd="sng" algn="ctr">
+          <a:solidFill>
+            <a:schemeClr val="phClr"/>
+          </a:solidFill>
+          <a:prstDash val="solid"/>
+        </a:ln>
+      </a:lnStyleLst>
+      <a:effectStyleLst>
+        <a:effectStyle>
+          <a:effectLst>
+            <a:outerShdw blurRad="40000" dist="20000" dir="5400000" rotWithShape="0">
+              <a:srgbClr val="000000">
+                <a:alpha val="38000"/>
+              </a:srgbClr>
+            </a:outerShdw>
+          </a:effectLst>
+        </a:effectStyle>
+        <a:effectStyle>
+          <a:effectLst>
+            <a:outerShdw blurRad="40000" dist="23000" dir="5400000" rotWithShape="0">
+              <a:srgbClr val="000000">
+                <a:alpha val="35000"/>
+              </a:srgbClr>
+            </a:outerShdw>
+          </a:effectLst>
+        </a:effectStyle>
+        <a:effectStyle>
+          <a:effectLst>
+            <a:outerShdw blurRad="40000" dist="23000" dir="5400000" rotWithShape="0">
+              <a:srgbClr val="000000">
+                <a:alpha val="35000"/>
+              </a:srgbClr>
+            </a:outerShdw>
+          </a:effectLst>
+          <a:scene3d>
+            <a:camera prst="orthographicFront">
+              <a:rot lat="0" lon="0" rev="0"/>
+            </a:camera>
+            <a:lightRig rig="threePt" dir="t">
+              <a:rot lat="0" lon="0" rev="1200000"/>
+            </a:lightRig>
+          </a:scene3d>
+          <a:sp3d>
+            <a:bevelT w="63500" h="25400"/>
+          </a:sp3d>
+        </a:effectStyle>
+      </a:effectStyleLst>
+      <a:bgFillStyleLst>
+        <a:solidFill>
+          <a:schemeClr val="phClr"/>
+        </a:solidFill>
+        <a:gradFill rotWithShape="1">
+          <a:gsLst>
+            <a:gs pos="0">
+              <a:schemeClr val="phClr">
+                <a:tint val="40000"/>
+                <a:satMod val="350000"/>
+              </a:schemeClr>
+            </a:gs>
+            <a:gs pos="40000">
+              <a:schemeClr val="phClr">
+                <a:tint val="45000"/>
+                <a:shade val="99000"/>
+                <a:satMod val="350000"/>
+              </a:schemeClr>
+            </a:gs>
+            <a:gs pos="100000">
+              <a:schemeClr val="phClr">
+                <a:shade val="20000"/>
+                <a:satMod val="255000"/>
+              </a:schemeClr>
+            </a:gs>
+          </a:gsLst>
+          <a:path path="circle">
+            <a:fillToRect l="50000" t="-80000" r="50000" b="180000"/>
+          </a:path>
+        </a:gradFill>
+        <a:gradFill rotWithShape="1">
+          <a:gsLst>
+            <a:gs pos="0">
+              <a:schemeClr val="phClr">
+                <a:tint val="80000"/>
+                <a:satMod val="300000"/>
+              </a:schemeClr>
+            </a:gs>
+            <a:gs pos="100000">
+              <a:schemeClr val="phClr">
+                <a:shade val="30000"/>
+                <a:satMod val="200000"/>
+              </a:schemeClr>
+            </a:gs>
+          </a:gsLst>
+          <a:path path="circle">
+            <a:fillToRect l="50000" t="50000" r="50000" b="50000"/>
+          </a:path>
+        </a:gradFill>
+      </a:bgFillStyleLst>
+    </a:fmtScheme>
+  </a:themeElements>
+</a:theme>
 </file>
 
-<file path=ppt/theme/theme1.xml><?xml version="1.0" encoding="utf-8"?>
+<file path=ppt/theme/theme2.xml><?xml version="1.0" encoding="utf-8"?>
 <a:theme xmlns:a="http://schemas.openxmlformats.org/drawingml/2006/main" xmlns:r="http://schemas.openxmlformats.org/officeDocument/2006/relationships">
   <a:themeElements>
     <a:clrScheme name="Default">
@@ -15342,283 +17180,4 @@
     </a:fmtScheme>
   </a:themeElements>
 </a:theme>
-</file>
-
-<file path=ppt/theme/theme2.xml><?xml version="1.0" encoding="utf-8"?>
-<a:theme xmlns:a="http://schemas.openxmlformats.org/drawingml/2006/main" xmlns:r="http://schemas.openxmlformats.org/officeDocument/2006/relationships" name="Focus">
-  <a:themeElements>
-    <a:clrScheme name="Focus">
-      <a:dk1>
-        <a:srgbClr val="1B212C"/>
-      </a:dk1>
-      <a:lt1>
-        <a:srgbClr val="FFFFFF"/>
-      </a:lt1>
-      <a:dk2>
-        <a:srgbClr val="D9D9D9"/>
-      </a:dk2>
-      <a:lt2>
-        <a:srgbClr val="82C7A5"/>
-      </a:lt2>
-      <a:accent1>
-        <a:srgbClr val="0145AC"/>
-      </a:accent1>
-      <a:accent2>
-        <a:srgbClr val="EECE1A"/>
-      </a:accent2>
-      <a:accent3>
-        <a:srgbClr val="4E5567"/>
-      </a:accent3>
-      <a:accent4>
-        <a:srgbClr val="F4D6AD"/>
-      </a:accent4>
-      <a:accent5>
-        <a:srgbClr val="7890CD"/>
-      </a:accent5>
-      <a:accent6>
-        <a:srgbClr val="F15E22"/>
-      </a:accent6>
-      <a:hlink>
-        <a:srgbClr val="7890CD"/>
-      </a:hlink>
-      <a:folHlink>
-        <a:srgbClr val="7890CD"/>
-      </a:folHlink>
-    </a:clrScheme>
-    <a:fontScheme name="Office">
-      <a:majorFont>
-        <a:latin typeface="Arial"/>
-        <a:ea typeface=""/>
-        <a:cs typeface=""/>
-        <a:font script="Jpan" typeface="ＭＳ Ｐゴシック"/>
-        <a:font script="Hang" typeface="맑은 고딕"/>
-        <a:font script="Hans" typeface="宋体"/>
-        <a:font script="Hant" typeface="新細明體"/>
-        <a:font script="Arab" typeface="Times New Roman"/>
-        <a:font script="Hebr" typeface="Times New Roman"/>
-        <a:font script="Thai" typeface="Angsana New"/>
-        <a:font script="Ethi" typeface="Nyala"/>
-        <a:font script="Beng" typeface="Vrinda"/>
-        <a:font script="Gujr" typeface="Shruti"/>
-        <a:font script="Khmr" typeface="MoolBoran"/>
-        <a:font script="Knda" typeface="Tunga"/>
-        <a:font script="Guru" typeface="Raavi"/>
-        <a:font script="Cans" typeface="Euphemia"/>
-        <a:font script="Cher" typeface="Plantagenet Cherokee"/>
-        <a:font script="Yiii" typeface="Microsoft Yi Baiti"/>
-        <a:font script="Tibt" typeface="Microsoft Himalaya"/>
-        <a:font script="Thaa" typeface="MV Boli"/>
-        <a:font script="Deva" typeface="Mangal"/>
-        <a:font script="Telu" typeface="Gautami"/>
-        <a:font script="Taml" typeface="Latha"/>
-        <a:font script="Syrc" typeface="Estrangelo Edessa"/>
-        <a:font script="Orya" typeface="Kalinga"/>
-        <a:font script="Mlym" typeface="Kartika"/>
-        <a:font script="Laoo" typeface="DokChampa"/>
-        <a:font script="Sinh" typeface="Iskoola Pota"/>
-        <a:font script="Mong" typeface="Mongolian Baiti"/>
-        <a:font script="Viet" typeface="Times New Roman"/>
-        <a:font script="Uigh" typeface="Microsoft Uighur"/>
-        <a:font script="Geor" typeface="Sylfaen"/>
-      </a:majorFont>
-      <a:minorFont>
-        <a:latin typeface="Arial"/>
-        <a:ea typeface=""/>
-        <a:cs typeface=""/>
-        <a:font script="Jpan" typeface="ＭＳ Ｐゴシック"/>
-        <a:font script="Hang" typeface="맑은 고딕"/>
-        <a:font script="Hans" typeface="宋体"/>
-        <a:font script="Hant" typeface="新細明體"/>
-        <a:font script="Arab" typeface="Arial"/>
-        <a:font script="Hebr" typeface="Arial"/>
-        <a:font script="Thai" typeface="Cordia New"/>
-        <a:font script="Ethi" typeface="Nyala"/>
-        <a:font script="Beng" typeface="Vrinda"/>
-        <a:font script="Gujr" typeface="Shruti"/>
-        <a:font script="Khmr" typeface="DaunPenh"/>
-        <a:font script="Knda" typeface="Tunga"/>
-        <a:font script="Guru" typeface="Raavi"/>
-        <a:font script="Cans" typeface="Euphemia"/>
-        <a:font script="Cher" typeface="Plantagenet Cherokee"/>
-        <a:font script="Yiii" typeface="Microsoft Yi Baiti"/>
-        <a:font script="Tibt" typeface="Microsoft Himalaya"/>
-        <a:font script="Thaa" typeface="MV Boli"/>
-        <a:font script="Deva" typeface="Mangal"/>
-        <a:font script="Telu" typeface="Gautami"/>
-        <a:font script="Taml" typeface="Latha"/>
-        <a:font script="Syrc" typeface="Estrangelo Edessa"/>
-        <a:font script="Orya" typeface="Kalinga"/>
-        <a:font script="Mlym" typeface="Kartika"/>
-        <a:font script="Laoo" typeface="DokChampa"/>
-        <a:font script="Sinh" typeface="Iskoola Pota"/>
-        <a:font script="Mong" typeface="Mongolian Baiti"/>
-        <a:font script="Viet" typeface="Arial"/>
-        <a:font script="Uigh" typeface="Microsoft Uighur"/>
-        <a:font script="Geor" typeface="Sylfaen"/>
-      </a:minorFont>
-    </a:fontScheme>
-    <a:fmtScheme name="Office">
-      <a:fillStyleLst>
-        <a:solidFill>
-          <a:schemeClr val="phClr"/>
-        </a:solidFill>
-        <a:gradFill rotWithShape="1">
-          <a:gsLst>
-            <a:gs pos="0">
-              <a:schemeClr val="phClr">
-                <a:tint val="50000"/>
-                <a:satMod val="300000"/>
-              </a:schemeClr>
-            </a:gs>
-            <a:gs pos="35000">
-              <a:schemeClr val="phClr">
-                <a:tint val="37000"/>
-                <a:satMod val="300000"/>
-              </a:schemeClr>
-            </a:gs>
-            <a:gs pos="100000">
-              <a:schemeClr val="phClr">
-                <a:tint val="15000"/>
-                <a:satMod val="350000"/>
-              </a:schemeClr>
-            </a:gs>
-          </a:gsLst>
-          <a:lin ang="16200000" scaled="1"/>
-        </a:gradFill>
-        <a:gradFill rotWithShape="1">
-          <a:gsLst>
-            <a:gs pos="0">
-              <a:schemeClr val="phClr">
-                <a:tint val="100000"/>
-                <a:shade val="100000"/>
-                <a:satMod val="130000"/>
-              </a:schemeClr>
-            </a:gs>
-            <a:gs pos="100000">
-              <a:schemeClr val="phClr">
-                <a:tint val="50000"/>
-                <a:shade val="100000"/>
-                <a:satMod val="350000"/>
-              </a:schemeClr>
-            </a:gs>
-          </a:gsLst>
-          <a:lin ang="16200000" scaled="0"/>
-        </a:gradFill>
-      </a:fillStyleLst>
-      <a:lnStyleLst>
-        <a:ln w="9525" cap="flat" cmpd="sng" algn="ctr">
-          <a:solidFill>
-            <a:schemeClr val="phClr">
-              <a:shade val="95000"/>
-              <a:satMod val="105000"/>
-            </a:schemeClr>
-          </a:solidFill>
-          <a:prstDash val="solid"/>
-        </a:ln>
-        <a:ln w="25400" cap="flat" cmpd="sng" algn="ctr">
-          <a:solidFill>
-            <a:schemeClr val="phClr"/>
-          </a:solidFill>
-          <a:prstDash val="solid"/>
-        </a:ln>
-        <a:ln w="38100" cap="flat" cmpd="sng" algn="ctr">
-          <a:solidFill>
-            <a:schemeClr val="phClr"/>
-          </a:solidFill>
-          <a:prstDash val="solid"/>
-        </a:ln>
-      </a:lnStyleLst>
-      <a:effectStyleLst>
-        <a:effectStyle>
-          <a:effectLst>
-            <a:outerShdw blurRad="40000" dist="20000" dir="5400000" rotWithShape="0">
-              <a:srgbClr val="000000">
-                <a:alpha val="38000"/>
-              </a:srgbClr>
-            </a:outerShdw>
-          </a:effectLst>
-        </a:effectStyle>
-        <a:effectStyle>
-          <a:effectLst>
-            <a:outerShdw blurRad="40000" dist="23000" dir="5400000" rotWithShape="0">
-              <a:srgbClr val="000000">
-                <a:alpha val="35000"/>
-              </a:srgbClr>
-            </a:outerShdw>
-          </a:effectLst>
-        </a:effectStyle>
-        <a:effectStyle>
-          <a:effectLst>
-            <a:outerShdw blurRad="40000" dist="23000" dir="5400000" rotWithShape="0">
-              <a:srgbClr val="000000">
-                <a:alpha val="35000"/>
-              </a:srgbClr>
-            </a:outerShdw>
-          </a:effectLst>
-          <a:scene3d>
-            <a:camera prst="orthographicFront">
-              <a:rot lat="0" lon="0" rev="0"/>
-            </a:camera>
-            <a:lightRig rig="threePt" dir="t">
-              <a:rot lat="0" lon="0" rev="1200000"/>
-            </a:lightRig>
-          </a:scene3d>
-          <a:sp3d>
-            <a:bevelT w="63500" h="25400"/>
-          </a:sp3d>
-        </a:effectStyle>
-      </a:effectStyleLst>
-      <a:bgFillStyleLst>
-        <a:solidFill>
-          <a:schemeClr val="phClr"/>
-        </a:solidFill>
-        <a:gradFill rotWithShape="1">
-          <a:gsLst>
-            <a:gs pos="0">
-              <a:schemeClr val="phClr">
-                <a:tint val="40000"/>
-                <a:satMod val="350000"/>
-              </a:schemeClr>
-            </a:gs>
-            <a:gs pos="40000">
-              <a:schemeClr val="phClr">
-                <a:tint val="45000"/>
-                <a:shade val="99000"/>
-                <a:satMod val="350000"/>
-              </a:schemeClr>
-            </a:gs>
-            <a:gs pos="100000">
-              <a:schemeClr val="phClr">
-                <a:shade val="20000"/>
-                <a:satMod val="255000"/>
-              </a:schemeClr>
-            </a:gs>
-          </a:gsLst>
-          <a:path path="circle">
-            <a:fillToRect l="50000" t="-80000" r="50000" b="180000"/>
-          </a:path>
-        </a:gradFill>
-        <a:gradFill rotWithShape="1">
-          <a:gsLst>
-            <a:gs pos="0">
-              <a:schemeClr val="phClr">
-                <a:tint val="80000"/>
-                <a:satMod val="300000"/>
-              </a:schemeClr>
-            </a:gs>
-            <a:gs pos="100000">
-              <a:schemeClr val="phClr">
-                <a:shade val="30000"/>
-                <a:satMod val="200000"/>
-              </a:schemeClr>
-            </a:gs>
-          </a:gsLst>
-          <a:path path="circle">
-            <a:fillToRect l="50000" t="50000" r="50000" b="50000"/>
-          </a:path>
-        </a:gradFill>
-      </a:bgFillStyleLst>
-    </a:fmtScheme>
-  </a:themeElements>
-</a:theme>
 </file>
</xml_diff>